<commit_message>
Extracted interfaces and a fake test data provider
</commit_message>
<xml_diff>
--- a/Software Quality Recipes for Legacy.pptx
+++ b/Software Quality Recipes for Legacy.pptx
@@ -11,52 +11,54 @@
     <p:sldId id="258" r:id="rId5"/>
     <p:sldId id="266" r:id="rId6"/>
     <p:sldId id="309" r:id="rId7"/>
-    <p:sldId id="316" r:id="rId8"/>
-    <p:sldId id="319" r:id="rId9"/>
-    <p:sldId id="260" r:id="rId10"/>
-    <p:sldId id="291" r:id="rId11"/>
-    <p:sldId id="277" r:id="rId12"/>
-    <p:sldId id="320" r:id="rId13"/>
-    <p:sldId id="322" r:id="rId14"/>
-    <p:sldId id="321" r:id="rId15"/>
-    <p:sldId id="324" r:id="rId16"/>
-    <p:sldId id="325" r:id="rId17"/>
-    <p:sldId id="290" r:id="rId18"/>
-    <p:sldId id="278" r:id="rId19"/>
-    <p:sldId id="306" r:id="rId20"/>
-    <p:sldId id="327" r:id="rId21"/>
-    <p:sldId id="330" r:id="rId22"/>
-    <p:sldId id="329" r:id="rId23"/>
-    <p:sldId id="263" r:id="rId24"/>
-    <p:sldId id="276" r:id="rId25"/>
-    <p:sldId id="273" r:id="rId26"/>
-    <p:sldId id="271" r:id="rId27"/>
-    <p:sldId id="286" r:id="rId28"/>
-    <p:sldId id="272" r:id="rId29"/>
-    <p:sldId id="315" r:id="rId30"/>
-    <p:sldId id="317" r:id="rId31"/>
-    <p:sldId id="270" r:id="rId32"/>
-    <p:sldId id="311" r:id="rId33"/>
-    <p:sldId id="318" r:id="rId34"/>
-    <p:sldId id="264" r:id="rId35"/>
-    <p:sldId id="269" r:id="rId36"/>
-    <p:sldId id="308" r:id="rId37"/>
-    <p:sldId id="294" r:id="rId38"/>
-    <p:sldId id="274" r:id="rId39"/>
-    <p:sldId id="280" r:id="rId40"/>
-    <p:sldId id="284" r:id="rId41"/>
-    <p:sldId id="285" r:id="rId42"/>
-    <p:sldId id="305" r:id="rId43"/>
-    <p:sldId id="303" r:id="rId44"/>
-    <p:sldId id="300" r:id="rId45"/>
-    <p:sldId id="301" r:id="rId46"/>
-    <p:sldId id="310" r:id="rId47"/>
-    <p:sldId id="313" r:id="rId48"/>
-    <p:sldId id="302" r:id="rId49"/>
-    <p:sldId id="265" r:id="rId50"/>
-    <p:sldId id="267" r:id="rId51"/>
-    <p:sldId id="287" r:id="rId52"/>
-    <p:sldId id="259" r:id="rId53"/>
+    <p:sldId id="260" r:id="rId8"/>
+    <p:sldId id="291" r:id="rId9"/>
+    <p:sldId id="277" r:id="rId10"/>
+    <p:sldId id="320" r:id="rId11"/>
+    <p:sldId id="322" r:id="rId12"/>
+    <p:sldId id="321" r:id="rId13"/>
+    <p:sldId id="324" r:id="rId14"/>
+    <p:sldId id="325" r:id="rId15"/>
+    <p:sldId id="290" r:id="rId16"/>
+    <p:sldId id="278" r:id="rId17"/>
+    <p:sldId id="306" r:id="rId18"/>
+    <p:sldId id="330" r:id="rId19"/>
+    <p:sldId id="327" r:id="rId20"/>
+    <p:sldId id="331" r:id="rId21"/>
+    <p:sldId id="332" r:id="rId22"/>
+    <p:sldId id="333" r:id="rId23"/>
+    <p:sldId id="334" r:id="rId24"/>
+    <p:sldId id="329" r:id="rId25"/>
+    <p:sldId id="263" r:id="rId26"/>
+    <p:sldId id="270" r:id="rId27"/>
+    <p:sldId id="276" r:id="rId28"/>
+    <p:sldId id="273" r:id="rId29"/>
+    <p:sldId id="271" r:id="rId30"/>
+    <p:sldId id="286" r:id="rId31"/>
+    <p:sldId id="272" r:id="rId32"/>
+    <p:sldId id="315" r:id="rId33"/>
+    <p:sldId id="317" r:id="rId34"/>
+    <p:sldId id="311" r:id="rId35"/>
+    <p:sldId id="318" r:id="rId36"/>
+    <p:sldId id="264" r:id="rId37"/>
+    <p:sldId id="269" r:id="rId38"/>
+    <p:sldId id="308" r:id="rId39"/>
+    <p:sldId id="294" r:id="rId40"/>
+    <p:sldId id="274" r:id="rId41"/>
+    <p:sldId id="280" r:id="rId42"/>
+    <p:sldId id="284" r:id="rId43"/>
+    <p:sldId id="285" r:id="rId44"/>
+    <p:sldId id="305" r:id="rId45"/>
+    <p:sldId id="303" r:id="rId46"/>
+    <p:sldId id="300" r:id="rId47"/>
+    <p:sldId id="301" r:id="rId48"/>
+    <p:sldId id="310" r:id="rId49"/>
+    <p:sldId id="313" r:id="rId50"/>
+    <p:sldId id="302" r:id="rId51"/>
+    <p:sldId id="265" r:id="rId52"/>
+    <p:sldId id="267" r:id="rId53"/>
+    <p:sldId id="287" r:id="rId54"/>
+    <p:sldId id="259" r:id="rId55"/>
   </p:sldIdLst>
   <p:sldSz cx="12192000" cy="6858000"/>
   <p:notesSz cx="6858000" cy="9144000"/>
@@ -170,8 +172,6 @@
         <p14:section name="Example Codebase" id="{FA0EC0E7-A608-4FCD-BB1B-BF49FFA9B001}">
           <p14:sldIdLst>
             <p14:sldId id="309"/>
-            <p14:sldId id="316"/>
-            <p14:sldId id="319"/>
           </p14:sldIdLst>
         </p14:section>
         <p14:section name="Unit Testing 101" id="{EBB37E95-7099-4B69-B317-167DBBA818D6}">
@@ -187,14 +187,19 @@
             <p14:sldId id="290"/>
             <p14:sldId id="278"/>
             <p14:sldId id="306"/>
+            <p14:sldId id="330"/>
             <p14:sldId id="327"/>
-            <p14:sldId id="330"/>
+            <p14:sldId id="331"/>
+            <p14:sldId id="332"/>
+            <p14:sldId id="333"/>
+            <p14:sldId id="334"/>
             <p14:sldId id="329"/>
           </p14:sldIdLst>
         </p14:section>
         <p14:section name="Libraries" id="{721D9537-7B3B-4764-B91E-5832A8354E51}">
           <p14:sldIdLst>
             <p14:sldId id="263"/>
+            <p14:sldId id="270"/>
             <p14:sldId id="276"/>
             <p14:sldId id="273"/>
             <p14:sldId id="271"/>
@@ -202,7 +207,6 @@
             <p14:sldId id="272"/>
             <p14:sldId id="315"/>
             <p14:sldId id="317"/>
-            <p14:sldId id="270"/>
             <p14:sldId id="311"/>
             <p14:sldId id="318"/>
           </p14:sldIdLst>
@@ -27546,359 +27550,6 @@
           <a:chExt cx="0" cy="0"/>
         </a:xfrm>
       </p:grpSpPr>
-      <p:graphicFrame>
-        <p:nvGraphicFramePr>
-          <p:cNvPr id="18" name="Content Placeholder 12">
-            <a:extLst>
-              <a:ext uri="{FF2B5EF4-FFF2-40B4-BE49-F238E27FC236}">
-                <a16:creationId xmlns:a16="http://schemas.microsoft.com/office/drawing/2014/main" id="{3285EE39-92DD-4873-B3EA-C7BCB8A95AE8}"/>
-              </a:ext>
-            </a:extLst>
-          </p:cNvPr>
-          <p:cNvGraphicFramePr>
-            <a:graphicFrameLocks noGrp="1"/>
-          </p:cNvGraphicFramePr>
-          <p:nvPr>
-            <p:ph type="pic" idx="4294967295"/>
-            <p:extLst>
-              <p:ext uri="{D42A27DB-BD31-4B8C-83A1-F6EECF244321}">
-                <p14:modId xmlns:p14="http://schemas.microsoft.com/office/powerpoint/2010/main" val="1673782684"/>
-              </p:ext>
-            </p:extLst>
-          </p:nvPr>
-        </p:nvGraphicFramePr>
-        <p:xfrm>
-          <a:off x="1037239" y="930720"/>
-          <a:ext cx="10572052" cy="5266944"/>
-        </p:xfrm>
-        <a:graphic>
-          <a:graphicData uri="http://schemas.openxmlformats.org/drawingml/2006/diagram">
-            <dgm:relIds xmlns:dgm="http://schemas.openxmlformats.org/drawingml/2006/diagram" xmlns:r="http://schemas.openxmlformats.org/officeDocument/2006/relationships" r:dm="rId2" r:lo="rId3" r:qs="rId4" r:cs="rId5"/>
-          </a:graphicData>
-        </a:graphic>
-      </p:graphicFrame>
-      <p:sp>
-        <p:nvSpPr>
-          <p:cNvPr id="23" name="Title 3">
-            <a:extLst>
-              <a:ext uri="{FF2B5EF4-FFF2-40B4-BE49-F238E27FC236}">
-                <a16:creationId xmlns:a16="http://schemas.microsoft.com/office/drawing/2014/main" id="{F0A19E53-6231-491C-A887-D93B61383759}"/>
-              </a:ext>
-            </a:extLst>
-          </p:cNvPr>
-          <p:cNvSpPr txBox="1">
-            <a:spLocks/>
-          </p:cNvSpPr>
-          <p:nvPr/>
-        </p:nvSpPr>
-        <p:spPr>
-          <a:xfrm>
-            <a:off x="1141413" y="0"/>
-            <a:ext cx="9905998" cy="1478570"/>
-          </a:xfrm>
-          <a:prstGeom prst="rect">
-            <a:avLst/>
-          </a:prstGeom>
-        </p:spPr>
-        <p:txBody>
-          <a:bodyPr vert="horz" lIns="91440" tIns="45720" rIns="91440" bIns="45720" rtlCol="0" anchor="ctr">
-            <a:normAutofit/>
-          </a:bodyPr>
-          <a:lstStyle>
-            <a:lvl1pPr algn="l" defTabSz="914400" rtl="0" eaLnBrk="1" latinLnBrk="0" hangingPunct="1">
-              <a:lnSpc>
-                <a:spcPct val="90000"/>
-              </a:lnSpc>
-              <a:spcBef>
-                <a:spcPct val="0"/>
-              </a:spcBef>
-              <a:buNone/>
-              <a:defRPr sz="3600" kern="1200" cap="all" baseline="0">
-                <a:solidFill>
-                  <a:schemeClr val="tx1"/>
-                </a:solidFill>
-                <a:effectLst>
-                  <a:outerShdw blurRad="177800" dist="38100" dir="2700000" algn="tl">
-                    <a:srgbClr val="000000">
-                      <a:alpha val="24000"/>
-                    </a:srgbClr>
-                  </a:outerShdw>
-                </a:effectLst>
-                <a:latin typeface="+mj-lt"/>
-                <a:ea typeface="+mj-ea"/>
-                <a:cs typeface="+mj-cs"/>
-              </a:defRPr>
-            </a:lvl1pPr>
-          </a:lstStyle>
-          <a:p>
-            <a:r>
-              <a:rPr lang="en-US" cap="none" dirty="0"/>
-              <a:t>Types of Tests</a:t>
-            </a:r>
-          </a:p>
-        </p:txBody>
-      </p:sp>
-      <p:sp>
-        <p:nvSpPr>
-          <p:cNvPr id="26" name="Arrow: Down 25">
-            <a:extLst>
-              <a:ext uri="{FF2B5EF4-FFF2-40B4-BE49-F238E27FC236}">
-                <a16:creationId xmlns:a16="http://schemas.microsoft.com/office/drawing/2014/main" id="{8C436F3A-8B58-470E-8A7E-67AE3D36BFF2}"/>
-              </a:ext>
-            </a:extLst>
-          </p:cNvPr>
-          <p:cNvSpPr/>
-          <p:nvPr/>
-        </p:nvSpPr>
-        <p:spPr>
-          <a:xfrm rot="17673808">
-            <a:off x="1620239" y="4965379"/>
-            <a:ext cx="459148" cy="586953"/>
-          </a:xfrm>
-          <a:prstGeom prst="downArrow">
-            <a:avLst/>
-          </a:prstGeom>
-        </p:spPr>
-        <p:style>
-          <a:lnRef idx="2">
-            <a:schemeClr val="accent3">
-              <a:shade val="50000"/>
-            </a:schemeClr>
-          </a:lnRef>
-          <a:fillRef idx="1">
-            <a:schemeClr val="accent3"/>
-          </a:fillRef>
-          <a:effectRef idx="0">
-            <a:schemeClr val="accent3"/>
-          </a:effectRef>
-          <a:fontRef idx="minor">
-            <a:schemeClr val="lt1"/>
-          </a:fontRef>
-        </p:style>
-        <p:txBody>
-          <a:bodyPr rtlCol="0" anchor="ctr"/>
-          <a:lstStyle/>
-          <a:p>
-            <a:pPr algn="ctr"/>
-            <a:endParaRPr lang="en-US"/>
-          </a:p>
-        </p:txBody>
-      </p:sp>
-    </p:spTree>
-    <p:extLst>
-      <p:ext uri="{BB962C8B-B14F-4D97-AF65-F5344CB8AC3E}">
-        <p14:creationId xmlns:p14="http://schemas.microsoft.com/office/powerpoint/2010/main" val="3340561667"/>
-      </p:ext>
-    </p:extLst>
-  </p:cSld>
-  <p:clrMapOvr>
-    <a:masterClrMapping/>
-  </p:clrMapOvr>
-  <p:timing>
-    <p:tnLst>
-      <p:par>
-        <p:cTn id="1" dur="indefinite" restart="never" nodeType="tmRoot">
-          <p:childTnLst>
-            <p:seq concurrent="1" nextAc="seek">
-              <p:cTn id="2" dur="indefinite" nodeType="mainSeq">
-                <p:childTnLst>
-                  <p:par>
-                    <p:cTn id="3" fill="hold">
-                      <p:stCondLst>
-                        <p:cond delay="indefinite"/>
-                      </p:stCondLst>
-                      <p:childTnLst>
-                        <p:par>
-                          <p:cTn id="4" fill="hold">
-                            <p:stCondLst>
-                              <p:cond delay="0"/>
-                            </p:stCondLst>
-                            <p:childTnLst>
-                              <p:par>
-                                <p:cTn id="5" presetID="1" presetClass="entr" presetSubtype="0" fill="hold" grpId="0" nodeType="clickEffect">
-                                  <p:stCondLst>
-                                    <p:cond delay="0"/>
-                                  </p:stCondLst>
-                                  <p:childTnLst>
-                                    <p:set>
-                                      <p:cBhvr>
-                                        <p:cTn id="6" dur="1" fill="hold">
-                                          <p:stCondLst>
-                                            <p:cond delay="0"/>
-                                          </p:stCondLst>
-                                        </p:cTn>
-                                        <p:tgtEl>
-                                          <p:spTgt spid="26"/>
-                                        </p:tgtEl>
-                                        <p:attrNameLst>
-                                          <p:attrName>style.visibility</p:attrName>
-                                        </p:attrNameLst>
-                                      </p:cBhvr>
-                                      <p:to>
-                                        <p:strVal val="visible"/>
-                                      </p:to>
-                                    </p:set>
-                                  </p:childTnLst>
-                                </p:cTn>
-                              </p:par>
-                            </p:childTnLst>
-                          </p:cTn>
-                        </p:par>
-                      </p:childTnLst>
-                    </p:cTn>
-                  </p:par>
-                </p:childTnLst>
-              </p:cTn>
-              <p:prevCondLst>
-                <p:cond evt="onPrev" delay="0">
-                  <p:tgtEl>
-                    <p:sldTgt/>
-                  </p:tgtEl>
-                </p:cond>
-              </p:prevCondLst>
-              <p:nextCondLst>
-                <p:cond evt="onNext" delay="0">
-                  <p:tgtEl>
-                    <p:sldTgt/>
-                  </p:tgtEl>
-                </p:cond>
-              </p:nextCondLst>
-            </p:seq>
-          </p:childTnLst>
-        </p:cTn>
-      </p:par>
-    </p:tnLst>
-    <p:bldLst>
-      <p:bldP spid="26" grpId="0" animBg="1"/>
-    </p:bldLst>
-  </p:timing>
-</p:sld>
-</file>
-
-<file path=ppt/slides/slide11.xml><?xml version="1.0" encoding="utf-8"?>
-<p:sld xmlns:a="http://schemas.openxmlformats.org/drawingml/2006/main" xmlns:r="http://schemas.openxmlformats.org/officeDocument/2006/relationships" xmlns:p="http://schemas.openxmlformats.org/presentationml/2006/main">
-  <p:cSld>
-    <p:spTree>
-      <p:nvGrpSpPr>
-        <p:cNvPr id="1" name=""/>
-        <p:cNvGrpSpPr/>
-        <p:nvPr/>
-      </p:nvGrpSpPr>
-      <p:grpSpPr>
-        <a:xfrm>
-          <a:off x="0" y="0"/>
-          <a:ext cx="0" cy="0"/>
-          <a:chOff x="0" y="0"/>
-          <a:chExt cx="0" cy="0"/>
-        </a:xfrm>
-      </p:grpSpPr>
-      <p:sp>
-        <p:nvSpPr>
-          <p:cNvPr id="4" name="Title 3">
-            <a:extLst>
-              <a:ext uri="{FF2B5EF4-FFF2-40B4-BE49-F238E27FC236}">
-                <a16:creationId xmlns:a16="http://schemas.microsoft.com/office/drawing/2014/main" id="{EE13D860-9205-48B1-B675-4421397C217F}"/>
-              </a:ext>
-            </a:extLst>
-          </p:cNvPr>
-          <p:cNvSpPr>
-            <a:spLocks noGrp="1"/>
-          </p:cNvSpPr>
-          <p:nvPr>
-            <p:ph type="title"/>
-          </p:nvPr>
-        </p:nvSpPr>
-        <p:spPr>
-          <a:xfrm>
-            <a:off x="1141413" y="0"/>
-            <a:ext cx="9905998" cy="1478570"/>
-          </a:xfrm>
-        </p:spPr>
-        <p:txBody>
-          <a:bodyPr/>
-          <a:lstStyle/>
-          <a:p>
-            <a:r>
-              <a:rPr lang="en-US" cap="none" dirty="0"/>
-              <a:t>What is a Unit Test?</a:t>
-            </a:r>
-          </a:p>
-        </p:txBody>
-      </p:sp>
-      <p:pic>
-        <p:nvPicPr>
-          <p:cNvPr id="8" name="Picture 7">
-            <a:extLst>
-              <a:ext uri="{FF2B5EF4-FFF2-40B4-BE49-F238E27FC236}">
-                <a16:creationId xmlns:a16="http://schemas.microsoft.com/office/drawing/2014/main" id="{F77D794F-6085-4DD5-8161-95ABC4C7F82E}"/>
-              </a:ext>
-            </a:extLst>
-          </p:cNvPr>
-          <p:cNvPicPr>
-            <a:picLocks noChangeAspect="1"/>
-          </p:cNvPicPr>
-          <p:nvPr/>
-        </p:nvPicPr>
-        <p:blipFill>
-          <a:blip r:embed="rId2"/>
-          <a:stretch>
-            <a:fillRect/>
-          </a:stretch>
-        </p:blipFill>
-        <p:spPr>
-          <a:xfrm>
-            <a:off x="1300162" y="1830870"/>
-            <a:ext cx="10013781" cy="4106943"/>
-          </a:xfrm>
-          <a:prstGeom prst="rect">
-            <a:avLst/>
-          </a:prstGeom>
-          <a:ln w="38100" cap="sq">
-            <a:solidFill>
-              <a:srgbClr val="000000"/>
-            </a:solidFill>
-            <a:prstDash val="solid"/>
-            <a:miter lim="800000"/>
-          </a:ln>
-          <a:effectLst>
-            <a:outerShdw blurRad="50800" dist="38100" dir="2700000" algn="tl" rotWithShape="0">
-              <a:srgbClr val="000000">
-                <a:alpha val="43000"/>
-              </a:srgbClr>
-            </a:outerShdw>
-          </a:effectLst>
-        </p:spPr>
-      </p:pic>
-    </p:spTree>
-    <p:extLst>
-      <p:ext uri="{BB962C8B-B14F-4D97-AF65-F5344CB8AC3E}">
-        <p14:creationId xmlns:p14="http://schemas.microsoft.com/office/powerpoint/2010/main" val="3402936677"/>
-      </p:ext>
-    </p:extLst>
-  </p:cSld>
-  <p:clrMapOvr>
-    <a:masterClrMapping/>
-  </p:clrMapOvr>
-</p:sld>
-</file>
-
-<file path=ppt/slides/slide12.xml><?xml version="1.0" encoding="utf-8"?>
-<p:sld xmlns:a="http://schemas.openxmlformats.org/drawingml/2006/main" xmlns:r="http://schemas.openxmlformats.org/officeDocument/2006/relationships" xmlns:p="http://schemas.openxmlformats.org/presentationml/2006/main">
-  <p:cSld>
-    <p:spTree>
-      <p:nvGrpSpPr>
-        <p:cNvPr id="1" name=""/>
-        <p:cNvGrpSpPr/>
-        <p:nvPr/>
-      </p:nvGrpSpPr>
-      <p:grpSpPr>
-        <a:xfrm>
-          <a:off x="0" y="0"/>
-          <a:ext cx="0" cy="0"/>
-          <a:chOff x="0" y="0"/>
-          <a:chExt cx="0" cy="0"/>
-        </a:xfrm>
-      </p:grpSpPr>
       <p:sp>
         <p:nvSpPr>
           <p:cNvPr id="4" name="Title 3">
@@ -28035,7 +27686,7 @@
 </p:sld>
 </file>
 
-<file path=ppt/slides/slide13.xml><?xml version="1.0" encoding="utf-8"?>
+<file path=ppt/slides/slide11.xml><?xml version="1.0" encoding="utf-8"?>
 <p:sld xmlns:a="http://schemas.openxmlformats.org/drawingml/2006/main" xmlns:r="http://schemas.openxmlformats.org/officeDocument/2006/relationships" xmlns:p="http://schemas.openxmlformats.org/presentationml/2006/main">
   <p:cSld>
     <p:spTree>
@@ -28188,7 +27839,7 @@
 </p:sld>
 </file>
 
-<file path=ppt/slides/slide14.xml><?xml version="1.0" encoding="utf-8"?>
+<file path=ppt/slides/slide12.xml><?xml version="1.0" encoding="utf-8"?>
 <p:sld xmlns:a="http://schemas.openxmlformats.org/drawingml/2006/main" xmlns:r="http://schemas.openxmlformats.org/officeDocument/2006/relationships" xmlns:p="http://schemas.openxmlformats.org/presentationml/2006/main">
   <p:cSld>
     <p:spTree>
@@ -28341,7 +27992,7 @@
 </p:sld>
 </file>
 
-<file path=ppt/slides/slide15.xml><?xml version="1.0" encoding="utf-8"?>
+<file path=ppt/slides/slide13.xml><?xml version="1.0" encoding="utf-8"?>
 <p:sld xmlns:a="http://schemas.openxmlformats.org/drawingml/2006/main" xmlns:r="http://schemas.openxmlformats.org/officeDocument/2006/relationships" xmlns:p="http://schemas.openxmlformats.org/presentationml/2006/main">
   <p:cSld>
     <p:spTree>
@@ -28586,7 +28237,7 @@
 </p:sld>
 </file>
 
-<file path=ppt/slides/slide16.xml><?xml version="1.0" encoding="utf-8"?>
+<file path=ppt/slides/slide14.xml><?xml version="1.0" encoding="utf-8"?>
 <p:sld xmlns:a="http://schemas.openxmlformats.org/drawingml/2006/main" xmlns:r="http://schemas.openxmlformats.org/officeDocument/2006/relationships" xmlns:p="http://schemas.openxmlformats.org/presentationml/2006/main">
   <p:cSld>
     <p:spTree>
@@ -28831,7 +28482,7 @@
 </p:sld>
 </file>
 
-<file path=ppt/slides/slide17.xml><?xml version="1.0" encoding="utf-8"?>
+<file path=ppt/slides/slide15.xml><?xml version="1.0" encoding="utf-8"?>
 <p:sld xmlns:a="http://schemas.openxmlformats.org/drawingml/2006/main" xmlns:r="http://schemas.openxmlformats.org/officeDocument/2006/relationships" xmlns:p="http://schemas.openxmlformats.org/presentationml/2006/main">
   <p:cSld>
     <p:spTree>
@@ -29444,7 +29095,7 @@
 </p:sld>
 </file>
 
-<file path=ppt/slides/slide18.xml><?xml version="1.0" encoding="utf-8"?>
+<file path=ppt/slides/slide16.xml><?xml version="1.0" encoding="utf-8"?>
 <p:sld xmlns:a="http://schemas.openxmlformats.org/drawingml/2006/main" xmlns:r="http://schemas.openxmlformats.org/officeDocument/2006/relationships" xmlns:p="http://schemas.openxmlformats.org/presentationml/2006/main">
   <p:cSld>
     <p:spTree>
@@ -29537,7 +29188,7 @@
 </p:sld>
 </file>
 
-<file path=ppt/slides/slide19.xml><?xml version="1.0" encoding="utf-8"?>
+<file path=ppt/slides/slide17.xml><?xml version="1.0" encoding="utf-8"?>
 <p:sld xmlns:a="http://schemas.openxmlformats.org/drawingml/2006/main" xmlns:r="http://schemas.openxmlformats.org/officeDocument/2006/relationships" xmlns:p="http://schemas.openxmlformats.org/presentationml/2006/main">
   <p:cSld>
     <p:spTree>
@@ -29694,528 +29345,7 @@
 </p:sld>
 </file>
 
-<file path=ppt/slides/slide2.xml><?xml version="1.0" encoding="utf-8"?>
-<p:sld xmlns:a="http://schemas.openxmlformats.org/drawingml/2006/main" xmlns:r="http://schemas.openxmlformats.org/officeDocument/2006/relationships" xmlns:p="http://schemas.openxmlformats.org/presentationml/2006/main">
-  <p:cSld>
-    <p:spTree>
-      <p:nvGrpSpPr>
-        <p:cNvPr id="1" name=""/>
-        <p:cNvGrpSpPr/>
-        <p:nvPr/>
-      </p:nvGrpSpPr>
-      <p:grpSpPr>
-        <a:xfrm>
-          <a:off x="0" y="0"/>
-          <a:ext cx="0" cy="0"/>
-          <a:chOff x="0" y="0"/>
-          <a:chExt cx="0" cy="0"/>
-        </a:xfrm>
-      </p:grpSpPr>
-      <p:sp>
-        <p:nvSpPr>
-          <p:cNvPr id="2" name="Title 1">
-            <a:extLst>
-              <a:ext uri="{FF2B5EF4-FFF2-40B4-BE49-F238E27FC236}">
-                <a16:creationId xmlns:a16="http://schemas.microsoft.com/office/drawing/2014/main" id="{A2AA7CC2-6F2A-49F6-8BC3-602F91F4C2B7}"/>
-              </a:ext>
-            </a:extLst>
-          </p:cNvPr>
-          <p:cNvSpPr>
-            <a:spLocks noGrp="1"/>
-          </p:cNvSpPr>
-          <p:nvPr>
-            <p:ph type="title"/>
-          </p:nvPr>
-        </p:nvSpPr>
-        <p:spPr/>
-        <p:txBody>
-          <a:bodyPr/>
-          <a:lstStyle/>
-          <a:p>
-            <a:r>
-              <a:rPr lang="en-US" cap="none" dirty="0"/>
-              <a:t>About Me</a:t>
-            </a:r>
-          </a:p>
-        </p:txBody>
-      </p:sp>
-      <p:sp>
-        <p:nvSpPr>
-          <p:cNvPr id="3" name="Content Placeholder 2">
-            <a:extLst>
-              <a:ext uri="{FF2B5EF4-FFF2-40B4-BE49-F238E27FC236}">
-                <a16:creationId xmlns:a16="http://schemas.microsoft.com/office/drawing/2014/main" id="{69009204-086E-4F23-9F4B-ABDA3AD423AD}"/>
-              </a:ext>
-            </a:extLst>
-          </p:cNvPr>
-          <p:cNvSpPr>
-            <a:spLocks noGrp="1"/>
-          </p:cNvSpPr>
-          <p:nvPr>
-            <p:ph idx="1"/>
-          </p:nvPr>
-        </p:nvSpPr>
-        <p:spPr/>
-        <p:txBody>
-          <a:bodyPr>
-            <a:normAutofit/>
-          </a:bodyPr>
-          <a:lstStyle/>
-          <a:p>
-            <a:r>
-              <a:rPr lang="en-US" dirty="0"/>
-              <a:t>.NET / TypeScript / Angular Developer turned Manager / Mentor</a:t>
-            </a:r>
-          </a:p>
-          <a:p>
-            <a:r>
-              <a:rPr lang="en-US" dirty="0"/>
-              <a:t>Programming</a:t>
-            </a:r>
-          </a:p>
-          <a:p>
-            <a:pPr lvl="1"/>
-            <a:r>
-              <a:rPr lang="en-US" dirty="0"/>
-              <a:t>For fun since 1987</a:t>
-            </a:r>
-          </a:p>
-          <a:p>
-            <a:pPr lvl="1"/>
-            <a:r>
-              <a:rPr lang="en-US" dirty="0"/>
-              <a:t>.NET since 2001 (Beta 2)</a:t>
-            </a:r>
-          </a:p>
-          <a:p>
-            <a:pPr lvl="1"/>
-            <a:r>
-              <a:rPr lang="en-US" dirty="0"/>
-              <a:t>Professionally since 2006</a:t>
-            </a:r>
-          </a:p>
-          <a:p>
-            <a:r>
-              <a:rPr lang="en-US" dirty="0"/>
-              <a:t>Addicted to Reading and Refactoring</a:t>
-            </a:r>
-          </a:p>
-        </p:txBody>
-      </p:sp>
-    </p:spTree>
-    <p:extLst>
-      <p:ext uri="{BB962C8B-B14F-4D97-AF65-F5344CB8AC3E}">
-        <p14:creationId xmlns:p14="http://schemas.microsoft.com/office/powerpoint/2010/main" val="3867719309"/>
-      </p:ext>
-    </p:extLst>
-  </p:cSld>
-  <p:clrMapOvr>
-    <a:masterClrMapping/>
-  </p:clrMapOvr>
-</p:sld>
-</file>
-
-<file path=ppt/slides/slide20.xml><?xml version="1.0" encoding="utf-8"?>
-<p:sld xmlns:a="http://schemas.openxmlformats.org/drawingml/2006/main" xmlns:r="http://schemas.openxmlformats.org/officeDocument/2006/relationships" xmlns:p="http://schemas.openxmlformats.org/presentationml/2006/main">
-  <p:cSld>
-    <p:spTree>
-      <p:nvGrpSpPr>
-        <p:cNvPr id="1" name=""/>
-        <p:cNvGrpSpPr/>
-        <p:nvPr/>
-      </p:nvGrpSpPr>
-      <p:grpSpPr>
-        <a:xfrm>
-          <a:off x="0" y="0"/>
-          <a:ext cx="0" cy="0"/>
-          <a:chOff x="0" y="0"/>
-          <a:chExt cx="0" cy="0"/>
-        </a:xfrm>
-      </p:grpSpPr>
-      <p:sp>
-        <p:nvSpPr>
-          <p:cNvPr id="4" name="Title 3">
-            <a:extLst>
-              <a:ext uri="{FF2B5EF4-FFF2-40B4-BE49-F238E27FC236}">
-                <a16:creationId xmlns:a16="http://schemas.microsoft.com/office/drawing/2014/main" id="{EE13D860-9205-48B1-B675-4421397C217F}"/>
-              </a:ext>
-            </a:extLst>
-          </p:cNvPr>
-          <p:cNvSpPr>
-            <a:spLocks noGrp="1"/>
-          </p:cNvSpPr>
-          <p:nvPr>
-            <p:ph type="title"/>
-          </p:nvPr>
-        </p:nvSpPr>
-        <p:spPr>
-          <a:xfrm>
-            <a:off x="1141413" y="0"/>
-            <a:ext cx="9905998" cy="1478570"/>
-          </a:xfrm>
-        </p:spPr>
-        <p:txBody>
-          <a:bodyPr/>
-          <a:lstStyle/>
-          <a:p>
-            <a:r>
-              <a:rPr lang="en-US" cap="none" dirty="0"/>
-              <a:t>But I can’t test my code because _______________ !</a:t>
-            </a:r>
-          </a:p>
-        </p:txBody>
-      </p:sp>
-      <p:sp>
-        <p:nvSpPr>
-          <p:cNvPr id="3" name="Content Placeholder 2">
-            <a:extLst>
-              <a:ext uri="{FF2B5EF4-FFF2-40B4-BE49-F238E27FC236}">
-                <a16:creationId xmlns:a16="http://schemas.microsoft.com/office/drawing/2014/main" id="{0304F63E-1353-460F-B83E-885EACD53884}"/>
-              </a:ext>
-            </a:extLst>
-          </p:cNvPr>
-          <p:cNvSpPr>
-            <a:spLocks noGrp="1"/>
-          </p:cNvSpPr>
-          <p:nvPr>
-            <p:ph idx="1"/>
-          </p:nvPr>
-        </p:nvSpPr>
-        <p:spPr/>
-        <p:txBody>
-          <a:bodyPr/>
-          <a:lstStyle/>
-          <a:p>
-            <a:pPr marL="0" indent="0">
-              <a:buNone/>
-            </a:pPr>
-            <a:r>
-              <a:rPr lang="en-US" dirty="0"/>
-              <a:t>Some options:</a:t>
-            </a:r>
-            <a:br>
-              <a:rPr lang="en-US" dirty="0"/>
-            </a:br>
-            <a:endParaRPr lang="en-US" dirty="0"/>
-          </a:p>
-          <a:p>
-            <a:pPr marL="457200" indent="-457200">
-              <a:buFont typeface="+mj-lt"/>
-              <a:buAutoNum type="arabicPeriod"/>
-            </a:pPr>
-            <a:r>
-              <a:rPr lang="en-US" dirty="0"/>
-              <a:t>Remove the database dependency via Dependency Injection</a:t>
-            </a:r>
-          </a:p>
-          <a:p>
-            <a:pPr marL="457200" indent="-457200">
-              <a:buFont typeface="+mj-lt"/>
-              <a:buAutoNum type="arabicPeriod"/>
-            </a:pPr>
-            <a:r>
-              <a:rPr lang="en-US" dirty="0"/>
-              <a:t>Use Entity Framework and in-memory database tests</a:t>
-            </a:r>
-          </a:p>
-          <a:p>
-            <a:pPr marL="457200" indent="-457200">
-              <a:buFont typeface="+mj-lt"/>
-              <a:buAutoNum type="arabicPeriod"/>
-            </a:pPr>
-            <a:r>
-              <a:rPr lang="en-US" dirty="0"/>
-              <a:t>Keep talking to the database, but work around the limitation</a:t>
-            </a:r>
-          </a:p>
-        </p:txBody>
-      </p:sp>
-      <p:sp>
-        <p:nvSpPr>
-          <p:cNvPr id="2" name="TextBox 1">
-            <a:extLst>
-              <a:ext uri="{FF2B5EF4-FFF2-40B4-BE49-F238E27FC236}">
-                <a16:creationId xmlns:a16="http://schemas.microsoft.com/office/drawing/2014/main" id="{252166A2-2822-46A3-A3F4-EB7C574EB957}"/>
-              </a:ext>
-            </a:extLst>
-          </p:cNvPr>
-          <p:cNvSpPr txBox="1"/>
-          <p:nvPr/>
-        </p:nvSpPr>
-        <p:spPr>
-          <a:xfrm>
-            <a:off x="7153155" y="539230"/>
-            <a:ext cx="3393878" cy="400110"/>
-          </a:xfrm>
-          <a:prstGeom prst="rect">
-            <a:avLst/>
-          </a:prstGeom>
-          <a:noFill/>
-        </p:spPr>
-        <p:txBody>
-          <a:bodyPr wrap="none" rtlCol="0">
-            <a:spAutoFit/>
-          </a:bodyPr>
-          <a:lstStyle/>
-          <a:p>
-            <a:r>
-              <a:rPr lang="en-US" sz="2000" dirty="0">
-                <a:solidFill>
-                  <a:srgbClr val="FFFF00"/>
-                </a:solidFill>
-                <a:latin typeface="Segoe Script" panose="030B0504020000000003" pitchFamily="66" charset="0"/>
-              </a:rPr>
-              <a:t>Database Dependencies</a:t>
-            </a:r>
-          </a:p>
-        </p:txBody>
-      </p:sp>
-    </p:spTree>
-    <p:extLst>
-      <p:ext uri="{BB962C8B-B14F-4D97-AF65-F5344CB8AC3E}">
-        <p14:creationId xmlns:p14="http://schemas.microsoft.com/office/powerpoint/2010/main" val="1040069708"/>
-      </p:ext>
-    </p:extLst>
-  </p:cSld>
-  <p:clrMapOvr>
-    <a:masterClrMapping/>
-  </p:clrMapOvr>
-  <p:timing>
-    <p:tnLst>
-      <p:par>
-        <p:cTn id="1" dur="indefinite" restart="never" nodeType="tmRoot">
-          <p:childTnLst>
-            <p:seq concurrent="1" nextAc="seek">
-              <p:cTn id="2" dur="indefinite" nodeType="mainSeq">
-                <p:childTnLst>
-                  <p:par>
-                    <p:cTn id="3" fill="hold">
-                      <p:stCondLst>
-                        <p:cond delay="indefinite"/>
-                        <p:cond evt="onBegin" delay="0">
-                          <p:tn val="2"/>
-                        </p:cond>
-                      </p:stCondLst>
-                      <p:childTnLst>
-                        <p:par>
-                          <p:cTn id="4" fill="hold">
-                            <p:stCondLst>
-                              <p:cond delay="0"/>
-                            </p:stCondLst>
-                            <p:childTnLst>
-                              <p:par>
-                                <p:cTn id="5" presetID="1" presetClass="entr" presetSubtype="0" fill="hold" grpId="0" nodeType="withEffect">
-                                  <p:stCondLst>
-                                    <p:cond delay="0"/>
-                                  </p:stCondLst>
-                                  <p:childTnLst>
-                                    <p:set>
-                                      <p:cBhvr>
-                                        <p:cTn id="6" dur="1" fill="hold">
-                                          <p:stCondLst>
-                                            <p:cond delay="0"/>
-                                          </p:stCondLst>
-                                        </p:cTn>
-                                        <p:tgtEl>
-                                          <p:spTgt spid="3">
-                                            <p:txEl>
-                                              <p:pRg st="0" end="0"/>
-                                            </p:txEl>
-                                          </p:spTgt>
-                                        </p:tgtEl>
-                                        <p:attrNameLst>
-                                          <p:attrName>style.visibility</p:attrName>
-                                        </p:attrNameLst>
-                                      </p:cBhvr>
-                                      <p:to>
-                                        <p:strVal val="visible"/>
-                                      </p:to>
-                                    </p:set>
-                                  </p:childTnLst>
-                                </p:cTn>
-                              </p:par>
-                            </p:childTnLst>
-                          </p:cTn>
-                        </p:par>
-                      </p:childTnLst>
-                    </p:cTn>
-                  </p:par>
-                  <p:par>
-                    <p:cTn id="7" fill="hold">
-                      <p:stCondLst>
-                        <p:cond delay="indefinite"/>
-                      </p:stCondLst>
-                      <p:childTnLst>
-                        <p:par>
-                          <p:cTn id="8" fill="hold">
-                            <p:stCondLst>
-                              <p:cond delay="0"/>
-                            </p:stCondLst>
-                            <p:childTnLst>
-                              <p:par>
-                                <p:cTn id="9" presetID="1" presetClass="entr" presetSubtype="0" fill="hold" grpId="0" nodeType="clickEffect">
-                                  <p:stCondLst>
-                                    <p:cond delay="0"/>
-                                  </p:stCondLst>
-                                  <p:childTnLst>
-                                    <p:set>
-                                      <p:cBhvr>
-                                        <p:cTn id="10" dur="1" fill="hold">
-                                          <p:stCondLst>
-                                            <p:cond delay="0"/>
-                                          </p:stCondLst>
-                                        </p:cTn>
-                                        <p:tgtEl>
-                                          <p:spTgt spid="3">
-                                            <p:txEl>
-                                              <p:pRg st="1" end="1"/>
-                                            </p:txEl>
-                                          </p:spTgt>
-                                        </p:tgtEl>
-                                        <p:attrNameLst>
-                                          <p:attrName>style.visibility</p:attrName>
-                                        </p:attrNameLst>
-                                      </p:cBhvr>
-                                      <p:to>
-                                        <p:strVal val="visible"/>
-                                      </p:to>
-                                    </p:set>
-                                  </p:childTnLst>
-                                </p:cTn>
-                              </p:par>
-                            </p:childTnLst>
-                          </p:cTn>
-                        </p:par>
-                      </p:childTnLst>
-                    </p:cTn>
-                  </p:par>
-                  <p:par>
-                    <p:cTn id="11" fill="hold">
-                      <p:stCondLst>
-                        <p:cond delay="indefinite"/>
-                      </p:stCondLst>
-                      <p:childTnLst>
-                        <p:par>
-                          <p:cTn id="12" fill="hold">
-                            <p:stCondLst>
-                              <p:cond delay="0"/>
-                            </p:stCondLst>
-                            <p:childTnLst>
-                              <p:par>
-                                <p:cTn id="13" presetID="1" presetClass="entr" presetSubtype="0" fill="hold" grpId="0" nodeType="clickEffect">
-                                  <p:stCondLst>
-                                    <p:cond delay="0"/>
-                                  </p:stCondLst>
-                                  <p:childTnLst>
-                                    <p:set>
-                                      <p:cBhvr>
-                                        <p:cTn id="14" dur="1" fill="hold">
-                                          <p:stCondLst>
-                                            <p:cond delay="0"/>
-                                          </p:stCondLst>
-                                        </p:cTn>
-                                        <p:tgtEl>
-                                          <p:spTgt spid="3">
-                                            <p:txEl>
-                                              <p:pRg st="2" end="2"/>
-                                            </p:txEl>
-                                          </p:spTgt>
-                                        </p:tgtEl>
-                                        <p:attrNameLst>
-                                          <p:attrName>style.visibility</p:attrName>
-                                        </p:attrNameLst>
-                                      </p:cBhvr>
-                                      <p:to>
-                                        <p:strVal val="visible"/>
-                                      </p:to>
-                                    </p:set>
-                                  </p:childTnLst>
-                                </p:cTn>
-                              </p:par>
-                            </p:childTnLst>
-                          </p:cTn>
-                        </p:par>
-                      </p:childTnLst>
-                    </p:cTn>
-                  </p:par>
-                  <p:par>
-                    <p:cTn id="15" fill="hold">
-                      <p:stCondLst>
-                        <p:cond delay="indefinite"/>
-                      </p:stCondLst>
-                      <p:childTnLst>
-                        <p:par>
-                          <p:cTn id="16" fill="hold">
-                            <p:stCondLst>
-                              <p:cond delay="0"/>
-                            </p:stCondLst>
-                            <p:childTnLst>
-                              <p:par>
-                                <p:cTn id="17" presetID="1" presetClass="entr" presetSubtype="0" fill="hold" grpId="0" nodeType="clickEffect">
-                                  <p:stCondLst>
-                                    <p:cond delay="0"/>
-                                  </p:stCondLst>
-                                  <p:childTnLst>
-                                    <p:set>
-                                      <p:cBhvr>
-                                        <p:cTn id="18" dur="1" fill="hold">
-                                          <p:stCondLst>
-                                            <p:cond delay="0"/>
-                                          </p:stCondLst>
-                                        </p:cTn>
-                                        <p:tgtEl>
-                                          <p:spTgt spid="3">
-                                            <p:txEl>
-                                              <p:pRg st="3" end="3"/>
-                                            </p:txEl>
-                                          </p:spTgt>
-                                        </p:tgtEl>
-                                        <p:attrNameLst>
-                                          <p:attrName>style.visibility</p:attrName>
-                                        </p:attrNameLst>
-                                      </p:cBhvr>
-                                      <p:to>
-                                        <p:strVal val="visible"/>
-                                      </p:to>
-                                    </p:set>
-                                  </p:childTnLst>
-                                </p:cTn>
-                              </p:par>
-                            </p:childTnLst>
-                          </p:cTn>
-                        </p:par>
-                      </p:childTnLst>
-                    </p:cTn>
-                  </p:par>
-                </p:childTnLst>
-              </p:cTn>
-              <p:prevCondLst>
-                <p:cond evt="onPrev" delay="0">
-                  <p:tgtEl>
-                    <p:sldTgt/>
-                  </p:tgtEl>
-                </p:cond>
-              </p:prevCondLst>
-              <p:nextCondLst>
-                <p:cond evt="onNext" delay="0">
-                  <p:tgtEl>
-                    <p:sldTgt/>
-                  </p:tgtEl>
-                </p:cond>
-              </p:nextCondLst>
-            </p:seq>
-          </p:childTnLst>
-        </p:cTn>
-      </p:par>
-    </p:tnLst>
-    <p:bldLst>
-      <p:bldP spid="3" grpId="0" uiExpand="1" build="p"/>
-    </p:bldLst>
-  </p:timing>
-</p:sld>
-</file>
-
-<file path=ppt/slides/slide21.xml><?xml version="1.0" encoding="utf-8"?>
+<file path=ppt/slides/slide18.xml><?xml version="1.0" encoding="utf-8"?>
 <p:sld xmlns:a="http://schemas.openxmlformats.org/drawingml/2006/main" xmlns:r="http://schemas.openxmlformats.org/officeDocument/2006/relationships" xmlns:p="http://schemas.openxmlformats.org/presentationml/2006/main">
   <p:cSld>
     <p:spTree>
@@ -30622,7 +29752,1374 @@
 </p:sld>
 </file>
 
+<file path=ppt/slides/slide19.xml><?xml version="1.0" encoding="utf-8"?>
+<p:sld xmlns:a="http://schemas.openxmlformats.org/drawingml/2006/main" xmlns:r="http://schemas.openxmlformats.org/officeDocument/2006/relationships" xmlns:p="http://schemas.openxmlformats.org/presentationml/2006/main">
+  <p:cSld>
+    <p:spTree>
+      <p:nvGrpSpPr>
+        <p:cNvPr id="1" name=""/>
+        <p:cNvGrpSpPr/>
+        <p:nvPr/>
+      </p:nvGrpSpPr>
+      <p:grpSpPr>
+        <a:xfrm>
+          <a:off x="0" y="0"/>
+          <a:ext cx="0" cy="0"/>
+          <a:chOff x="0" y="0"/>
+          <a:chExt cx="0" cy="0"/>
+        </a:xfrm>
+      </p:grpSpPr>
+      <p:sp>
+        <p:nvSpPr>
+          <p:cNvPr id="4" name="Title 3">
+            <a:extLst>
+              <a:ext uri="{FF2B5EF4-FFF2-40B4-BE49-F238E27FC236}">
+                <a16:creationId xmlns:a16="http://schemas.microsoft.com/office/drawing/2014/main" id="{EE13D860-9205-48B1-B675-4421397C217F}"/>
+              </a:ext>
+            </a:extLst>
+          </p:cNvPr>
+          <p:cNvSpPr>
+            <a:spLocks noGrp="1"/>
+          </p:cNvSpPr>
+          <p:nvPr>
+            <p:ph type="title"/>
+          </p:nvPr>
+        </p:nvSpPr>
+        <p:spPr>
+          <a:xfrm>
+            <a:off x="1141413" y="0"/>
+            <a:ext cx="9905998" cy="1478570"/>
+          </a:xfrm>
+        </p:spPr>
+        <p:txBody>
+          <a:bodyPr/>
+          <a:lstStyle/>
+          <a:p>
+            <a:r>
+              <a:rPr lang="en-US" cap="none" dirty="0"/>
+              <a:t>But I can’t test my code because _______________ !</a:t>
+            </a:r>
+          </a:p>
+        </p:txBody>
+      </p:sp>
+      <p:sp>
+        <p:nvSpPr>
+          <p:cNvPr id="3" name="Content Placeholder 2">
+            <a:extLst>
+              <a:ext uri="{FF2B5EF4-FFF2-40B4-BE49-F238E27FC236}">
+                <a16:creationId xmlns:a16="http://schemas.microsoft.com/office/drawing/2014/main" id="{0304F63E-1353-460F-B83E-885EACD53884}"/>
+              </a:ext>
+            </a:extLst>
+          </p:cNvPr>
+          <p:cNvSpPr>
+            <a:spLocks noGrp="1"/>
+          </p:cNvSpPr>
+          <p:nvPr>
+            <p:ph idx="1"/>
+          </p:nvPr>
+        </p:nvSpPr>
+        <p:spPr/>
+        <p:txBody>
+          <a:bodyPr/>
+          <a:lstStyle/>
+          <a:p>
+            <a:pPr marL="0" indent="0">
+              <a:buNone/>
+            </a:pPr>
+            <a:r>
+              <a:rPr lang="en-US" dirty="0"/>
+              <a:t>Some options:</a:t>
+            </a:r>
+            <a:br>
+              <a:rPr lang="en-US" dirty="0"/>
+            </a:br>
+            <a:endParaRPr lang="en-US" dirty="0"/>
+          </a:p>
+          <a:p>
+            <a:pPr marL="457200" indent="-457200">
+              <a:buFont typeface="+mj-lt"/>
+              <a:buAutoNum type="arabicPeriod"/>
+            </a:pPr>
+            <a:r>
+              <a:rPr lang="en-US" dirty="0"/>
+              <a:t>Remove the database dependency via Dependency Injection</a:t>
+            </a:r>
+          </a:p>
+          <a:p>
+            <a:pPr marL="457200" indent="-457200">
+              <a:buFont typeface="+mj-lt"/>
+              <a:buAutoNum type="arabicPeriod"/>
+            </a:pPr>
+            <a:r>
+              <a:rPr lang="en-US" dirty="0"/>
+              <a:t>Use Entity Framework and in-memory database tests</a:t>
+            </a:r>
+          </a:p>
+          <a:p>
+            <a:pPr marL="457200" indent="-457200">
+              <a:buFont typeface="+mj-lt"/>
+              <a:buAutoNum type="arabicPeriod"/>
+            </a:pPr>
+            <a:r>
+              <a:rPr lang="en-US" dirty="0"/>
+              <a:t>Keep talking to the database, but work around the limitation</a:t>
+            </a:r>
+          </a:p>
+        </p:txBody>
+      </p:sp>
+      <p:sp>
+        <p:nvSpPr>
+          <p:cNvPr id="2" name="TextBox 1">
+            <a:extLst>
+              <a:ext uri="{FF2B5EF4-FFF2-40B4-BE49-F238E27FC236}">
+                <a16:creationId xmlns:a16="http://schemas.microsoft.com/office/drawing/2014/main" id="{252166A2-2822-46A3-A3F4-EB7C574EB957}"/>
+              </a:ext>
+            </a:extLst>
+          </p:cNvPr>
+          <p:cNvSpPr txBox="1"/>
+          <p:nvPr/>
+        </p:nvSpPr>
+        <p:spPr>
+          <a:xfrm>
+            <a:off x="7153155" y="539230"/>
+            <a:ext cx="3393878" cy="400110"/>
+          </a:xfrm>
+          <a:prstGeom prst="rect">
+            <a:avLst/>
+          </a:prstGeom>
+          <a:noFill/>
+        </p:spPr>
+        <p:txBody>
+          <a:bodyPr wrap="none" rtlCol="0">
+            <a:spAutoFit/>
+          </a:bodyPr>
+          <a:lstStyle/>
+          <a:p>
+            <a:r>
+              <a:rPr lang="en-US" sz="2000" dirty="0">
+                <a:solidFill>
+                  <a:srgbClr val="FFFF00"/>
+                </a:solidFill>
+                <a:latin typeface="Segoe Script" panose="030B0504020000000003" pitchFamily="66" charset="0"/>
+              </a:rPr>
+              <a:t>Database Dependencies</a:t>
+            </a:r>
+          </a:p>
+        </p:txBody>
+      </p:sp>
+    </p:spTree>
+    <p:extLst>
+      <p:ext uri="{BB962C8B-B14F-4D97-AF65-F5344CB8AC3E}">
+        <p14:creationId xmlns:p14="http://schemas.microsoft.com/office/powerpoint/2010/main" val="1040069708"/>
+      </p:ext>
+    </p:extLst>
+  </p:cSld>
+  <p:clrMapOvr>
+    <a:masterClrMapping/>
+  </p:clrMapOvr>
+  <p:timing>
+    <p:tnLst>
+      <p:par>
+        <p:cTn id="1" dur="indefinite" restart="never" nodeType="tmRoot">
+          <p:childTnLst>
+            <p:seq concurrent="1" nextAc="seek">
+              <p:cTn id="2" dur="indefinite" nodeType="mainSeq">
+                <p:childTnLst>
+                  <p:par>
+                    <p:cTn id="3" fill="hold">
+                      <p:stCondLst>
+                        <p:cond delay="indefinite"/>
+                        <p:cond evt="onBegin" delay="0">
+                          <p:tn val="2"/>
+                        </p:cond>
+                      </p:stCondLst>
+                      <p:childTnLst>
+                        <p:par>
+                          <p:cTn id="4" fill="hold">
+                            <p:stCondLst>
+                              <p:cond delay="0"/>
+                            </p:stCondLst>
+                            <p:childTnLst>
+                              <p:par>
+                                <p:cTn id="5" presetID="1" presetClass="entr" presetSubtype="0" fill="hold" grpId="0" nodeType="withEffect">
+                                  <p:stCondLst>
+                                    <p:cond delay="0"/>
+                                  </p:stCondLst>
+                                  <p:childTnLst>
+                                    <p:set>
+                                      <p:cBhvr>
+                                        <p:cTn id="6" dur="1" fill="hold">
+                                          <p:stCondLst>
+                                            <p:cond delay="0"/>
+                                          </p:stCondLst>
+                                        </p:cTn>
+                                        <p:tgtEl>
+                                          <p:spTgt spid="3">
+                                            <p:txEl>
+                                              <p:pRg st="0" end="0"/>
+                                            </p:txEl>
+                                          </p:spTgt>
+                                        </p:tgtEl>
+                                        <p:attrNameLst>
+                                          <p:attrName>style.visibility</p:attrName>
+                                        </p:attrNameLst>
+                                      </p:cBhvr>
+                                      <p:to>
+                                        <p:strVal val="visible"/>
+                                      </p:to>
+                                    </p:set>
+                                  </p:childTnLst>
+                                </p:cTn>
+                              </p:par>
+                            </p:childTnLst>
+                          </p:cTn>
+                        </p:par>
+                      </p:childTnLst>
+                    </p:cTn>
+                  </p:par>
+                  <p:par>
+                    <p:cTn id="7" fill="hold">
+                      <p:stCondLst>
+                        <p:cond delay="indefinite"/>
+                      </p:stCondLst>
+                      <p:childTnLst>
+                        <p:par>
+                          <p:cTn id="8" fill="hold">
+                            <p:stCondLst>
+                              <p:cond delay="0"/>
+                            </p:stCondLst>
+                            <p:childTnLst>
+                              <p:par>
+                                <p:cTn id="9" presetID="1" presetClass="entr" presetSubtype="0" fill="hold" grpId="0" nodeType="clickEffect">
+                                  <p:stCondLst>
+                                    <p:cond delay="0"/>
+                                  </p:stCondLst>
+                                  <p:childTnLst>
+                                    <p:set>
+                                      <p:cBhvr>
+                                        <p:cTn id="10" dur="1" fill="hold">
+                                          <p:stCondLst>
+                                            <p:cond delay="0"/>
+                                          </p:stCondLst>
+                                        </p:cTn>
+                                        <p:tgtEl>
+                                          <p:spTgt spid="3">
+                                            <p:txEl>
+                                              <p:pRg st="1" end="1"/>
+                                            </p:txEl>
+                                          </p:spTgt>
+                                        </p:tgtEl>
+                                        <p:attrNameLst>
+                                          <p:attrName>style.visibility</p:attrName>
+                                        </p:attrNameLst>
+                                      </p:cBhvr>
+                                      <p:to>
+                                        <p:strVal val="visible"/>
+                                      </p:to>
+                                    </p:set>
+                                  </p:childTnLst>
+                                </p:cTn>
+                              </p:par>
+                            </p:childTnLst>
+                          </p:cTn>
+                        </p:par>
+                      </p:childTnLst>
+                    </p:cTn>
+                  </p:par>
+                  <p:par>
+                    <p:cTn id="11" fill="hold">
+                      <p:stCondLst>
+                        <p:cond delay="indefinite"/>
+                      </p:stCondLst>
+                      <p:childTnLst>
+                        <p:par>
+                          <p:cTn id="12" fill="hold">
+                            <p:stCondLst>
+                              <p:cond delay="0"/>
+                            </p:stCondLst>
+                            <p:childTnLst>
+                              <p:par>
+                                <p:cTn id="13" presetID="1" presetClass="entr" presetSubtype="0" fill="hold" grpId="0" nodeType="clickEffect">
+                                  <p:stCondLst>
+                                    <p:cond delay="0"/>
+                                  </p:stCondLst>
+                                  <p:childTnLst>
+                                    <p:set>
+                                      <p:cBhvr>
+                                        <p:cTn id="14" dur="1" fill="hold">
+                                          <p:stCondLst>
+                                            <p:cond delay="0"/>
+                                          </p:stCondLst>
+                                        </p:cTn>
+                                        <p:tgtEl>
+                                          <p:spTgt spid="3">
+                                            <p:txEl>
+                                              <p:pRg st="2" end="2"/>
+                                            </p:txEl>
+                                          </p:spTgt>
+                                        </p:tgtEl>
+                                        <p:attrNameLst>
+                                          <p:attrName>style.visibility</p:attrName>
+                                        </p:attrNameLst>
+                                      </p:cBhvr>
+                                      <p:to>
+                                        <p:strVal val="visible"/>
+                                      </p:to>
+                                    </p:set>
+                                  </p:childTnLst>
+                                </p:cTn>
+                              </p:par>
+                            </p:childTnLst>
+                          </p:cTn>
+                        </p:par>
+                      </p:childTnLst>
+                    </p:cTn>
+                  </p:par>
+                  <p:par>
+                    <p:cTn id="15" fill="hold">
+                      <p:stCondLst>
+                        <p:cond delay="indefinite"/>
+                      </p:stCondLst>
+                      <p:childTnLst>
+                        <p:par>
+                          <p:cTn id="16" fill="hold">
+                            <p:stCondLst>
+                              <p:cond delay="0"/>
+                            </p:stCondLst>
+                            <p:childTnLst>
+                              <p:par>
+                                <p:cTn id="17" presetID="1" presetClass="entr" presetSubtype="0" fill="hold" grpId="0" nodeType="clickEffect">
+                                  <p:stCondLst>
+                                    <p:cond delay="0"/>
+                                  </p:stCondLst>
+                                  <p:childTnLst>
+                                    <p:set>
+                                      <p:cBhvr>
+                                        <p:cTn id="18" dur="1" fill="hold">
+                                          <p:stCondLst>
+                                            <p:cond delay="0"/>
+                                          </p:stCondLst>
+                                        </p:cTn>
+                                        <p:tgtEl>
+                                          <p:spTgt spid="3">
+                                            <p:txEl>
+                                              <p:pRg st="3" end="3"/>
+                                            </p:txEl>
+                                          </p:spTgt>
+                                        </p:tgtEl>
+                                        <p:attrNameLst>
+                                          <p:attrName>style.visibility</p:attrName>
+                                        </p:attrNameLst>
+                                      </p:cBhvr>
+                                      <p:to>
+                                        <p:strVal val="visible"/>
+                                      </p:to>
+                                    </p:set>
+                                  </p:childTnLst>
+                                </p:cTn>
+                              </p:par>
+                            </p:childTnLst>
+                          </p:cTn>
+                        </p:par>
+                      </p:childTnLst>
+                    </p:cTn>
+                  </p:par>
+                </p:childTnLst>
+              </p:cTn>
+              <p:prevCondLst>
+                <p:cond evt="onPrev" delay="0">
+                  <p:tgtEl>
+                    <p:sldTgt/>
+                  </p:tgtEl>
+                </p:cond>
+              </p:prevCondLst>
+              <p:nextCondLst>
+                <p:cond evt="onNext" delay="0">
+                  <p:tgtEl>
+                    <p:sldTgt/>
+                  </p:tgtEl>
+                </p:cond>
+              </p:nextCondLst>
+            </p:seq>
+          </p:childTnLst>
+        </p:cTn>
+      </p:par>
+    </p:tnLst>
+    <p:bldLst>
+      <p:bldP spid="3" grpId="0" uiExpand="1" build="p"/>
+    </p:bldLst>
+  </p:timing>
+</p:sld>
+</file>
+
+<file path=ppt/slides/slide2.xml><?xml version="1.0" encoding="utf-8"?>
+<p:sld xmlns:a="http://schemas.openxmlformats.org/drawingml/2006/main" xmlns:r="http://schemas.openxmlformats.org/officeDocument/2006/relationships" xmlns:p="http://schemas.openxmlformats.org/presentationml/2006/main">
+  <p:cSld>
+    <p:spTree>
+      <p:nvGrpSpPr>
+        <p:cNvPr id="1" name=""/>
+        <p:cNvGrpSpPr/>
+        <p:nvPr/>
+      </p:nvGrpSpPr>
+      <p:grpSpPr>
+        <a:xfrm>
+          <a:off x="0" y="0"/>
+          <a:ext cx="0" cy="0"/>
+          <a:chOff x="0" y="0"/>
+          <a:chExt cx="0" cy="0"/>
+        </a:xfrm>
+      </p:grpSpPr>
+      <p:sp>
+        <p:nvSpPr>
+          <p:cNvPr id="2" name="Title 1">
+            <a:extLst>
+              <a:ext uri="{FF2B5EF4-FFF2-40B4-BE49-F238E27FC236}">
+                <a16:creationId xmlns:a16="http://schemas.microsoft.com/office/drawing/2014/main" id="{A2AA7CC2-6F2A-49F6-8BC3-602F91F4C2B7}"/>
+              </a:ext>
+            </a:extLst>
+          </p:cNvPr>
+          <p:cNvSpPr>
+            <a:spLocks noGrp="1"/>
+          </p:cNvSpPr>
+          <p:nvPr>
+            <p:ph type="title"/>
+          </p:nvPr>
+        </p:nvSpPr>
+        <p:spPr/>
+        <p:txBody>
+          <a:bodyPr/>
+          <a:lstStyle/>
+          <a:p>
+            <a:r>
+              <a:rPr lang="en-US" cap="none" dirty="0"/>
+              <a:t>About Me</a:t>
+            </a:r>
+          </a:p>
+        </p:txBody>
+      </p:sp>
+      <p:sp>
+        <p:nvSpPr>
+          <p:cNvPr id="3" name="Content Placeholder 2">
+            <a:extLst>
+              <a:ext uri="{FF2B5EF4-FFF2-40B4-BE49-F238E27FC236}">
+                <a16:creationId xmlns:a16="http://schemas.microsoft.com/office/drawing/2014/main" id="{69009204-086E-4F23-9F4B-ABDA3AD423AD}"/>
+              </a:ext>
+            </a:extLst>
+          </p:cNvPr>
+          <p:cNvSpPr>
+            <a:spLocks noGrp="1"/>
+          </p:cNvSpPr>
+          <p:nvPr>
+            <p:ph idx="1"/>
+          </p:nvPr>
+        </p:nvSpPr>
+        <p:spPr/>
+        <p:txBody>
+          <a:bodyPr>
+            <a:normAutofit/>
+          </a:bodyPr>
+          <a:lstStyle/>
+          <a:p>
+            <a:r>
+              <a:rPr lang="en-US" dirty="0"/>
+              <a:t>.NET / TypeScript / Angular Developer turned Manager / Mentor</a:t>
+            </a:r>
+          </a:p>
+          <a:p>
+            <a:r>
+              <a:rPr lang="en-US" dirty="0"/>
+              <a:t>Programming</a:t>
+            </a:r>
+          </a:p>
+          <a:p>
+            <a:pPr lvl="1"/>
+            <a:r>
+              <a:rPr lang="en-US" dirty="0"/>
+              <a:t>For fun since 1987</a:t>
+            </a:r>
+          </a:p>
+          <a:p>
+            <a:pPr lvl="1"/>
+            <a:r>
+              <a:rPr lang="en-US" dirty="0"/>
+              <a:t>.NET since 2001 (Beta 2)</a:t>
+            </a:r>
+          </a:p>
+          <a:p>
+            <a:pPr lvl="1"/>
+            <a:r>
+              <a:rPr lang="en-US" dirty="0"/>
+              <a:t>Professionally since 2006</a:t>
+            </a:r>
+          </a:p>
+          <a:p>
+            <a:r>
+              <a:rPr lang="en-US" dirty="0"/>
+              <a:t>Addicted to Reading and Refactoring</a:t>
+            </a:r>
+          </a:p>
+        </p:txBody>
+      </p:sp>
+    </p:spTree>
+    <p:extLst>
+      <p:ext uri="{BB962C8B-B14F-4D97-AF65-F5344CB8AC3E}">
+        <p14:creationId xmlns:p14="http://schemas.microsoft.com/office/powerpoint/2010/main" val="3867719309"/>
+      </p:ext>
+    </p:extLst>
+  </p:cSld>
+  <p:clrMapOvr>
+    <a:masterClrMapping/>
+  </p:clrMapOvr>
+</p:sld>
+</file>
+
+<file path=ppt/slides/slide20.xml><?xml version="1.0" encoding="utf-8"?>
+<p:sld xmlns:a="http://schemas.openxmlformats.org/drawingml/2006/main" xmlns:r="http://schemas.openxmlformats.org/officeDocument/2006/relationships" xmlns:p="http://schemas.openxmlformats.org/presentationml/2006/main">
+  <p:cSld>
+    <p:spTree>
+      <p:nvGrpSpPr>
+        <p:cNvPr id="1" name=""/>
+        <p:cNvGrpSpPr/>
+        <p:nvPr/>
+      </p:nvGrpSpPr>
+      <p:grpSpPr>
+        <a:xfrm>
+          <a:off x="0" y="0"/>
+          <a:ext cx="0" cy="0"/>
+          <a:chOff x="0" y="0"/>
+          <a:chExt cx="0" cy="0"/>
+        </a:xfrm>
+      </p:grpSpPr>
+      <p:sp>
+        <p:nvSpPr>
+          <p:cNvPr id="3" name="Content Placeholder 2">
+            <a:extLst>
+              <a:ext uri="{FF2B5EF4-FFF2-40B4-BE49-F238E27FC236}">
+                <a16:creationId xmlns:a16="http://schemas.microsoft.com/office/drawing/2014/main" id="{0304F63E-1353-460F-B83E-885EACD53884}"/>
+              </a:ext>
+            </a:extLst>
+          </p:cNvPr>
+          <p:cNvSpPr>
+            <a:spLocks noGrp="1"/>
+          </p:cNvSpPr>
+          <p:nvPr>
+            <p:ph idx="1"/>
+          </p:nvPr>
+        </p:nvSpPr>
+        <p:spPr/>
+        <p:txBody>
+          <a:bodyPr/>
+          <a:lstStyle/>
+          <a:p>
+            <a:pPr marL="0" indent="0">
+              <a:buNone/>
+            </a:pPr>
+            <a:endParaRPr lang="en-US" dirty="0"/>
+          </a:p>
+        </p:txBody>
+      </p:sp>
+      <p:sp>
+        <p:nvSpPr>
+          <p:cNvPr id="7" name="Title 3">
+            <a:extLst>
+              <a:ext uri="{FF2B5EF4-FFF2-40B4-BE49-F238E27FC236}">
+                <a16:creationId xmlns:a16="http://schemas.microsoft.com/office/drawing/2014/main" id="{52938955-97A5-4C9C-A845-477E02A43E20}"/>
+              </a:ext>
+            </a:extLst>
+          </p:cNvPr>
+          <p:cNvSpPr txBox="1">
+            <a:spLocks/>
+          </p:cNvSpPr>
+          <p:nvPr/>
+        </p:nvSpPr>
+        <p:spPr>
+          <a:xfrm>
+            <a:off x="1143001" y="0"/>
+            <a:ext cx="9905998" cy="1478570"/>
+          </a:xfrm>
+          <a:prstGeom prst="rect">
+            <a:avLst/>
+          </a:prstGeom>
+        </p:spPr>
+        <p:txBody>
+          <a:bodyPr vert="horz" lIns="91440" tIns="45720" rIns="91440" bIns="45720" rtlCol="0" anchor="ctr">
+            <a:normAutofit/>
+          </a:bodyPr>
+          <a:lstStyle>
+            <a:lvl1pPr algn="l" defTabSz="914400" rtl="0" eaLnBrk="1" latinLnBrk="0" hangingPunct="1">
+              <a:lnSpc>
+                <a:spcPct val="90000"/>
+              </a:lnSpc>
+              <a:spcBef>
+                <a:spcPct val="0"/>
+              </a:spcBef>
+              <a:buNone/>
+              <a:defRPr sz="3600" kern="1200" cap="all" baseline="0">
+                <a:solidFill>
+                  <a:schemeClr val="tx1"/>
+                </a:solidFill>
+                <a:effectLst>
+                  <a:outerShdw blurRad="177800" dist="38100" dir="2700000" algn="tl">
+                    <a:srgbClr val="000000">
+                      <a:alpha val="24000"/>
+                    </a:srgbClr>
+                  </a:outerShdw>
+                </a:effectLst>
+                <a:latin typeface="+mj-lt"/>
+                <a:ea typeface="+mj-ea"/>
+                <a:cs typeface="+mj-cs"/>
+              </a:defRPr>
+            </a:lvl1pPr>
+          </a:lstStyle>
+          <a:p>
+            <a:r>
+              <a:rPr lang="en-US" cap="none" dirty="0"/>
+              <a:t>Removing Database Dependencies Example</a:t>
+            </a:r>
+          </a:p>
+        </p:txBody>
+      </p:sp>
+      <p:pic>
+        <p:nvPicPr>
+          <p:cNvPr id="9" name="Picture 8">
+            <a:extLst>
+              <a:ext uri="{FF2B5EF4-FFF2-40B4-BE49-F238E27FC236}">
+                <a16:creationId xmlns:a16="http://schemas.microsoft.com/office/drawing/2014/main" id="{BB2A5DE8-437A-4C61-B713-E7B2F549063F}"/>
+              </a:ext>
+            </a:extLst>
+          </p:cNvPr>
+          <p:cNvPicPr>
+            <a:picLocks noChangeAspect="1"/>
+          </p:cNvPicPr>
+          <p:nvPr/>
+        </p:nvPicPr>
+        <p:blipFill>
+          <a:blip r:embed="rId2"/>
+          <a:stretch>
+            <a:fillRect/>
+          </a:stretch>
+        </p:blipFill>
+        <p:spPr>
+          <a:xfrm>
+            <a:off x="488065" y="1794076"/>
+            <a:ext cx="11215869" cy="4398380"/>
+          </a:xfrm>
+          <a:prstGeom prst="rect">
+            <a:avLst/>
+          </a:prstGeom>
+          <a:ln w="38100" cap="sq">
+            <a:solidFill>
+              <a:srgbClr val="000000"/>
+            </a:solidFill>
+            <a:prstDash val="solid"/>
+            <a:miter lim="800000"/>
+          </a:ln>
+          <a:effectLst>
+            <a:outerShdw blurRad="50800" dist="38100" dir="2700000" algn="tl" rotWithShape="0">
+              <a:srgbClr val="000000">
+                <a:alpha val="43000"/>
+              </a:srgbClr>
+            </a:outerShdw>
+          </a:effectLst>
+        </p:spPr>
+      </p:pic>
+      <p:pic>
+        <p:nvPicPr>
+          <p:cNvPr id="10" name="Picture 9">
+            <a:extLst>
+              <a:ext uri="{FF2B5EF4-FFF2-40B4-BE49-F238E27FC236}">
+                <a16:creationId xmlns:a16="http://schemas.microsoft.com/office/drawing/2014/main" id="{1C0DB0F4-D2E9-431A-A21E-3EDD8A9CF626}"/>
+              </a:ext>
+            </a:extLst>
+          </p:cNvPr>
+          <p:cNvPicPr>
+            <a:picLocks noChangeAspect="1"/>
+          </p:cNvPicPr>
+          <p:nvPr/>
+        </p:nvPicPr>
+        <p:blipFill>
+          <a:blip r:embed="rId3"/>
+          <a:stretch>
+            <a:fillRect/>
+          </a:stretch>
+        </p:blipFill>
+        <p:spPr>
+          <a:xfrm>
+            <a:off x="7765180" y="1223962"/>
+            <a:ext cx="4105275" cy="1209675"/>
+          </a:xfrm>
+          <a:prstGeom prst="rect">
+            <a:avLst/>
+          </a:prstGeom>
+          <a:ln w="38100" cap="sq">
+            <a:solidFill>
+              <a:srgbClr val="000000"/>
+            </a:solidFill>
+            <a:prstDash val="solid"/>
+            <a:miter lim="800000"/>
+          </a:ln>
+          <a:effectLst>
+            <a:outerShdw blurRad="50800" dist="38100" dir="2700000" algn="tl" rotWithShape="0">
+              <a:srgbClr val="000000">
+                <a:alpha val="43000"/>
+              </a:srgbClr>
+            </a:outerShdw>
+          </a:effectLst>
+        </p:spPr>
+      </p:pic>
+    </p:spTree>
+    <p:extLst>
+      <p:ext uri="{BB962C8B-B14F-4D97-AF65-F5344CB8AC3E}">
+        <p14:creationId xmlns:p14="http://schemas.microsoft.com/office/powerpoint/2010/main" val="3998300610"/>
+      </p:ext>
+    </p:extLst>
+  </p:cSld>
+  <p:clrMapOvr>
+    <a:masterClrMapping/>
+  </p:clrMapOvr>
+  <p:timing>
+    <p:tnLst>
+      <p:par>
+        <p:cTn id="1" dur="indefinite" restart="never" nodeType="tmRoot">
+          <p:childTnLst>
+            <p:seq concurrent="1" nextAc="seek">
+              <p:cTn id="2" dur="indefinite" nodeType="mainSeq">
+                <p:childTnLst>
+                  <p:par>
+                    <p:cTn id="3" fill="hold">
+                      <p:stCondLst>
+                        <p:cond delay="indefinite"/>
+                      </p:stCondLst>
+                      <p:childTnLst>
+                        <p:par>
+                          <p:cTn id="4" fill="hold">
+                            <p:stCondLst>
+                              <p:cond delay="0"/>
+                            </p:stCondLst>
+                            <p:childTnLst>
+                              <p:par>
+                                <p:cTn id="5" presetID="1" presetClass="entr" presetSubtype="0" fill="hold" nodeType="clickEffect">
+                                  <p:stCondLst>
+                                    <p:cond delay="0"/>
+                                  </p:stCondLst>
+                                  <p:childTnLst>
+                                    <p:set>
+                                      <p:cBhvr>
+                                        <p:cTn id="6" dur="1" fill="hold">
+                                          <p:stCondLst>
+                                            <p:cond delay="0"/>
+                                          </p:stCondLst>
+                                        </p:cTn>
+                                        <p:tgtEl>
+                                          <p:spTgt spid="10"/>
+                                        </p:tgtEl>
+                                        <p:attrNameLst>
+                                          <p:attrName>style.visibility</p:attrName>
+                                        </p:attrNameLst>
+                                      </p:cBhvr>
+                                      <p:to>
+                                        <p:strVal val="visible"/>
+                                      </p:to>
+                                    </p:set>
+                                  </p:childTnLst>
+                                </p:cTn>
+                              </p:par>
+                            </p:childTnLst>
+                          </p:cTn>
+                        </p:par>
+                      </p:childTnLst>
+                    </p:cTn>
+                  </p:par>
+                </p:childTnLst>
+              </p:cTn>
+              <p:prevCondLst>
+                <p:cond evt="onPrev" delay="0">
+                  <p:tgtEl>
+                    <p:sldTgt/>
+                  </p:tgtEl>
+                </p:cond>
+              </p:prevCondLst>
+              <p:nextCondLst>
+                <p:cond evt="onNext" delay="0">
+                  <p:tgtEl>
+                    <p:sldTgt/>
+                  </p:tgtEl>
+                </p:cond>
+              </p:nextCondLst>
+            </p:seq>
+          </p:childTnLst>
+        </p:cTn>
+      </p:par>
+    </p:tnLst>
+  </p:timing>
+</p:sld>
+</file>
+
+<file path=ppt/slides/slide21.xml><?xml version="1.0" encoding="utf-8"?>
+<p:sld xmlns:a="http://schemas.openxmlformats.org/drawingml/2006/main" xmlns:r="http://schemas.openxmlformats.org/officeDocument/2006/relationships" xmlns:p="http://schemas.openxmlformats.org/presentationml/2006/main">
+  <p:cSld>
+    <p:spTree>
+      <p:nvGrpSpPr>
+        <p:cNvPr id="1" name=""/>
+        <p:cNvGrpSpPr/>
+        <p:nvPr/>
+      </p:nvGrpSpPr>
+      <p:grpSpPr>
+        <a:xfrm>
+          <a:off x="0" y="0"/>
+          <a:ext cx="0" cy="0"/>
+          <a:chOff x="0" y="0"/>
+          <a:chExt cx="0" cy="0"/>
+        </a:xfrm>
+      </p:grpSpPr>
+      <p:sp>
+        <p:nvSpPr>
+          <p:cNvPr id="3" name="Content Placeholder 2">
+            <a:extLst>
+              <a:ext uri="{FF2B5EF4-FFF2-40B4-BE49-F238E27FC236}">
+                <a16:creationId xmlns:a16="http://schemas.microsoft.com/office/drawing/2014/main" id="{0304F63E-1353-460F-B83E-885EACD53884}"/>
+              </a:ext>
+            </a:extLst>
+          </p:cNvPr>
+          <p:cNvSpPr>
+            <a:spLocks noGrp="1"/>
+          </p:cNvSpPr>
+          <p:nvPr>
+            <p:ph idx="1"/>
+          </p:nvPr>
+        </p:nvSpPr>
+        <p:spPr/>
+        <p:txBody>
+          <a:bodyPr/>
+          <a:lstStyle/>
+          <a:p>
+            <a:pPr marL="0" indent="0">
+              <a:buNone/>
+            </a:pPr>
+            <a:endParaRPr lang="en-US" dirty="0"/>
+          </a:p>
+        </p:txBody>
+      </p:sp>
+      <p:sp>
+        <p:nvSpPr>
+          <p:cNvPr id="7" name="Title 3">
+            <a:extLst>
+              <a:ext uri="{FF2B5EF4-FFF2-40B4-BE49-F238E27FC236}">
+                <a16:creationId xmlns:a16="http://schemas.microsoft.com/office/drawing/2014/main" id="{52938955-97A5-4C9C-A845-477E02A43E20}"/>
+              </a:ext>
+            </a:extLst>
+          </p:cNvPr>
+          <p:cNvSpPr txBox="1">
+            <a:spLocks/>
+          </p:cNvSpPr>
+          <p:nvPr/>
+        </p:nvSpPr>
+        <p:spPr>
+          <a:xfrm>
+            <a:off x="1143001" y="0"/>
+            <a:ext cx="9905998" cy="1478570"/>
+          </a:xfrm>
+          <a:prstGeom prst="rect">
+            <a:avLst/>
+          </a:prstGeom>
+        </p:spPr>
+        <p:txBody>
+          <a:bodyPr vert="horz" lIns="91440" tIns="45720" rIns="91440" bIns="45720" rtlCol="0" anchor="ctr">
+            <a:normAutofit/>
+          </a:bodyPr>
+          <a:lstStyle>
+            <a:lvl1pPr algn="l" defTabSz="914400" rtl="0" eaLnBrk="1" latinLnBrk="0" hangingPunct="1">
+              <a:lnSpc>
+                <a:spcPct val="90000"/>
+              </a:lnSpc>
+              <a:spcBef>
+                <a:spcPct val="0"/>
+              </a:spcBef>
+              <a:buNone/>
+              <a:defRPr sz="3600" kern="1200" cap="all" baseline="0">
+                <a:solidFill>
+                  <a:schemeClr val="tx1"/>
+                </a:solidFill>
+                <a:effectLst>
+                  <a:outerShdw blurRad="177800" dist="38100" dir="2700000" algn="tl">
+                    <a:srgbClr val="000000">
+                      <a:alpha val="24000"/>
+                    </a:srgbClr>
+                  </a:outerShdw>
+                </a:effectLst>
+                <a:latin typeface="+mj-lt"/>
+                <a:ea typeface="+mj-ea"/>
+                <a:cs typeface="+mj-cs"/>
+              </a:defRPr>
+            </a:lvl1pPr>
+          </a:lstStyle>
+          <a:p>
+            <a:r>
+              <a:rPr lang="en-US" cap="none" dirty="0"/>
+              <a:t>Removing Database Dependencies Example</a:t>
+            </a:r>
+          </a:p>
+        </p:txBody>
+      </p:sp>
+      <p:pic>
+        <p:nvPicPr>
+          <p:cNvPr id="2" name="Picture 1">
+            <a:extLst>
+              <a:ext uri="{FF2B5EF4-FFF2-40B4-BE49-F238E27FC236}">
+                <a16:creationId xmlns:a16="http://schemas.microsoft.com/office/drawing/2014/main" id="{F5B415AB-F4C1-4781-8497-6748F8865E57}"/>
+              </a:ext>
+            </a:extLst>
+          </p:cNvPr>
+          <p:cNvPicPr>
+            <a:picLocks noChangeAspect="1"/>
+          </p:cNvPicPr>
+          <p:nvPr/>
+        </p:nvPicPr>
+        <p:blipFill>
+          <a:blip r:embed="rId2"/>
+          <a:stretch>
+            <a:fillRect/>
+          </a:stretch>
+        </p:blipFill>
+        <p:spPr>
+          <a:xfrm>
+            <a:off x="378859" y="1478571"/>
+            <a:ext cx="11434281" cy="4887506"/>
+          </a:xfrm>
+          <a:prstGeom prst="rect">
+            <a:avLst/>
+          </a:prstGeom>
+          <a:ln w="38100" cap="sq">
+            <a:solidFill>
+              <a:srgbClr val="000000"/>
+            </a:solidFill>
+            <a:prstDash val="solid"/>
+            <a:miter lim="800000"/>
+          </a:ln>
+          <a:effectLst>
+            <a:outerShdw blurRad="50800" dist="38100" dir="2700000" algn="tl" rotWithShape="0">
+              <a:srgbClr val="000000">
+                <a:alpha val="43000"/>
+              </a:srgbClr>
+            </a:outerShdw>
+          </a:effectLst>
+        </p:spPr>
+      </p:pic>
+    </p:spTree>
+    <p:extLst>
+      <p:ext uri="{BB962C8B-B14F-4D97-AF65-F5344CB8AC3E}">
+        <p14:creationId xmlns:p14="http://schemas.microsoft.com/office/powerpoint/2010/main" val="1767149620"/>
+      </p:ext>
+    </p:extLst>
+  </p:cSld>
+  <p:clrMapOvr>
+    <a:masterClrMapping/>
+  </p:clrMapOvr>
+</p:sld>
+</file>
+
 <file path=ppt/slides/slide22.xml><?xml version="1.0" encoding="utf-8"?>
+<p:sld xmlns:a="http://schemas.openxmlformats.org/drawingml/2006/main" xmlns:r="http://schemas.openxmlformats.org/officeDocument/2006/relationships" xmlns:p="http://schemas.openxmlformats.org/presentationml/2006/main">
+  <p:cSld>
+    <p:spTree>
+      <p:nvGrpSpPr>
+        <p:cNvPr id="1" name=""/>
+        <p:cNvGrpSpPr/>
+        <p:nvPr/>
+      </p:nvGrpSpPr>
+      <p:grpSpPr>
+        <a:xfrm>
+          <a:off x="0" y="0"/>
+          <a:ext cx="0" cy="0"/>
+          <a:chOff x="0" y="0"/>
+          <a:chExt cx="0" cy="0"/>
+        </a:xfrm>
+      </p:grpSpPr>
+      <p:sp>
+        <p:nvSpPr>
+          <p:cNvPr id="7" name="Title 3">
+            <a:extLst>
+              <a:ext uri="{FF2B5EF4-FFF2-40B4-BE49-F238E27FC236}">
+                <a16:creationId xmlns:a16="http://schemas.microsoft.com/office/drawing/2014/main" id="{52938955-97A5-4C9C-A845-477E02A43E20}"/>
+              </a:ext>
+            </a:extLst>
+          </p:cNvPr>
+          <p:cNvSpPr txBox="1">
+            <a:spLocks/>
+          </p:cNvSpPr>
+          <p:nvPr/>
+        </p:nvSpPr>
+        <p:spPr>
+          <a:xfrm>
+            <a:off x="1143001" y="0"/>
+            <a:ext cx="9905998" cy="1478570"/>
+          </a:xfrm>
+          <a:prstGeom prst="rect">
+            <a:avLst/>
+          </a:prstGeom>
+        </p:spPr>
+        <p:txBody>
+          <a:bodyPr vert="horz" lIns="91440" tIns="45720" rIns="91440" bIns="45720" rtlCol="0" anchor="ctr">
+            <a:normAutofit/>
+          </a:bodyPr>
+          <a:lstStyle>
+            <a:lvl1pPr algn="l" defTabSz="914400" rtl="0" eaLnBrk="1" latinLnBrk="0" hangingPunct="1">
+              <a:lnSpc>
+                <a:spcPct val="90000"/>
+              </a:lnSpc>
+              <a:spcBef>
+                <a:spcPct val="0"/>
+              </a:spcBef>
+              <a:buNone/>
+              <a:defRPr sz="3600" kern="1200" cap="all" baseline="0">
+                <a:solidFill>
+                  <a:schemeClr val="tx1"/>
+                </a:solidFill>
+                <a:effectLst>
+                  <a:outerShdw blurRad="177800" dist="38100" dir="2700000" algn="tl">
+                    <a:srgbClr val="000000">
+                      <a:alpha val="24000"/>
+                    </a:srgbClr>
+                  </a:outerShdw>
+                </a:effectLst>
+                <a:latin typeface="+mj-lt"/>
+                <a:ea typeface="+mj-ea"/>
+                <a:cs typeface="+mj-cs"/>
+              </a:defRPr>
+            </a:lvl1pPr>
+          </a:lstStyle>
+          <a:p>
+            <a:r>
+              <a:rPr lang="en-US" cap="none" dirty="0"/>
+              <a:t>Removing Database Dependencies Example</a:t>
+            </a:r>
+          </a:p>
+        </p:txBody>
+      </p:sp>
+      <p:pic>
+        <p:nvPicPr>
+          <p:cNvPr id="4" name="Picture 3">
+            <a:extLst>
+              <a:ext uri="{FF2B5EF4-FFF2-40B4-BE49-F238E27FC236}">
+                <a16:creationId xmlns:a16="http://schemas.microsoft.com/office/drawing/2014/main" id="{AB7555E9-E27E-422A-951A-A28708357DAE}"/>
+              </a:ext>
+            </a:extLst>
+          </p:cNvPr>
+          <p:cNvPicPr>
+            <a:picLocks noChangeAspect="1"/>
+          </p:cNvPicPr>
+          <p:nvPr/>
+        </p:nvPicPr>
+        <p:blipFill>
+          <a:blip r:embed="rId2"/>
+          <a:stretch>
+            <a:fillRect/>
+          </a:stretch>
+        </p:blipFill>
+        <p:spPr>
+          <a:xfrm>
+            <a:off x="719942" y="3429000"/>
+            <a:ext cx="10705325" cy="2939970"/>
+          </a:xfrm>
+          <a:prstGeom prst="rect">
+            <a:avLst/>
+          </a:prstGeom>
+          <a:ln w="38100" cap="sq">
+            <a:solidFill>
+              <a:srgbClr val="000000"/>
+            </a:solidFill>
+            <a:prstDash val="solid"/>
+            <a:miter lim="800000"/>
+          </a:ln>
+          <a:effectLst>
+            <a:outerShdw blurRad="50800" dist="38100" dir="2700000" algn="tl" rotWithShape="0">
+              <a:srgbClr val="000000">
+                <a:alpha val="43000"/>
+              </a:srgbClr>
+            </a:outerShdw>
+          </a:effectLst>
+        </p:spPr>
+      </p:pic>
+      <p:pic>
+        <p:nvPicPr>
+          <p:cNvPr id="5" name="Picture 4">
+            <a:extLst>
+              <a:ext uri="{FF2B5EF4-FFF2-40B4-BE49-F238E27FC236}">
+                <a16:creationId xmlns:a16="http://schemas.microsoft.com/office/drawing/2014/main" id="{F2DD2651-6E4D-4D07-A1EB-78E0429D2548}"/>
+              </a:ext>
+            </a:extLst>
+          </p:cNvPr>
+          <p:cNvPicPr>
+            <a:picLocks noChangeAspect="1"/>
+          </p:cNvPicPr>
+          <p:nvPr/>
+        </p:nvPicPr>
+        <p:blipFill rotWithShape="1">
+          <a:blip r:embed="rId3"/>
+          <a:srcRect l="3391" t="-343"/>
+          <a:stretch/>
+        </p:blipFill>
+        <p:spPr>
+          <a:xfrm>
+            <a:off x="719942" y="1872109"/>
+            <a:ext cx="10732492" cy="952114"/>
+          </a:xfrm>
+          <a:prstGeom prst="rect">
+            <a:avLst/>
+          </a:prstGeom>
+          <a:ln w="38100" cap="sq">
+            <a:solidFill>
+              <a:srgbClr val="000000"/>
+            </a:solidFill>
+            <a:prstDash val="solid"/>
+            <a:miter lim="800000"/>
+          </a:ln>
+          <a:effectLst>
+            <a:outerShdw blurRad="50800" dist="38100" dir="2700000" algn="tl" rotWithShape="0">
+              <a:srgbClr val="000000">
+                <a:alpha val="43000"/>
+              </a:srgbClr>
+            </a:outerShdw>
+          </a:effectLst>
+        </p:spPr>
+      </p:pic>
+    </p:spTree>
+    <p:extLst>
+      <p:ext uri="{BB962C8B-B14F-4D97-AF65-F5344CB8AC3E}">
+        <p14:creationId xmlns:p14="http://schemas.microsoft.com/office/powerpoint/2010/main" val="767637457"/>
+      </p:ext>
+    </p:extLst>
+  </p:cSld>
+  <p:clrMapOvr>
+    <a:masterClrMapping/>
+  </p:clrMapOvr>
+</p:sld>
+</file>
+
+<file path=ppt/slides/slide23.xml><?xml version="1.0" encoding="utf-8"?>
+<p:sld xmlns:a="http://schemas.openxmlformats.org/drawingml/2006/main" xmlns:r="http://schemas.openxmlformats.org/officeDocument/2006/relationships" xmlns:p="http://schemas.openxmlformats.org/presentationml/2006/main">
+  <p:cSld>
+    <p:spTree>
+      <p:nvGrpSpPr>
+        <p:cNvPr id="1" name=""/>
+        <p:cNvGrpSpPr/>
+        <p:nvPr/>
+      </p:nvGrpSpPr>
+      <p:grpSpPr>
+        <a:xfrm>
+          <a:off x="0" y="0"/>
+          <a:ext cx="0" cy="0"/>
+          <a:chOff x="0" y="0"/>
+          <a:chExt cx="0" cy="0"/>
+        </a:xfrm>
+      </p:grpSpPr>
+      <p:sp>
+        <p:nvSpPr>
+          <p:cNvPr id="7" name="Title 3">
+            <a:extLst>
+              <a:ext uri="{FF2B5EF4-FFF2-40B4-BE49-F238E27FC236}">
+                <a16:creationId xmlns:a16="http://schemas.microsoft.com/office/drawing/2014/main" id="{52938955-97A5-4C9C-A845-477E02A43E20}"/>
+              </a:ext>
+            </a:extLst>
+          </p:cNvPr>
+          <p:cNvSpPr txBox="1">
+            <a:spLocks/>
+          </p:cNvSpPr>
+          <p:nvPr/>
+        </p:nvSpPr>
+        <p:spPr>
+          <a:xfrm>
+            <a:off x="1143001" y="0"/>
+            <a:ext cx="9905998" cy="1478570"/>
+          </a:xfrm>
+          <a:prstGeom prst="rect">
+            <a:avLst/>
+          </a:prstGeom>
+        </p:spPr>
+        <p:txBody>
+          <a:bodyPr vert="horz" lIns="91440" tIns="45720" rIns="91440" bIns="45720" rtlCol="0" anchor="ctr">
+            <a:normAutofit/>
+          </a:bodyPr>
+          <a:lstStyle>
+            <a:lvl1pPr algn="l" defTabSz="914400" rtl="0" eaLnBrk="1" latinLnBrk="0" hangingPunct="1">
+              <a:lnSpc>
+                <a:spcPct val="90000"/>
+              </a:lnSpc>
+              <a:spcBef>
+                <a:spcPct val="0"/>
+              </a:spcBef>
+              <a:buNone/>
+              <a:defRPr sz="3600" kern="1200" cap="all" baseline="0">
+                <a:solidFill>
+                  <a:schemeClr val="tx1"/>
+                </a:solidFill>
+                <a:effectLst>
+                  <a:outerShdw blurRad="177800" dist="38100" dir="2700000" algn="tl">
+                    <a:srgbClr val="000000">
+                      <a:alpha val="24000"/>
+                    </a:srgbClr>
+                  </a:outerShdw>
+                </a:effectLst>
+                <a:latin typeface="+mj-lt"/>
+                <a:ea typeface="+mj-ea"/>
+                <a:cs typeface="+mj-cs"/>
+              </a:defRPr>
+            </a:lvl1pPr>
+          </a:lstStyle>
+          <a:p>
+            <a:r>
+              <a:rPr lang="en-US" cap="none" dirty="0"/>
+              <a:t>Removing Database Dependencies Example</a:t>
+            </a:r>
+          </a:p>
+        </p:txBody>
+      </p:sp>
+      <p:pic>
+        <p:nvPicPr>
+          <p:cNvPr id="2" name="Picture 1">
+            <a:extLst>
+              <a:ext uri="{FF2B5EF4-FFF2-40B4-BE49-F238E27FC236}">
+                <a16:creationId xmlns:a16="http://schemas.microsoft.com/office/drawing/2014/main" id="{3D1FC94A-310B-4526-A2CF-C5E007D535F1}"/>
+              </a:ext>
+            </a:extLst>
+          </p:cNvPr>
+          <p:cNvPicPr>
+            <a:picLocks noChangeAspect="1"/>
+          </p:cNvPicPr>
+          <p:nvPr/>
+        </p:nvPicPr>
+        <p:blipFill>
+          <a:blip r:embed="rId2"/>
+          <a:stretch>
+            <a:fillRect/>
+          </a:stretch>
+        </p:blipFill>
+        <p:spPr>
+          <a:xfrm>
+            <a:off x="296072" y="1478570"/>
+            <a:ext cx="11453081" cy="3371224"/>
+          </a:xfrm>
+          <a:prstGeom prst="rect">
+            <a:avLst/>
+          </a:prstGeom>
+          <a:ln w="38100" cap="sq">
+            <a:solidFill>
+              <a:srgbClr val="000000"/>
+            </a:solidFill>
+            <a:prstDash val="solid"/>
+            <a:miter lim="800000"/>
+          </a:ln>
+          <a:effectLst>
+            <a:outerShdw blurRad="50800" dist="38100" dir="2700000" algn="tl" rotWithShape="0">
+              <a:srgbClr val="000000">
+                <a:alpha val="43000"/>
+              </a:srgbClr>
+            </a:outerShdw>
+          </a:effectLst>
+        </p:spPr>
+      </p:pic>
+      <p:pic>
+        <p:nvPicPr>
+          <p:cNvPr id="6" name="Picture 5">
+            <a:extLst>
+              <a:ext uri="{FF2B5EF4-FFF2-40B4-BE49-F238E27FC236}">
+                <a16:creationId xmlns:a16="http://schemas.microsoft.com/office/drawing/2014/main" id="{83850905-7CF2-4D4D-8FAE-9BB6344C212E}"/>
+              </a:ext>
+            </a:extLst>
+          </p:cNvPr>
+          <p:cNvPicPr>
+            <a:picLocks noChangeAspect="1"/>
+          </p:cNvPicPr>
+          <p:nvPr/>
+        </p:nvPicPr>
+        <p:blipFill>
+          <a:blip r:embed="rId3"/>
+          <a:stretch>
+            <a:fillRect/>
+          </a:stretch>
+        </p:blipFill>
+        <p:spPr>
+          <a:xfrm>
+            <a:off x="6781331" y="3055657"/>
+            <a:ext cx="4105275" cy="1209675"/>
+          </a:xfrm>
+          <a:prstGeom prst="rect">
+            <a:avLst/>
+          </a:prstGeom>
+          <a:ln w="38100" cap="sq">
+            <a:solidFill>
+              <a:srgbClr val="000000"/>
+            </a:solidFill>
+            <a:prstDash val="solid"/>
+            <a:miter lim="800000"/>
+          </a:ln>
+          <a:effectLst>
+            <a:outerShdw blurRad="50800" dist="38100" dir="2700000" algn="tl" rotWithShape="0">
+              <a:srgbClr val="000000">
+                <a:alpha val="43000"/>
+              </a:srgbClr>
+            </a:outerShdw>
+          </a:effectLst>
+        </p:spPr>
+      </p:pic>
+      <p:pic>
+        <p:nvPicPr>
+          <p:cNvPr id="3" name="Picture 2">
+            <a:extLst>
+              <a:ext uri="{FF2B5EF4-FFF2-40B4-BE49-F238E27FC236}">
+                <a16:creationId xmlns:a16="http://schemas.microsoft.com/office/drawing/2014/main" id="{EDBE380E-4BAF-4126-AB53-CEAF04512086}"/>
+              </a:ext>
+            </a:extLst>
+          </p:cNvPr>
+          <p:cNvPicPr>
+            <a:picLocks noChangeAspect="1"/>
+          </p:cNvPicPr>
+          <p:nvPr/>
+        </p:nvPicPr>
+        <p:blipFill>
+          <a:blip r:embed="rId4"/>
+          <a:stretch>
+            <a:fillRect/>
+          </a:stretch>
+        </p:blipFill>
+        <p:spPr>
+          <a:xfrm>
+            <a:off x="252766" y="5419364"/>
+            <a:ext cx="11501432" cy="969863"/>
+          </a:xfrm>
+          <a:prstGeom prst="rect">
+            <a:avLst/>
+          </a:prstGeom>
+          <a:ln w="38100" cap="sq">
+            <a:solidFill>
+              <a:srgbClr val="000000"/>
+            </a:solidFill>
+            <a:prstDash val="solid"/>
+            <a:miter lim="800000"/>
+          </a:ln>
+          <a:effectLst>
+            <a:outerShdw blurRad="50800" dist="38100" dir="2700000" algn="tl" rotWithShape="0">
+              <a:srgbClr val="000000">
+                <a:alpha val="43000"/>
+              </a:srgbClr>
+            </a:outerShdw>
+          </a:effectLst>
+        </p:spPr>
+      </p:pic>
+    </p:spTree>
+    <p:extLst>
+      <p:ext uri="{BB962C8B-B14F-4D97-AF65-F5344CB8AC3E}">
+        <p14:creationId xmlns:p14="http://schemas.microsoft.com/office/powerpoint/2010/main" val="2363155907"/>
+      </p:ext>
+    </p:extLst>
+  </p:cSld>
+  <p:clrMapOvr>
+    <a:masterClrMapping/>
+  </p:clrMapOvr>
+</p:sld>
+</file>
+
+<file path=ppt/slides/slide24.xml><?xml version="1.0" encoding="utf-8"?>
 <p:sld xmlns:a="http://schemas.openxmlformats.org/drawingml/2006/main" xmlns:r="http://schemas.openxmlformats.org/officeDocument/2006/relationships" xmlns:p="http://schemas.openxmlformats.org/presentationml/2006/main">
   <p:cSld>
     <p:spTree>
@@ -30727,7 +31224,7 @@
             </a:pPr>
             <a:r>
               <a:rPr lang="en-US" dirty="0"/>
-              <a:t>Don’t test and expect bugs in the legacy system when changes arise</a:t>
+              <a:t>Don’t test, but expect bugs in the legacy system when changes arise</a:t>
             </a:r>
           </a:p>
           <a:p>
@@ -31048,7 +31545,7 @@
 </p:sld>
 </file>
 
-<file path=ppt/slides/slide23.xml><?xml version="1.0" encoding="utf-8"?>
+<file path=ppt/slides/slide25.xml><?xml version="1.0" encoding="utf-8"?>
 <p:sld xmlns:a="http://schemas.openxmlformats.org/drawingml/2006/main" xmlns:r="http://schemas.openxmlformats.org/officeDocument/2006/relationships" xmlns:p="http://schemas.openxmlformats.org/presentationml/2006/main">
   <p:cSld>
     <p:spTree>
@@ -31131,7 +31628,7 @@
 </p:sld>
 </file>
 
-<file path=ppt/slides/slide24.xml><?xml version="1.0" encoding="utf-8"?>
+<file path=ppt/slides/slide26.xml><?xml version="1.0" encoding="utf-8"?>
 <p:sld xmlns:a="http://schemas.openxmlformats.org/drawingml/2006/main" xmlns:r="http://schemas.openxmlformats.org/officeDocument/2006/relationships" xmlns:p="http://schemas.openxmlformats.org/presentationml/2006/main">
   <p:cSld>
     <p:spTree>
@@ -31164,7 +31661,101 @@
             <p:ph type="title"/>
           </p:nvPr>
         </p:nvSpPr>
+        <p:spPr>
+          <a:xfrm>
+            <a:off x="1141413" y="0"/>
+            <a:ext cx="9905998" cy="1478570"/>
+          </a:xfrm>
+        </p:spPr>
+        <p:txBody>
+          <a:bodyPr/>
+          <a:lstStyle/>
+          <a:p>
+            <a:r>
+              <a:rPr lang="en-US" cap="none" dirty="0"/>
+              <a:t>Generating Test Data with Bogus</a:t>
+            </a:r>
+            <a:endParaRPr lang="en-US" dirty="0"/>
+          </a:p>
+        </p:txBody>
+      </p:sp>
+      <p:sp>
+        <p:nvSpPr>
+          <p:cNvPr id="5" name="Content Placeholder 4">
+            <a:extLst>
+              <a:ext uri="{FF2B5EF4-FFF2-40B4-BE49-F238E27FC236}">
+                <a16:creationId xmlns:a16="http://schemas.microsoft.com/office/drawing/2014/main" id="{BF24FDFA-3F46-41F2-9499-79EDCEF806BD}"/>
+              </a:ext>
+            </a:extLst>
+          </p:cNvPr>
+          <p:cNvSpPr>
+            <a:spLocks noGrp="1"/>
+          </p:cNvSpPr>
+          <p:nvPr>
+            <p:ph idx="1"/>
+          </p:nvPr>
+        </p:nvSpPr>
         <p:spPr/>
+        <p:txBody>
+          <a:bodyPr/>
+          <a:lstStyle/>
+          <a:p>
+            <a:endParaRPr lang="en-US"/>
+          </a:p>
+        </p:txBody>
+      </p:sp>
+    </p:spTree>
+    <p:extLst>
+      <p:ext uri="{BB962C8B-B14F-4D97-AF65-F5344CB8AC3E}">
+        <p14:creationId xmlns:p14="http://schemas.microsoft.com/office/powerpoint/2010/main" val="4013615865"/>
+      </p:ext>
+    </p:extLst>
+  </p:cSld>
+  <p:clrMapOvr>
+    <a:masterClrMapping/>
+  </p:clrMapOvr>
+</p:sld>
+</file>
+
+<file path=ppt/slides/slide27.xml><?xml version="1.0" encoding="utf-8"?>
+<p:sld xmlns:a="http://schemas.openxmlformats.org/drawingml/2006/main" xmlns:r="http://schemas.openxmlformats.org/officeDocument/2006/relationships" xmlns:p="http://schemas.openxmlformats.org/presentationml/2006/main">
+  <p:cSld>
+    <p:spTree>
+      <p:nvGrpSpPr>
+        <p:cNvPr id="1" name=""/>
+        <p:cNvGrpSpPr/>
+        <p:nvPr/>
+      </p:nvGrpSpPr>
+      <p:grpSpPr>
+        <a:xfrm>
+          <a:off x="0" y="0"/>
+          <a:ext cx="0" cy="0"/>
+          <a:chOff x="0" y="0"/>
+          <a:chExt cx="0" cy="0"/>
+        </a:xfrm>
+      </p:grpSpPr>
+      <p:sp>
+        <p:nvSpPr>
+          <p:cNvPr id="4" name="Title 3">
+            <a:extLst>
+              <a:ext uri="{FF2B5EF4-FFF2-40B4-BE49-F238E27FC236}">
+                <a16:creationId xmlns:a16="http://schemas.microsoft.com/office/drawing/2014/main" id="{EE13D860-9205-48B1-B675-4421397C217F}"/>
+              </a:ext>
+            </a:extLst>
+          </p:cNvPr>
+          <p:cNvSpPr>
+            <a:spLocks noGrp="1"/>
+          </p:cNvSpPr>
+          <p:nvPr>
+            <p:ph type="title"/>
+          </p:nvPr>
+        </p:nvSpPr>
+        <p:spPr>
+          <a:xfrm>
+            <a:off x="1141413" y="0"/>
+            <a:ext cx="9905998" cy="1478570"/>
+          </a:xfrm>
+        </p:spPr>
         <p:txBody>
           <a:bodyPr/>
           <a:lstStyle/>
@@ -31223,7 +31814,7 @@
 </p:sld>
 </file>
 
-<file path=ppt/slides/slide25.xml><?xml version="1.0" encoding="utf-8"?>
+<file path=ppt/slides/slide28.xml><?xml version="1.0" encoding="utf-8"?>
 <p:sld xmlns:a="http://schemas.openxmlformats.org/drawingml/2006/main" xmlns:r="http://schemas.openxmlformats.org/officeDocument/2006/relationships" xmlns:p="http://schemas.openxmlformats.org/presentationml/2006/main">
   <p:cSld>
     <p:spTree>
@@ -31256,7 +31847,12 @@
             <p:ph type="title"/>
           </p:nvPr>
         </p:nvSpPr>
-        <p:spPr/>
+        <p:spPr>
+          <a:xfrm>
+            <a:off x="1141413" y="0"/>
+            <a:ext cx="9905998" cy="1478570"/>
+          </a:xfrm>
+        </p:spPr>
         <p:txBody>
           <a:bodyPr/>
           <a:lstStyle/>
@@ -31311,7 +31907,7 @@
 </p:sld>
 </file>
 
-<file path=ppt/slides/slide26.xml><?xml version="1.0" encoding="utf-8"?>
+<file path=ppt/slides/slide29.xml><?xml version="1.0" encoding="utf-8"?>
 <p:sld xmlns:a="http://schemas.openxmlformats.org/drawingml/2006/main" xmlns:r="http://schemas.openxmlformats.org/officeDocument/2006/relationships" xmlns:p="http://schemas.openxmlformats.org/presentationml/2006/main">
   <p:cSld>
     <p:spTree>
@@ -31344,14 +31940,19 @@
             <p:ph type="title"/>
           </p:nvPr>
         </p:nvSpPr>
-        <p:spPr/>
+        <p:spPr>
+          <a:xfrm>
+            <a:off x="1141413" y="0"/>
+            <a:ext cx="9905998" cy="1478570"/>
+          </a:xfrm>
+        </p:spPr>
         <p:txBody>
           <a:bodyPr/>
           <a:lstStyle/>
           <a:p>
             <a:r>
               <a:rPr lang="en-US" cap="none" dirty="0"/>
-              <a:t>Scientist </a:t>
+              <a:t>Comparing Logic with Scientist </a:t>
             </a:r>
             <a:r>
               <a:rPr lang="en-US" dirty="0"/>
@@ -31389,278 +31990,6 @@
     <p:extLst>
       <p:ext uri="{BB962C8B-B14F-4D97-AF65-F5344CB8AC3E}">
         <p14:creationId xmlns:p14="http://schemas.microsoft.com/office/powerpoint/2010/main" val="1892483161"/>
-      </p:ext>
-    </p:extLst>
-  </p:cSld>
-  <p:clrMapOvr>
-    <a:masterClrMapping/>
-  </p:clrMapOvr>
-</p:sld>
-</file>
-
-<file path=ppt/slides/slide27.xml><?xml version="1.0" encoding="utf-8"?>
-<p:sld xmlns:a="http://schemas.openxmlformats.org/drawingml/2006/main" xmlns:r="http://schemas.openxmlformats.org/officeDocument/2006/relationships" xmlns:p="http://schemas.openxmlformats.org/presentationml/2006/main">
-  <p:cSld>
-    <p:spTree>
-      <p:nvGrpSpPr>
-        <p:cNvPr id="1" name=""/>
-        <p:cNvGrpSpPr/>
-        <p:nvPr/>
-      </p:nvGrpSpPr>
-      <p:grpSpPr>
-        <a:xfrm>
-          <a:off x="0" y="0"/>
-          <a:ext cx="0" cy="0"/>
-          <a:chOff x="0" y="0"/>
-          <a:chExt cx="0" cy="0"/>
-        </a:xfrm>
-      </p:grpSpPr>
-      <p:sp>
-        <p:nvSpPr>
-          <p:cNvPr id="4" name="Title 3">
-            <a:extLst>
-              <a:ext uri="{FF2B5EF4-FFF2-40B4-BE49-F238E27FC236}">
-                <a16:creationId xmlns:a16="http://schemas.microsoft.com/office/drawing/2014/main" id="{EE13D860-9205-48B1-B675-4421397C217F}"/>
-              </a:ext>
-            </a:extLst>
-          </p:cNvPr>
-          <p:cNvSpPr>
-            <a:spLocks noGrp="1"/>
-          </p:cNvSpPr>
-          <p:nvPr>
-            <p:ph type="title"/>
-          </p:nvPr>
-        </p:nvSpPr>
-        <p:spPr/>
-        <p:txBody>
-          <a:bodyPr/>
-          <a:lstStyle/>
-          <a:p>
-            <a:r>
-              <a:rPr lang="en-US" cap="none" dirty="0" err="1"/>
-              <a:t>SnapShotter</a:t>
-            </a:r>
-            <a:r>
-              <a:rPr lang="en-US" cap="none" dirty="0"/>
-              <a:t> / </a:t>
-            </a:r>
-            <a:r>
-              <a:rPr lang="en-US" cap="none" dirty="0" err="1"/>
-              <a:t>ApprovalTests</a:t>
-            </a:r>
-            <a:r>
-              <a:rPr lang="en-US" cap="none" dirty="0"/>
-              <a:t> / Snapper</a:t>
-            </a:r>
-            <a:endParaRPr lang="en-US" dirty="0"/>
-          </a:p>
-        </p:txBody>
-      </p:sp>
-      <p:sp>
-        <p:nvSpPr>
-          <p:cNvPr id="5" name="Content Placeholder 4">
-            <a:extLst>
-              <a:ext uri="{FF2B5EF4-FFF2-40B4-BE49-F238E27FC236}">
-                <a16:creationId xmlns:a16="http://schemas.microsoft.com/office/drawing/2014/main" id="{BF24FDFA-3F46-41F2-9499-79EDCEF806BD}"/>
-              </a:ext>
-            </a:extLst>
-          </p:cNvPr>
-          <p:cNvSpPr>
-            <a:spLocks noGrp="1"/>
-          </p:cNvSpPr>
-          <p:nvPr>
-            <p:ph idx="1"/>
-          </p:nvPr>
-        </p:nvSpPr>
-        <p:spPr/>
-        <p:txBody>
-          <a:bodyPr/>
-          <a:lstStyle/>
-          <a:p>
-            <a:endParaRPr lang="en-US"/>
-          </a:p>
-        </p:txBody>
-      </p:sp>
-    </p:spTree>
-    <p:extLst>
-      <p:ext uri="{BB962C8B-B14F-4D97-AF65-F5344CB8AC3E}">
-        <p14:creationId xmlns:p14="http://schemas.microsoft.com/office/powerpoint/2010/main" val="4089011859"/>
-      </p:ext>
-    </p:extLst>
-  </p:cSld>
-  <p:clrMapOvr>
-    <a:masterClrMapping/>
-  </p:clrMapOvr>
-</p:sld>
-</file>
-
-<file path=ppt/slides/slide28.xml><?xml version="1.0" encoding="utf-8"?>
-<p:sld xmlns:a="http://schemas.openxmlformats.org/drawingml/2006/main" xmlns:r="http://schemas.openxmlformats.org/officeDocument/2006/relationships" xmlns:p="http://schemas.openxmlformats.org/presentationml/2006/main">
-  <p:cSld>
-    <p:spTree>
-      <p:nvGrpSpPr>
-        <p:cNvPr id="1" name=""/>
-        <p:cNvGrpSpPr/>
-        <p:nvPr/>
-      </p:nvGrpSpPr>
-      <p:grpSpPr>
-        <a:xfrm>
-          <a:off x="0" y="0"/>
-          <a:ext cx="0" cy="0"/>
-          <a:chOff x="0" y="0"/>
-          <a:chExt cx="0" cy="0"/>
-        </a:xfrm>
-      </p:grpSpPr>
-      <p:sp>
-        <p:nvSpPr>
-          <p:cNvPr id="4" name="Title 3">
-            <a:extLst>
-              <a:ext uri="{FF2B5EF4-FFF2-40B4-BE49-F238E27FC236}">
-                <a16:creationId xmlns:a16="http://schemas.microsoft.com/office/drawing/2014/main" id="{EE13D860-9205-48B1-B675-4421397C217F}"/>
-              </a:ext>
-            </a:extLst>
-          </p:cNvPr>
-          <p:cNvSpPr>
-            <a:spLocks noGrp="1"/>
-          </p:cNvSpPr>
-          <p:nvPr>
-            <p:ph type="title"/>
-          </p:nvPr>
-        </p:nvSpPr>
-        <p:spPr/>
-        <p:txBody>
-          <a:bodyPr/>
-          <a:lstStyle/>
-          <a:p>
-            <a:r>
-              <a:rPr lang="en-US" cap="none" dirty="0" err="1"/>
-              <a:t>Moq</a:t>
-            </a:r>
-            <a:r>
-              <a:rPr lang="en-US" cap="none" dirty="0"/>
-              <a:t> to Create Mock Objects</a:t>
-            </a:r>
-            <a:endParaRPr lang="en-US" dirty="0"/>
-          </a:p>
-        </p:txBody>
-      </p:sp>
-      <p:sp>
-        <p:nvSpPr>
-          <p:cNvPr id="5" name="Content Placeholder 4">
-            <a:extLst>
-              <a:ext uri="{FF2B5EF4-FFF2-40B4-BE49-F238E27FC236}">
-                <a16:creationId xmlns:a16="http://schemas.microsoft.com/office/drawing/2014/main" id="{BF24FDFA-3F46-41F2-9499-79EDCEF806BD}"/>
-              </a:ext>
-            </a:extLst>
-          </p:cNvPr>
-          <p:cNvSpPr>
-            <a:spLocks noGrp="1"/>
-          </p:cNvSpPr>
-          <p:nvPr>
-            <p:ph idx="1"/>
-          </p:nvPr>
-        </p:nvSpPr>
-        <p:spPr/>
-        <p:txBody>
-          <a:bodyPr/>
-          <a:lstStyle/>
-          <a:p>
-            <a:endParaRPr lang="en-US"/>
-          </a:p>
-        </p:txBody>
-      </p:sp>
-    </p:spTree>
-    <p:extLst>
-      <p:ext uri="{BB962C8B-B14F-4D97-AF65-F5344CB8AC3E}">
-        <p14:creationId xmlns:p14="http://schemas.microsoft.com/office/powerpoint/2010/main" val="1221973596"/>
-      </p:ext>
-    </p:extLst>
-  </p:cSld>
-  <p:clrMapOvr>
-    <a:masterClrMapping/>
-  </p:clrMapOvr>
-</p:sld>
-</file>
-
-<file path=ppt/slides/slide29.xml><?xml version="1.0" encoding="utf-8"?>
-<p:sld xmlns:a="http://schemas.openxmlformats.org/drawingml/2006/main" xmlns:r="http://schemas.openxmlformats.org/officeDocument/2006/relationships" xmlns:p="http://schemas.openxmlformats.org/presentationml/2006/main">
-  <p:cSld>
-    <p:spTree>
-      <p:nvGrpSpPr>
-        <p:cNvPr id="1" name=""/>
-        <p:cNvGrpSpPr/>
-        <p:nvPr/>
-      </p:nvGrpSpPr>
-      <p:grpSpPr>
-        <a:xfrm>
-          <a:off x="0" y="0"/>
-          <a:ext cx="0" cy="0"/>
-          <a:chOff x="0" y="0"/>
-          <a:chExt cx="0" cy="0"/>
-        </a:xfrm>
-      </p:grpSpPr>
-      <p:sp>
-        <p:nvSpPr>
-          <p:cNvPr id="4" name="Title 3">
-            <a:extLst>
-              <a:ext uri="{FF2B5EF4-FFF2-40B4-BE49-F238E27FC236}">
-                <a16:creationId xmlns:a16="http://schemas.microsoft.com/office/drawing/2014/main" id="{EE13D860-9205-48B1-B675-4421397C217F}"/>
-              </a:ext>
-            </a:extLst>
-          </p:cNvPr>
-          <p:cNvSpPr>
-            <a:spLocks noGrp="1"/>
-          </p:cNvSpPr>
-          <p:nvPr>
-            <p:ph type="title"/>
-          </p:nvPr>
-        </p:nvSpPr>
-        <p:spPr/>
-        <p:txBody>
-          <a:bodyPr/>
-          <a:lstStyle/>
-          <a:p>
-            <a:r>
-              <a:rPr lang="en-US" cap="none" dirty="0" err="1"/>
-              <a:t>Moq</a:t>
-            </a:r>
-            <a:r>
-              <a:rPr lang="en-US" cap="none" dirty="0"/>
-              <a:t> to Verify Behavior</a:t>
-            </a:r>
-            <a:endParaRPr lang="en-US" dirty="0"/>
-          </a:p>
-        </p:txBody>
-      </p:sp>
-      <p:sp>
-        <p:nvSpPr>
-          <p:cNvPr id="5" name="Content Placeholder 4">
-            <a:extLst>
-              <a:ext uri="{FF2B5EF4-FFF2-40B4-BE49-F238E27FC236}">
-                <a16:creationId xmlns:a16="http://schemas.microsoft.com/office/drawing/2014/main" id="{BF24FDFA-3F46-41F2-9499-79EDCEF806BD}"/>
-              </a:ext>
-            </a:extLst>
-          </p:cNvPr>
-          <p:cNvSpPr>
-            <a:spLocks noGrp="1"/>
-          </p:cNvSpPr>
-          <p:nvPr>
-            <p:ph idx="1"/>
-          </p:nvPr>
-        </p:nvSpPr>
-        <p:spPr/>
-        <p:txBody>
-          <a:bodyPr/>
-          <a:lstStyle/>
-          <a:p>
-            <a:endParaRPr lang="en-US"/>
-          </a:p>
-        </p:txBody>
-      </p:sp>
-    </p:spTree>
-    <p:extLst>
-      <p:ext uri="{BB962C8B-B14F-4D97-AF65-F5344CB8AC3E}">
-        <p14:creationId xmlns:p14="http://schemas.microsoft.com/office/powerpoint/2010/main" val="3246282286"/>
       </p:ext>
     </p:extLst>
   </p:cSld>
@@ -31828,7 +32157,303 @@
             <p:ph type="title"/>
           </p:nvPr>
         </p:nvSpPr>
+        <p:spPr>
+          <a:xfrm>
+            <a:off x="1141413" y="0"/>
+            <a:ext cx="9905998" cy="1478570"/>
+          </a:xfrm>
+        </p:spPr>
+        <p:txBody>
+          <a:bodyPr/>
+          <a:lstStyle/>
+          <a:p>
+            <a:r>
+              <a:rPr lang="en-US" cap="none" dirty="0"/>
+              <a:t>Testing State Trees with </a:t>
+            </a:r>
+            <a:r>
+              <a:rPr lang="en-US" cap="none" dirty="0" err="1"/>
+              <a:t>SnapShotter</a:t>
+            </a:r>
+            <a:r>
+              <a:rPr lang="en-US" cap="none" dirty="0"/>
+              <a:t> / </a:t>
+            </a:r>
+            <a:r>
+              <a:rPr lang="en-US" cap="none" dirty="0" err="1"/>
+              <a:t>ApprovalTests</a:t>
+            </a:r>
+            <a:r>
+              <a:rPr lang="en-US" cap="none" dirty="0"/>
+              <a:t> / Snapper</a:t>
+            </a:r>
+            <a:endParaRPr lang="en-US" dirty="0"/>
+          </a:p>
+        </p:txBody>
+      </p:sp>
+      <p:sp>
+        <p:nvSpPr>
+          <p:cNvPr id="5" name="Content Placeholder 4">
+            <a:extLst>
+              <a:ext uri="{FF2B5EF4-FFF2-40B4-BE49-F238E27FC236}">
+                <a16:creationId xmlns:a16="http://schemas.microsoft.com/office/drawing/2014/main" id="{BF24FDFA-3F46-41F2-9499-79EDCEF806BD}"/>
+              </a:ext>
+            </a:extLst>
+          </p:cNvPr>
+          <p:cNvSpPr>
+            <a:spLocks noGrp="1"/>
+          </p:cNvSpPr>
+          <p:nvPr>
+            <p:ph idx="1"/>
+          </p:nvPr>
+        </p:nvSpPr>
         <p:spPr/>
+        <p:txBody>
+          <a:bodyPr/>
+          <a:lstStyle/>
+          <a:p>
+            <a:endParaRPr lang="en-US"/>
+          </a:p>
+        </p:txBody>
+      </p:sp>
+    </p:spTree>
+    <p:extLst>
+      <p:ext uri="{BB962C8B-B14F-4D97-AF65-F5344CB8AC3E}">
+        <p14:creationId xmlns:p14="http://schemas.microsoft.com/office/powerpoint/2010/main" val="4089011859"/>
+      </p:ext>
+    </p:extLst>
+  </p:cSld>
+  <p:clrMapOvr>
+    <a:masterClrMapping/>
+  </p:clrMapOvr>
+</p:sld>
+</file>
+
+<file path=ppt/slides/slide31.xml><?xml version="1.0" encoding="utf-8"?>
+<p:sld xmlns:a="http://schemas.openxmlformats.org/drawingml/2006/main" xmlns:r="http://schemas.openxmlformats.org/officeDocument/2006/relationships" xmlns:p="http://schemas.openxmlformats.org/presentationml/2006/main">
+  <p:cSld>
+    <p:spTree>
+      <p:nvGrpSpPr>
+        <p:cNvPr id="1" name=""/>
+        <p:cNvGrpSpPr/>
+        <p:nvPr/>
+      </p:nvGrpSpPr>
+      <p:grpSpPr>
+        <a:xfrm>
+          <a:off x="0" y="0"/>
+          <a:ext cx="0" cy="0"/>
+          <a:chOff x="0" y="0"/>
+          <a:chExt cx="0" cy="0"/>
+        </a:xfrm>
+      </p:grpSpPr>
+      <p:sp>
+        <p:nvSpPr>
+          <p:cNvPr id="4" name="Title 3">
+            <a:extLst>
+              <a:ext uri="{FF2B5EF4-FFF2-40B4-BE49-F238E27FC236}">
+                <a16:creationId xmlns:a16="http://schemas.microsoft.com/office/drawing/2014/main" id="{EE13D860-9205-48B1-B675-4421397C217F}"/>
+              </a:ext>
+            </a:extLst>
+          </p:cNvPr>
+          <p:cNvSpPr>
+            <a:spLocks noGrp="1"/>
+          </p:cNvSpPr>
+          <p:nvPr>
+            <p:ph type="title"/>
+          </p:nvPr>
+        </p:nvSpPr>
+        <p:spPr>
+          <a:xfrm>
+            <a:off x="1141413" y="0"/>
+            <a:ext cx="9905998" cy="1478570"/>
+          </a:xfrm>
+        </p:spPr>
+        <p:txBody>
+          <a:bodyPr/>
+          <a:lstStyle/>
+          <a:p>
+            <a:r>
+              <a:rPr lang="en-US" cap="none" dirty="0" err="1"/>
+              <a:t>Moq</a:t>
+            </a:r>
+            <a:r>
+              <a:rPr lang="en-US" cap="none" dirty="0"/>
+              <a:t> to Create Mock Objects</a:t>
+            </a:r>
+            <a:endParaRPr lang="en-US" dirty="0"/>
+          </a:p>
+        </p:txBody>
+      </p:sp>
+      <p:sp>
+        <p:nvSpPr>
+          <p:cNvPr id="5" name="Content Placeholder 4">
+            <a:extLst>
+              <a:ext uri="{FF2B5EF4-FFF2-40B4-BE49-F238E27FC236}">
+                <a16:creationId xmlns:a16="http://schemas.microsoft.com/office/drawing/2014/main" id="{BF24FDFA-3F46-41F2-9499-79EDCEF806BD}"/>
+              </a:ext>
+            </a:extLst>
+          </p:cNvPr>
+          <p:cNvSpPr>
+            <a:spLocks noGrp="1"/>
+          </p:cNvSpPr>
+          <p:nvPr>
+            <p:ph idx="1"/>
+          </p:nvPr>
+        </p:nvSpPr>
+        <p:spPr/>
+        <p:txBody>
+          <a:bodyPr/>
+          <a:lstStyle/>
+          <a:p>
+            <a:endParaRPr lang="en-US"/>
+          </a:p>
+        </p:txBody>
+      </p:sp>
+    </p:spTree>
+    <p:extLst>
+      <p:ext uri="{BB962C8B-B14F-4D97-AF65-F5344CB8AC3E}">
+        <p14:creationId xmlns:p14="http://schemas.microsoft.com/office/powerpoint/2010/main" val="1221973596"/>
+      </p:ext>
+    </p:extLst>
+  </p:cSld>
+  <p:clrMapOvr>
+    <a:masterClrMapping/>
+  </p:clrMapOvr>
+</p:sld>
+</file>
+
+<file path=ppt/slides/slide32.xml><?xml version="1.0" encoding="utf-8"?>
+<p:sld xmlns:a="http://schemas.openxmlformats.org/drawingml/2006/main" xmlns:r="http://schemas.openxmlformats.org/officeDocument/2006/relationships" xmlns:p="http://schemas.openxmlformats.org/presentationml/2006/main">
+  <p:cSld>
+    <p:spTree>
+      <p:nvGrpSpPr>
+        <p:cNvPr id="1" name=""/>
+        <p:cNvGrpSpPr/>
+        <p:nvPr/>
+      </p:nvGrpSpPr>
+      <p:grpSpPr>
+        <a:xfrm>
+          <a:off x="0" y="0"/>
+          <a:ext cx="0" cy="0"/>
+          <a:chOff x="0" y="0"/>
+          <a:chExt cx="0" cy="0"/>
+        </a:xfrm>
+      </p:grpSpPr>
+      <p:sp>
+        <p:nvSpPr>
+          <p:cNvPr id="4" name="Title 3">
+            <a:extLst>
+              <a:ext uri="{FF2B5EF4-FFF2-40B4-BE49-F238E27FC236}">
+                <a16:creationId xmlns:a16="http://schemas.microsoft.com/office/drawing/2014/main" id="{EE13D860-9205-48B1-B675-4421397C217F}"/>
+              </a:ext>
+            </a:extLst>
+          </p:cNvPr>
+          <p:cNvSpPr>
+            <a:spLocks noGrp="1"/>
+          </p:cNvSpPr>
+          <p:nvPr>
+            <p:ph type="title"/>
+          </p:nvPr>
+        </p:nvSpPr>
+        <p:spPr>
+          <a:xfrm>
+            <a:off x="1141413" y="0"/>
+            <a:ext cx="9905998" cy="1478570"/>
+          </a:xfrm>
+        </p:spPr>
+        <p:txBody>
+          <a:bodyPr/>
+          <a:lstStyle/>
+          <a:p>
+            <a:r>
+              <a:rPr lang="en-US" cap="none" dirty="0" err="1"/>
+              <a:t>Moq</a:t>
+            </a:r>
+            <a:r>
+              <a:rPr lang="en-US" cap="none" dirty="0"/>
+              <a:t> to Verify Behavior</a:t>
+            </a:r>
+            <a:endParaRPr lang="en-US" dirty="0"/>
+          </a:p>
+        </p:txBody>
+      </p:sp>
+      <p:sp>
+        <p:nvSpPr>
+          <p:cNvPr id="5" name="Content Placeholder 4">
+            <a:extLst>
+              <a:ext uri="{FF2B5EF4-FFF2-40B4-BE49-F238E27FC236}">
+                <a16:creationId xmlns:a16="http://schemas.microsoft.com/office/drawing/2014/main" id="{BF24FDFA-3F46-41F2-9499-79EDCEF806BD}"/>
+              </a:ext>
+            </a:extLst>
+          </p:cNvPr>
+          <p:cNvSpPr>
+            <a:spLocks noGrp="1"/>
+          </p:cNvSpPr>
+          <p:nvPr>
+            <p:ph idx="1"/>
+          </p:nvPr>
+        </p:nvSpPr>
+        <p:spPr/>
+        <p:txBody>
+          <a:bodyPr/>
+          <a:lstStyle/>
+          <a:p>
+            <a:endParaRPr lang="en-US"/>
+          </a:p>
+        </p:txBody>
+      </p:sp>
+    </p:spTree>
+    <p:extLst>
+      <p:ext uri="{BB962C8B-B14F-4D97-AF65-F5344CB8AC3E}">
+        <p14:creationId xmlns:p14="http://schemas.microsoft.com/office/powerpoint/2010/main" val="3246282286"/>
+      </p:ext>
+    </p:extLst>
+  </p:cSld>
+  <p:clrMapOvr>
+    <a:masterClrMapping/>
+  </p:clrMapOvr>
+</p:sld>
+</file>
+
+<file path=ppt/slides/slide33.xml><?xml version="1.0" encoding="utf-8"?>
+<p:sld xmlns:a="http://schemas.openxmlformats.org/drawingml/2006/main" xmlns:r="http://schemas.openxmlformats.org/officeDocument/2006/relationships" xmlns:p="http://schemas.openxmlformats.org/presentationml/2006/main">
+  <p:cSld>
+    <p:spTree>
+      <p:nvGrpSpPr>
+        <p:cNvPr id="1" name=""/>
+        <p:cNvGrpSpPr/>
+        <p:nvPr/>
+      </p:nvGrpSpPr>
+      <p:grpSpPr>
+        <a:xfrm>
+          <a:off x="0" y="0"/>
+          <a:ext cx="0" cy="0"/>
+          <a:chOff x="0" y="0"/>
+          <a:chExt cx="0" cy="0"/>
+        </a:xfrm>
+      </p:grpSpPr>
+      <p:sp>
+        <p:nvSpPr>
+          <p:cNvPr id="4" name="Title 3">
+            <a:extLst>
+              <a:ext uri="{FF2B5EF4-FFF2-40B4-BE49-F238E27FC236}">
+                <a16:creationId xmlns:a16="http://schemas.microsoft.com/office/drawing/2014/main" id="{EE13D860-9205-48B1-B675-4421397C217F}"/>
+              </a:ext>
+            </a:extLst>
+          </p:cNvPr>
+          <p:cNvSpPr>
+            <a:spLocks noGrp="1"/>
+          </p:cNvSpPr>
+          <p:nvPr>
+            <p:ph type="title"/>
+          </p:nvPr>
+        </p:nvSpPr>
+        <p:spPr>
+          <a:xfrm>
+            <a:off x="1141413" y="0"/>
+            <a:ext cx="9905998" cy="1478570"/>
+          </a:xfrm>
+        </p:spPr>
         <p:txBody>
           <a:bodyPr/>
           <a:lstStyle/>
@@ -31879,7 +32504,7 @@
 </p:sld>
 </file>
 
-<file path=ppt/slides/slide31.xml><?xml version="1.0" encoding="utf-8"?>
+<file path=ppt/slides/slide34.xml><?xml version="1.0" encoding="utf-8"?>
 <p:sld xmlns:a="http://schemas.openxmlformats.org/drawingml/2006/main" xmlns:r="http://schemas.openxmlformats.org/officeDocument/2006/relationships" xmlns:p="http://schemas.openxmlformats.org/presentationml/2006/main">
   <p:cSld>
     <p:spTree>
@@ -31912,95 +32537,20 @@
             <p:ph type="title"/>
           </p:nvPr>
         </p:nvSpPr>
-        <p:spPr/>
+        <p:spPr>
+          <a:xfrm>
+            <a:off x="1141413" y="0"/>
+            <a:ext cx="9905998" cy="1478570"/>
+          </a:xfrm>
+        </p:spPr>
         <p:txBody>
           <a:bodyPr/>
           <a:lstStyle/>
           <a:p>
             <a:r>
               <a:rPr lang="en-US" cap="none" dirty="0"/>
-              <a:t>Bogus</a:t>
+              <a:t>Finding Edge Cases with </a:t>
             </a:r>
-            <a:endParaRPr lang="en-US" dirty="0"/>
-          </a:p>
-        </p:txBody>
-      </p:sp>
-      <p:sp>
-        <p:nvSpPr>
-          <p:cNvPr id="5" name="Content Placeholder 4">
-            <a:extLst>
-              <a:ext uri="{FF2B5EF4-FFF2-40B4-BE49-F238E27FC236}">
-                <a16:creationId xmlns:a16="http://schemas.microsoft.com/office/drawing/2014/main" id="{BF24FDFA-3F46-41F2-9499-79EDCEF806BD}"/>
-              </a:ext>
-            </a:extLst>
-          </p:cNvPr>
-          <p:cNvSpPr>
-            <a:spLocks noGrp="1"/>
-          </p:cNvSpPr>
-          <p:nvPr>
-            <p:ph idx="1"/>
-          </p:nvPr>
-        </p:nvSpPr>
-        <p:spPr/>
-        <p:txBody>
-          <a:bodyPr/>
-          <a:lstStyle/>
-          <a:p>
-            <a:endParaRPr lang="en-US"/>
-          </a:p>
-        </p:txBody>
-      </p:sp>
-    </p:spTree>
-    <p:extLst>
-      <p:ext uri="{BB962C8B-B14F-4D97-AF65-F5344CB8AC3E}">
-        <p14:creationId xmlns:p14="http://schemas.microsoft.com/office/powerpoint/2010/main" val="4013615865"/>
-      </p:ext>
-    </p:extLst>
-  </p:cSld>
-  <p:clrMapOvr>
-    <a:masterClrMapping/>
-  </p:clrMapOvr>
-</p:sld>
-</file>
-
-<file path=ppt/slides/slide32.xml><?xml version="1.0" encoding="utf-8"?>
-<p:sld xmlns:a="http://schemas.openxmlformats.org/drawingml/2006/main" xmlns:r="http://schemas.openxmlformats.org/officeDocument/2006/relationships" xmlns:p="http://schemas.openxmlformats.org/presentationml/2006/main">
-  <p:cSld>
-    <p:spTree>
-      <p:nvGrpSpPr>
-        <p:cNvPr id="1" name=""/>
-        <p:cNvGrpSpPr/>
-        <p:nvPr/>
-      </p:nvGrpSpPr>
-      <p:grpSpPr>
-        <a:xfrm>
-          <a:off x="0" y="0"/>
-          <a:ext cx="0" cy="0"/>
-          <a:chOff x="0" y="0"/>
-          <a:chExt cx="0" cy="0"/>
-        </a:xfrm>
-      </p:grpSpPr>
-      <p:sp>
-        <p:nvSpPr>
-          <p:cNvPr id="4" name="Title 3">
-            <a:extLst>
-              <a:ext uri="{FF2B5EF4-FFF2-40B4-BE49-F238E27FC236}">
-                <a16:creationId xmlns:a16="http://schemas.microsoft.com/office/drawing/2014/main" id="{EE13D860-9205-48B1-B675-4421397C217F}"/>
-              </a:ext>
-            </a:extLst>
-          </p:cNvPr>
-          <p:cNvSpPr>
-            <a:spLocks noGrp="1"/>
-          </p:cNvSpPr>
-          <p:nvPr>
-            <p:ph type="title"/>
-          </p:nvPr>
-        </p:nvSpPr>
-        <p:spPr/>
-        <p:txBody>
-          <a:bodyPr/>
-          <a:lstStyle/>
-          <a:p>
             <a:r>
               <a:rPr lang="en-US" cap="none" dirty="0" err="1"/>
               <a:t>SharpFuzz</a:t>
@@ -32047,7 +32597,7 @@
 </p:sld>
 </file>
 
-<file path=ppt/slides/slide33.xml><?xml version="1.0" encoding="utf-8"?>
+<file path=ppt/slides/slide35.xml><?xml version="1.0" encoding="utf-8"?>
 <p:sld xmlns:a="http://schemas.openxmlformats.org/drawingml/2006/main" xmlns:r="http://schemas.openxmlformats.org/officeDocument/2006/relationships" xmlns:p="http://schemas.openxmlformats.org/presentationml/2006/main">
   <p:cSld>
     <p:spTree>
@@ -32080,11 +32630,20 @@
             <p:ph type="title"/>
           </p:nvPr>
         </p:nvSpPr>
-        <p:spPr/>
+        <p:spPr>
+          <a:xfrm>
+            <a:off x="1141413" y="0"/>
+            <a:ext cx="9905998" cy="1478570"/>
+          </a:xfrm>
+        </p:spPr>
         <p:txBody>
           <a:bodyPr/>
           <a:lstStyle/>
           <a:p>
+            <a:r>
+              <a:rPr lang="en-US" cap="none" dirty="0"/>
+              <a:t>In Memory Tests with </a:t>
+            </a:r>
             <a:r>
               <a:rPr lang="en-US" cap="none" dirty="0" err="1"/>
               <a:t>EntityFramework</a:t>
@@ -32131,7 +32690,7 @@
 </p:sld>
 </file>
 
-<file path=ppt/slides/slide34.xml><?xml version="1.0" encoding="utf-8"?>
+<file path=ppt/slides/slide36.xml><?xml version="1.0" encoding="utf-8"?>
 <p:sld xmlns:a="http://schemas.openxmlformats.org/drawingml/2006/main" xmlns:r="http://schemas.openxmlformats.org/officeDocument/2006/relationships" xmlns:p="http://schemas.openxmlformats.org/presentationml/2006/main">
   <p:cSld>
     <p:spTree>
@@ -32214,7 +32773,7 @@
 </p:sld>
 </file>
 
-<file path=ppt/slides/slide35.xml><?xml version="1.0" encoding="utf-8"?>
+<file path=ppt/slides/slide37.xml><?xml version="1.0" encoding="utf-8"?>
 <p:sld xmlns:a="http://schemas.openxmlformats.org/drawingml/2006/main" xmlns:r="http://schemas.openxmlformats.org/officeDocument/2006/relationships" xmlns:p="http://schemas.openxmlformats.org/presentationml/2006/main">
   <p:cSld>
     <p:spTree>
@@ -32311,7 +32870,7 @@
 </p:sld>
 </file>
 
-<file path=ppt/slides/slide36.xml><?xml version="1.0" encoding="utf-8"?>
+<file path=ppt/slides/slide38.xml><?xml version="1.0" encoding="utf-8"?>
 <p:sld xmlns:a="http://schemas.openxmlformats.org/drawingml/2006/main" xmlns:r="http://schemas.openxmlformats.org/officeDocument/2006/relationships" xmlns:p="http://schemas.openxmlformats.org/presentationml/2006/main">
   <p:cSld>
     <p:spTree>
@@ -32394,7 +32953,7 @@
 </p:sld>
 </file>
 
-<file path=ppt/slides/slide37.xml><?xml version="1.0" encoding="utf-8"?>
+<file path=ppt/slides/slide39.xml><?xml version="1.0" encoding="utf-8"?>
 <p:sld xmlns:a="http://schemas.openxmlformats.org/drawingml/2006/main" xmlns:r="http://schemas.openxmlformats.org/officeDocument/2006/relationships" xmlns:p="http://schemas.openxmlformats.org/presentationml/2006/main">
   <p:cSld>
     <p:spTree>
@@ -32468,172 +33027,6 @@
     <p:extLst>
       <p:ext uri="{BB962C8B-B14F-4D97-AF65-F5344CB8AC3E}">
         <p14:creationId xmlns:p14="http://schemas.microsoft.com/office/powerpoint/2010/main" val="2096699503"/>
-      </p:ext>
-    </p:extLst>
-  </p:cSld>
-  <p:clrMapOvr>
-    <a:masterClrMapping/>
-  </p:clrMapOvr>
-</p:sld>
-</file>
-
-<file path=ppt/slides/slide38.xml><?xml version="1.0" encoding="utf-8"?>
-<p:sld xmlns:a="http://schemas.openxmlformats.org/drawingml/2006/main" xmlns:r="http://schemas.openxmlformats.org/officeDocument/2006/relationships" xmlns:p="http://schemas.openxmlformats.org/presentationml/2006/main">
-  <p:cSld>
-    <p:spTree>
-      <p:nvGrpSpPr>
-        <p:cNvPr id="1" name=""/>
-        <p:cNvGrpSpPr/>
-        <p:nvPr/>
-      </p:nvGrpSpPr>
-      <p:grpSpPr>
-        <a:xfrm>
-          <a:off x="0" y="0"/>
-          <a:ext cx="0" cy="0"/>
-          <a:chOff x="0" y="0"/>
-          <a:chExt cx="0" cy="0"/>
-        </a:xfrm>
-      </p:grpSpPr>
-      <p:sp>
-        <p:nvSpPr>
-          <p:cNvPr id="4" name="Title 3">
-            <a:extLst>
-              <a:ext uri="{FF2B5EF4-FFF2-40B4-BE49-F238E27FC236}">
-                <a16:creationId xmlns:a16="http://schemas.microsoft.com/office/drawing/2014/main" id="{EE13D860-9205-48B1-B675-4421397C217F}"/>
-              </a:ext>
-            </a:extLst>
-          </p:cNvPr>
-          <p:cNvSpPr>
-            <a:spLocks noGrp="1"/>
-          </p:cNvSpPr>
-          <p:nvPr>
-            <p:ph type="title"/>
-          </p:nvPr>
-        </p:nvSpPr>
-        <p:spPr/>
-        <p:txBody>
-          <a:bodyPr/>
-          <a:lstStyle/>
-          <a:p>
-            <a:r>
-              <a:rPr lang="en-US" cap="none" dirty="0"/>
-              <a:t>Postman Collections For API Testing</a:t>
-            </a:r>
-          </a:p>
-        </p:txBody>
-      </p:sp>
-      <p:sp>
-        <p:nvSpPr>
-          <p:cNvPr id="5" name="Content Placeholder 4">
-            <a:extLst>
-              <a:ext uri="{FF2B5EF4-FFF2-40B4-BE49-F238E27FC236}">
-                <a16:creationId xmlns:a16="http://schemas.microsoft.com/office/drawing/2014/main" id="{BF24FDFA-3F46-41F2-9499-79EDCEF806BD}"/>
-              </a:ext>
-            </a:extLst>
-          </p:cNvPr>
-          <p:cNvSpPr>
-            <a:spLocks noGrp="1"/>
-          </p:cNvSpPr>
-          <p:nvPr>
-            <p:ph idx="1"/>
-          </p:nvPr>
-        </p:nvSpPr>
-        <p:spPr/>
-        <p:txBody>
-          <a:bodyPr/>
-          <a:lstStyle/>
-          <a:p>
-            <a:endParaRPr lang="en-US"/>
-          </a:p>
-        </p:txBody>
-      </p:sp>
-    </p:spTree>
-    <p:extLst>
-      <p:ext uri="{BB962C8B-B14F-4D97-AF65-F5344CB8AC3E}">
-        <p14:creationId xmlns:p14="http://schemas.microsoft.com/office/powerpoint/2010/main" val="2464744844"/>
-      </p:ext>
-    </p:extLst>
-  </p:cSld>
-  <p:clrMapOvr>
-    <a:masterClrMapping/>
-  </p:clrMapOvr>
-</p:sld>
-</file>
-
-<file path=ppt/slides/slide39.xml><?xml version="1.0" encoding="utf-8"?>
-<p:sld xmlns:a="http://schemas.openxmlformats.org/drawingml/2006/main" xmlns:r="http://schemas.openxmlformats.org/officeDocument/2006/relationships" xmlns:p="http://schemas.openxmlformats.org/presentationml/2006/main">
-  <p:cSld>
-    <p:spTree>
-      <p:nvGrpSpPr>
-        <p:cNvPr id="1" name=""/>
-        <p:cNvGrpSpPr/>
-        <p:nvPr/>
-      </p:nvGrpSpPr>
-      <p:grpSpPr>
-        <a:xfrm>
-          <a:off x="0" y="0"/>
-          <a:ext cx="0" cy="0"/>
-          <a:chOff x="0" y="0"/>
-          <a:chExt cx="0" cy="0"/>
-        </a:xfrm>
-      </p:grpSpPr>
-      <p:sp>
-        <p:nvSpPr>
-          <p:cNvPr id="4" name="Title 3">
-            <a:extLst>
-              <a:ext uri="{FF2B5EF4-FFF2-40B4-BE49-F238E27FC236}">
-                <a16:creationId xmlns:a16="http://schemas.microsoft.com/office/drawing/2014/main" id="{EE13D860-9205-48B1-B675-4421397C217F}"/>
-              </a:ext>
-            </a:extLst>
-          </p:cNvPr>
-          <p:cNvSpPr>
-            <a:spLocks noGrp="1"/>
-          </p:cNvSpPr>
-          <p:nvPr>
-            <p:ph type="title"/>
-          </p:nvPr>
-        </p:nvSpPr>
-        <p:spPr/>
-        <p:txBody>
-          <a:bodyPr/>
-          <a:lstStyle/>
-          <a:p>
-            <a:r>
-              <a:rPr lang="en-US" cap="none" dirty="0"/>
-              <a:t>Test Plans</a:t>
-            </a:r>
-          </a:p>
-        </p:txBody>
-      </p:sp>
-      <p:sp>
-        <p:nvSpPr>
-          <p:cNvPr id="5" name="Content Placeholder 4">
-            <a:extLst>
-              <a:ext uri="{FF2B5EF4-FFF2-40B4-BE49-F238E27FC236}">
-                <a16:creationId xmlns:a16="http://schemas.microsoft.com/office/drawing/2014/main" id="{BF24FDFA-3F46-41F2-9499-79EDCEF806BD}"/>
-              </a:ext>
-            </a:extLst>
-          </p:cNvPr>
-          <p:cNvSpPr>
-            <a:spLocks noGrp="1"/>
-          </p:cNvSpPr>
-          <p:nvPr>
-            <p:ph idx="1"/>
-          </p:nvPr>
-        </p:nvSpPr>
-        <p:spPr/>
-        <p:txBody>
-          <a:bodyPr/>
-          <a:lstStyle/>
-          <a:p>
-            <a:endParaRPr lang="en-US"/>
-          </a:p>
-        </p:txBody>
-      </p:sp>
-    </p:spTree>
-    <p:extLst>
-      <p:ext uri="{BB962C8B-B14F-4D97-AF65-F5344CB8AC3E}">
-        <p14:creationId xmlns:p14="http://schemas.microsoft.com/office/powerpoint/2010/main" val="2410506025"/>
       </p:ext>
     </p:extLst>
   </p:cSld>
@@ -32820,6 +33213,172 @@
           <a:p>
             <a:r>
               <a:rPr lang="en-US" cap="none" dirty="0"/>
+              <a:t>Postman Collections For API Testing</a:t>
+            </a:r>
+          </a:p>
+        </p:txBody>
+      </p:sp>
+      <p:sp>
+        <p:nvSpPr>
+          <p:cNvPr id="5" name="Content Placeholder 4">
+            <a:extLst>
+              <a:ext uri="{FF2B5EF4-FFF2-40B4-BE49-F238E27FC236}">
+                <a16:creationId xmlns:a16="http://schemas.microsoft.com/office/drawing/2014/main" id="{BF24FDFA-3F46-41F2-9499-79EDCEF806BD}"/>
+              </a:ext>
+            </a:extLst>
+          </p:cNvPr>
+          <p:cNvSpPr>
+            <a:spLocks noGrp="1"/>
+          </p:cNvSpPr>
+          <p:nvPr>
+            <p:ph idx="1"/>
+          </p:nvPr>
+        </p:nvSpPr>
+        <p:spPr/>
+        <p:txBody>
+          <a:bodyPr/>
+          <a:lstStyle/>
+          <a:p>
+            <a:endParaRPr lang="en-US"/>
+          </a:p>
+        </p:txBody>
+      </p:sp>
+    </p:spTree>
+    <p:extLst>
+      <p:ext uri="{BB962C8B-B14F-4D97-AF65-F5344CB8AC3E}">
+        <p14:creationId xmlns:p14="http://schemas.microsoft.com/office/powerpoint/2010/main" val="2464744844"/>
+      </p:ext>
+    </p:extLst>
+  </p:cSld>
+  <p:clrMapOvr>
+    <a:masterClrMapping/>
+  </p:clrMapOvr>
+</p:sld>
+</file>
+
+<file path=ppt/slides/slide41.xml><?xml version="1.0" encoding="utf-8"?>
+<p:sld xmlns:a="http://schemas.openxmlformats.org/drawingml/2006/main" xmlns:r="http://schemas.openxmlformats.org/officeDocument/2006/relationships" xmlns:p="http://schemas.openxmlformats.org/presentationml/2006/main">
+  <p:cSld>
+    <p:spTree>
+      <p:nvGrpSpPr>
+        <p:cNvPr id="1" name=""/>
+        <p:cNvGrpSpPr/>
+        <p:nvPr/>
+      </p:nvGrpSpPr>
+      <p:grpSpPr>
+        <a:xfrm>
+          <a:off x="0" y="0"/>
+          <a:ext cx="0" cy="0"/>
+          <a:chOff x="0" y="0"/>
+          <a:chExt cx="0" cy="0"/>
+        </a:xfrm>
+      </p:grpSpPr>
+      <p:sp>
+        <p:nvSpPr>
+          <p:cNvPr id="4" name="Title 3">
+            <a:extLst>
+              <a:ext uri="{FF2B5EF4-FFF2-40B4-BE49-F238E27FC236}">
+                <a16:creationId xmlns:a16="http://schemas.microsoft.com/office/drawing/2014/main" id="{EE13D860-9205-48B1-B675-4421397C217F}"/>
+              </a:ext>
+            </a:extLst>
+          </p:cNvPr>
+          <p:cNvSpPr>
+            <a:spLocks noGrp="1"/>
+          </p:cNvSpPr>
+          <p:nvPr>
+            <p:ph type="title"/>
+          </p:nvPr>
+        </p:nvSpPr>
+        <p:spPr/>
+        <p:txBody>
+          <a:bodyPr/>
+          <a:lstStyle/>
+          <a:p>
+            <a:r>
+              <a:rPr lang="en-US" cap="none" dirty="0"/>
+              <a:t>Test Plans</a:t>
+            </a:r>
+          </a:p>
+        </p:txBody>
+      </p:sp>
+      <p:sp>
+        <p:nvSpPr>
+          <p:cNvPr id="5" name="Content Placeholder 4">
+            <a:extLst>
+              <a:ext uri="{FF2B5EF4-FFF2-40B4-BE49-F238E27FC236}">
+                <a16:creationId xmlns:a16="http://schemas.microsoft.com/office/drawing/2014/main" id="{BF24FDFA-3F46-41F2-9499-79EDCEF806BD}"/>
+              </a:ext>
+            </a:extLst>
+          </p:cNvPr>
+          <p:cNvSpPr>
+            <a:spLocks noGrp="1"/>
+          </p:cNvSpPr>
+          <p:nvPr>
+            <p:ph idx="1"/>
+          </p:nvPr>
+        </p:nvSpPr>
+        <p:spPr/>
+        <p:txBody>
+          <a:bodyPr/>
+          <a:lstStyle/>
+          <a:p>
+            <a:endParaRPr lang="en-US"/>
+          </a:p>
+        </p:txBody>
+      </p:sp>
+    </p:spTree>
+    <p:extLst>
+      <p:ext uri="{BB962C8B-B14F-4D97-AF65-F5344CB8AC3E}">
+        <p14:creationId xmlns:p14="http://schemas.microsoft.com/office/powerpoint/2010/main" val="2410506025"/>
+      </p:ext>
+    </p:extLst>
+  </p:cSld>
+  <p:clrMapOvr>
+    <a:masterClrMapping/>
+  </p:clrMapOvr>
+</p:sld>
+</file>
+
+<file path=ppt/slides/slide42.xml><?xml version="1.0" encoding="utf-8"?>
+<p:sld xmlns:a="http://schemas.openxmlformats.org/drawingml/2006/main" xmlns:r="http://schemas.openxmlformats.org/officeDocument/2006/relationships" xmlns:p="http://schemas.openxmlformats.org/presentationml/2006/main">
+  <p:cSld>
+    <p:spTree>
+      <p:nvGrpSpPr>
+        <p:cNvPr id="1" name=""/>
+        <p:cNvGrpSpPr/>
+        <p:nvPr/>
+      </p:nvGrpSpPr>
+      <p:grpSpPr>
+        <a:xfrm>
+          <a:off x="0" y="0"/>
+          <a:ext cx="0" cy="0"/>
+          <a:chOff x="0" y="0"/>
+          <a:chExt cx="0" cy="0"/>
+        </a:xfrm>
+      </p:grpSpPr>
+      <p:sp>
+        <p:nvSpPr>
+          <p:cNvPr id="4" name="Title 3">
+            <a:extLst>
+              <a:ext uri="{FF2B5EF4-FFF2-40B4-BE49-F238E27FC236}">
+                <a16:creationId xmlns:a16="http://schemas.microsoft.com/office/drawing/2014/main" id="{EE13D860-9205-48B1-B675-4421397C217F}"/>
+              </a:ext>
+            </a:extLst>
+          </p:cNvPr>
+          <p:cNvSpPr>
+            <a:spLocks noGrp="1"/>
+          </p:cNvSpPr>
+          <p:nvPr>
+            <p:ph type="title"/>
+          </p:nvPr>
+        </p:nvSpPr>
+        <p:spPr/>
+        <p:txBody>
+          <a:bodyPr/>
+          <a:lstStyle/>
+          <a:p>
+            <a:r>
+              <a:rPr lang="en-US" cap="none" dirty="0"/>
               <a:t>Testing &amp; CI/CD Pipelines</a:t>
             </a:r>
           </a:p>
@@ -32863,7 +33422,7 @@
 </p:sld>
 </file>
 
-<file path=ppt/slides/slide41.xml><?xml version="1.0" encoding="utf-8"?>
+<file path=ppt/slides/slide43.xml><?xml version="1.0" encoding="utf-8"?>
 <p:sld xmlns:a="http://schemas.openxmlformats.org/drawingml/2006/main" xmlns:r="http://schemas.openxmlformats.org/officeDocument/2006/relationships" xmlns:p="http://schemas.openxmlformats.org/presentationml/2006/main">
   <p:cSld>
     <p:spTree>
@@ -32946,7 +33505,7 @@
 </p:sld>
 </file>
 
-<file path=ppt/slides/slide42.xml><?xml version="1.0" encoding="utf-8"?>
+<file path=ppt/slides/slide44.xml><?xml version="1.0" encoding="utf-8"?>
 <p:sld xmlns:a="http://schemas.openxmlformats.org/drawingml/2006/main" xmlns:r="http://schemas.openxmlformats.org/officeDocument/2006/relationships" xmlns:p="http://schemas.openxmlformats.org/presentationml/2006/main">
   <p:cSld>
     <p:spTree>
@@ -33029,7 +33588,7 @@
 </p:sld>
 </file>
 
-<file path=ppt/slides/slide43.xml><?xml version="1.0" encoding="utf-8"?>
+<file path=ppt/slides/slide45.xml><?xml version="1.0" encoding="utf-8"?>
 <p:sld xmlns:a="http://schemas.openxmlformats.org/drawingml/2006/main" xmlns:r="http://schemas.openxmlformats.org/officeDocument/2006/relationships" xmlns:p="http://schemas.openxmlformats.org/presentationml/2006/main">
   <p:cSld>
     <p:spTree>
@@ -33113,7 +33672,7 @@
 </p:sld>
 </file>
 
-<file path=ppt/slides/slide44.xml><?xml version="1.0" encoding="utf-8"?>
+<file path=ppt/slides/slide46.xml><?xml version="1.0" encoding="utf-8"?>
 <p:sld xmlns:a="http://schemas.openxmlformats.org/drawingml/2006/main" xmlns:r="http://schemas.openxmlformats.org/officeDocument/2006/relationships" xmlns:p="http://schemas.openxmlformats.org/presentationml/2006/main">
   <p:cSld>
     <p:spTree>
@@ -33196,7 +33755,7 @@
 </p:sld>
 </file>
 
-<file path=ppt/slides/slide45.xml><?xml version="1.0" encoding="utf-8"?>
+<file path=ppt/slides/slide47.xml><?xml version="1.0" encoding="utf-8"?>
 <p:sld xmlns:a="http://schemas.openxmlformats.org/drawingml/2006/main" xmlns:r="http://schemas.openxmlformats.org/officeDocument/2006/relationships" xmlns:p="http://schemas.openxmlformats.org/presentationml/2006/main">
   <p:cSld>
     <p:spTree>
@@ -33279,7 +33838,7 @@
 </p:sld>
 </file>
 
-<file path=ppt/slides/slide46.xml><?xml version="1.0" encoding="utf-8"?>
+<file path=ppt/slides/slide48.xml><?xml version="1.0" encoding="utf-8"?>
 <p:sld xmlns:a="http://schemas.openxmlformats.org/drawingml/2006/main" xmlns:r="http://schemas.openxmlformats.org/officeDocument/2006/relationships" xmlns:p="http://schemas.openxmlformats.org/presentationml/2006/main">
   <p:cSld>
     <p:spTree>
@@ -33362,7 +33921,7 @@
 </p:sld>
 </file>
 
-<file path=ppt/slides/slide47.xml><?xml version="1.0" encoding="utf-8"?>
+<file path=ppt/slides/slide49.xml><?xml version="1.0" encoding="utf-8"?>
 <p:sld xmlns:a="http://schemas.openxmlformats.org/drawingml/2006/main" xmlns:r="http://schemas.openxmlformats.org/officeDocument/2006/relationships" xmlns:p="http://schemas.openxmlformats.org/presentationml/2006/main">
   <p:cSld>
     <p:spTree>
@@ -33445,7 +34004,228 @@
 </p:sld>
 </file>
 
-<file path=ppt/slides/slide48.xml><?xml version="1.0" encoding="utf-8"?>
+<file path=ppt/slides/slide5.xml><?xml version="1.0" encoding="utf-8"?>
+<p:sld xmlns:a="http://schemas.openxmlformats.org/drawingml/2006/main" xmlns:r="http://schemas.openxmlformats.org/officeDocument/2006/relationships" xmlns:p="http://schemas.openxmlformats.org/presentationml/2006/main">
+  <p:cSld>
+    <p:spTree>
+      <p:nvGrpSpPr>
+        <p:cNvPr id="1" name=""/>
+        <p:cNvGrpSpPr/>
+        <p:nvPr/>
+      </p:nvGrpSpPr>
+      <p:grpSpPr>
+        <a:xfrm>
+          <a:off x="0" y="0"/>
+          <a:ext cx="0" cy="0"/>
+          <a:chOff x="0" y="0"/>
+          <a:chExt cx="0" cy="0"/>
+        </a:xfrm>
+      </p:grpSpPr>
+      <p:sp>
+        <p:nvSpPr>
+          <p:cNvPr id="2" name="Title 1">
+            <a:extLst>
+              <a:ext uri="{FF2B5EF4-FFF2-40B4-BE49-F238E27FC236}">
+                <a16:creationId xmlns:a16="http://schemas.microsoft.com/office/drawing/2014/main" id="{56129DDF-461C-43E8-B761-75B2FFAAF346}"/>
+              </a:ext>
+            </a:extLst>
+          </p:cNvPr>
+          <p:cNvSpPr>
+            <a:spLocks noGrp="1"/>
+          </p:cNvSpPr>
+          <p:nvPr>
+            <p:ph type="title"/>
+          </p:nvPr>
+        </p:nvSpPr>
+        <p:spPr/>
+        <p:txBody>
+          <a:bodyPr/>
+          <a:lstStyle/>
+          <a:p>
+            <a:r>
+              <a:rPr lang="en-US" cap="none" dirty="0"/>
+              <a:t>This Talk Is NOT</a:t>
+            </a:r>
+          </a:p>
+        </p:txBody>
+      </p:sp>
+      <p:sp>
+        <p:nvSpPr>
+          <p:cNvPr id="7" name="Content Placeholder 6">
+            <a:extLst>
+              <a:ext uri="{FF2B5EF4-FFF2-40B4-BE49-F238E27FC236}">
+                <a16:creationId xmlns:a16="http://schemas.microsoft.com/office/drawing/2014/main" id="{BD6A176B-5D5E-4687-98BF-B8A7FDDCBCF5}"/>
+              </a:ext>
+            </a:extLst>
+          </p:cNvPr>
+          <p:cNvSpPr>
+            <a:spLocks noGrp="1"/>
+          </p:cNvSpPr>
+          <p:nvPr>
+            <p:ph idx="1"/>
+          </p:nvPr>
+        </p:nvSpPr>
+        <p:spPr>
+          <a:xfrm>
+            <a:off x="1141412" y="2249487"/>
+            <a:ext cx="9905999" cy="3541714"/>
+          </a:xfrm>
+        </p:spPr>
+        <p:txBody>
+          <a:bodyPr/>
+          <a:lstStyle/>
+          <a:p>
+            <a:r>
+              <a:rPr lang="en-US" dirty="0"/>
+              <a:t>Focused on any particular .NET project type </a:t>
+            </a:r>
+          </a:p>
+          <a:p>
+            <a:pPr lvl="1"/>
+            <a:r>
+              <a:rPr lang="en-US" dirty="0"/>
+              <a:t>ASP .NET, XAML, Web API </a:t>
+            </a:r>
+            <a:r>
+              <a:rPr lang="en-US" dirty="0" err="1"/>
+              <a:t>etc</a:t>
+            </a:r>
+            <a:endParaRPr lang="en-US" dirty="0"/>
+          </a:p>
+          <a:p>
+            <a:r>
+              <a:rPr lang="en-US" dirty="0"/>
+              <a:t>Focused extensively on any one library or tool</a:t>
+            </a:r>
+          </a:p>
+          <a:p>
+            <a:r>
+              <a:rPr lang="en-US" dirty="0"/>
+              <a:t>Code-Intensive</a:t>
+            </a:r>
+          </a:p>
+          <a:p>
+            <a:r>
+              <a:rPr lang="en-US" dirty="0"/>
+              <a:t>Solely about unit testing</a:t>
+            </a:r>
+          </a:p>
+        </p:txBody>
+      </p:sp>
+      <p:pic>
+        <p:nvPicPr>
+          <p:cNvPr id="4098" name="Picture 2" descr="Related image">
+            <a:extLst>
+              <a:ext uri="{FF2B5EF4-FFF2-40B4-BE49-F238E27FC236}">
+                <a16:creationId xmlns:a16="http://schemas.microsoft.com/office/drawing/2014/main" id="{59AA86EE-28A2-45F6-9993-9039B36ADC7C}"/>
+              </a:ext>
+            </a:extLst>
+          </p:cNvPr>
+          <p:cNvPicPr>
+            <a:picLocks noChangeAspect="1" noChangeArrowheads="1"/>
+          </p:cNvPicPr>
+          <p:nvPr/>
+        </p:nvPicPr>
+        <p:blipFill rotWithShape="1">
+          <a:blip r:embed="rId2">
+            <a:extLst>
+              <a:ext uri="{BEBA8EAE-BF5A-486C-A8C5-ECC9F3942E4B}">
+                <a14:imgProps xmlns:a14="http://schemas.microsoft.com/office/drawing/2010/main">
+                  <a14:imgLayer r:embed="rId3">
+                    <a14:imgEffect>
+                      <a14:backgroundRemoval t="10000" b="90000" l="10000" r="49038">
+                        <a14:foregroundMark x1="61154" y1="53333" x2="60962" y2="41667"/>
+                        <a14:foregroundMark x1="66538" y1="53667" x2="65192" y2="48000"/>
+                        <a14:foregroundMark x1="80385" y1="52333" x2="80769" y2="45333"/>
+                        <a14:backgroundMark x1="56346" y1="63667" x2="57115" y2="63333"/>
+                        <a14:backgroundMark x1="59423" y1="66000" x2="59423" y2="64333"/>
+                        <a14:backgroundMark x1="60000" y1="65000" x2="59423" y2="63000"/>
+                      </a14:backgroundRemoval>
+                    </a14:imgEffect>
+                  </a14:imgLayer>
+                </a14:imgProps>
+              </a:ext>
+              <a:ext uri="{28A0092B-C50C-407E-A947-70E740481C1C}">
+                <a14:useLocalDpi xmlns:a14="http://schemas.microsoft.com/office/drawing/2010/main" val="0"/>
+              </a:ext>
+            </a:extLst>
+          </a:blip>
+          <a:srcRect l="7930" t="17847" r="50473" b="13202"/>
+          <a:stretch/>
+        </p:blipFill>
+        <p:spPr bwMode="auto">
+          <a:xfrm>
+            <a:off x="8473440" y="1659547"/>
+            <a:ext cx="2800767" cy="2678388"/>
+          </a:xfrm>
+          <a:prstGeom prst="rect">
+            <a:avLst/>
+          </a:prstGeom>
+          <a:noFill/>
+          <a:extLst>
+            <a:ext uri="{909E8E84-426E-40DD-AFC4-6F175D3DCCD1}">
+              <a14:hiddenFill xmlns:a14="http://schemas.microsoft.com/office/drawing/2010/main">
+                <a:solidFill>
+                  <a:srgbClr val="FFFFFF"/>
+                </a:solidFill>
+              </a14:hiddenFill>
+            </a:ext>
+          </a:extLst>
+        </p:spPr>
+      </p:pic>
+      <p:sp>
+        <p:nvSpPr>
+          <p:cNvPr id="3" name="TextBox 2">
+            <a:extLst>
+              <a:ext uri="{FF2B5EF4-FFF2-40B4-BE49-F238E27FC236}">
+                <a16:creationId xmlns:a16="http://schemas.microsoft.com/office/drawing/2014/main" id="{C7E75639-F814-4CBD-9772-0850B2B76245}"/>
+              </a:ext>
+            </a:extLst>
+          </p:cNvPr>
+          <p:cNvSpPr txBox="1"/>
+          <p:nvPr/>
+        </p:nvSpPr>
+        <p:spPr>
+          <a:xfrm>
+            <a:off x="8473440" y="4414134"/>
+            <a:ext cx="2800767" cy="584775"/>
+          </a:xfrm>
+          <a:prstGeom prst="rect">
+            <a:avLst/>
+          </a:prstGeom>
+          <a:noFill/>
+        </p:spPr>
+        <p:txBody>
+          <a:bodyPr wrap="none" rtlCol="0">
+            <a:spAutoFit/>
+          </a:bodyPr>
+          <a:lstStyle/>
+          <a:p>
+            <a:r>
+              <a:rPr lang="en-US" sz="3200" dirty="0">
+                <a:latin typeface="Roboto Condensed" panose="02000000000000000000" pitchFamily="2" charset="0"/>
+                <a:ea typeface="Roboto Condensed" panose="02000000000000000000" pitchFamily="2" charset="0"/>
+                <a:cs typeface="Roboto Condensed" panose="02000000000000000000" pitchFamily="2" charset="0"/>
+              </a:rPr>
+              <a:t>403 FORBIDDEN</a:t>
+            </a:r>
+          </a:p>
+        </p:txBody>
+      </p:sp>
+    </p:spTree>
+    <p:extLst>
+      <p:ext uri="{BB962C8B-B14F-4D97-AF65-F5344CB8AC3E}">
+        <p14:creationId xmlns:p14="http://schemas.microsoft.com/office/powerpoint/2010/main" val="4227452076"/>
+      </p:ext>
+    </p:extLst>
+  </p:cSld>
+  <p:clrMapOvr>
+    <a:masterClrMapping/>
+  </p:clrMapOvr>
+</p:sld>
+</file>
+
+<file path=ppt/slides/slide50.xml><?xml version="1.0" encoding="utf-8"?>
 <p:sld xmlns:a="http://schemas.openxmlformats.org/drawingml/2006/main" xmlns:r="http://schemas.openxmlformats.org/officeDocument/2006/relationships" xmlns:p="http://schemas.openxmlformats.org/presentationml/2006/main">
   <p:cSld>
     <p:spTree>
@@ -33528,7 +34308,7 @@
 </p:sld>
 </file>
 
-<file path=ppt/slides/slide49.xml><?xml version="1.0" encoding="utf-8"?>
+<file path=ppt/slides/slide51.xml><?xml version="1.0" encoding="utf-8"?>
 <p:sld xmlns:a="http://schemas.openxmlformats.org/drawingml/2006/main" xmlns:r="http://schemas.openxmlformats.org/officeDocument/2006/relationships" xmlns:p="http://schemas.openxmlformats.org/presentationml/2006/main">
   <p:cSld>
     <p:spTree>
@@ -33864,228 +34644,7 @@
 </p:sld>
 </file>
 
-<file path=ppt/slides/slide5.xml><?xml version="1.0" encoding="utf-8"?>
-<p:sld xmlns:a="http://schemas.openxmlformats.org/drawingml/2006/main" xmlns:r="http://schemas.openxmlformats.org/officeDocument/2006/relationships" xmlns:p="http://schemas.openxmlformats.org/presentationml/2006/main">
-  <p:cSld>
-    <p:spTree>
-      <p:nvGrpSpPr>
-        <p:cNvPr id="1" name=""/>
-        <p:cNvGrpSpPr/>
-        <p:nvPr/>
-      </p:nvGrpSpPr>
-      <p:grpSpPr>
-        <a:xfrm>
-          <a:off x="0" y="0"/>
-          <a:ext cx="0" cy="0"/>
-          <a:chOff x="0" y="0"/>
-          <a:chExt cx="0" cy="0"/>
-        </a:xfrm>
-      </p:grpSpPr>
-      <p:sp>
-        <p:nvSpPr>
-          <p:cNvPr id="2" name="Title 1">
-            <a:extLst>
-              <a:ext uri="{FF2B5EF4-FFF2-40B4-BE49-F238E27FC236}">
-                <a16:creationId xmlns:a16="http://schemas.microsoft.com/office/drawing/2014/main" id="{56129DDF-461C-43E8-B761-75B2FFAAF346}"/>
-              </a:ext>
-            </a:extLst>
-          </p:cNvPr>
-          <p:cNvSpPr>
-            <a:spLocks noGrp="1"/>
-          </p:cNvSpPr>
-          <p:nvPr>
-            <p:ph type="title"/>
-          </p:nvPr>
-        </p:nvSpPr>
-        <p:spPr/>
-        <p:txBody>
-          <a:bodyPr/>
-          <a:lstStyle/>
-          <a:p>
-            <a:r>
-              <a:rPr lang="en-US" cap="none" dirty="0"/>
-              <a:t>This Talk Is NOT</a:t>
-            </a:r>
-          </a:p>
-        </p:txBody>
-      </p:sp>
-      <p:sp>
-        <p:nvSpPr>
-          <p:cNvPr id="7" name="Content Placeholder 6">
-            <a:extLst>
-              <a:ext uri="{FF2B5EF4-FFF2-40B4-BE49-F238E27FC236}">
-                <a16:creationId xmlns:a16="http://schemas.microsoft.com/office/drawing/2014/main" id="{BD6A176B-5D5E-4687-98BF-B8A7FDDCBCF5}"/>
-              </a:ext>
-            </a:extLst>
-          </p:cNvPr>
-          <p:cNvSpPr>
-            <a:spLocks noGrp="1"/>
-          </p:cNvSpPr>
-          <p:nvPr>
-            <p:ph idx="1"/>
-          </p:nvPr>
-        </p:nvSpPr>
-        <p:spPr>
-          <a:xfrm>
-            <a:off x="1141412" y="2249487"/>
-            <a:ext cx="9905999" cy="3541714"/>
-          </a:xfrm>
-        </p:spPr>
-        <p:txBody>
-          <a:bodyPr/>
-          <a:lstStyle/>
-          <a:p>
-            <a:r>
-              <a:rPr lang="en-US" dirty="0"/>
-              <a:t>Focused on any particular .NET project type </a:t>
-            </a:r>
-          </a:p>
-          <a:p>
-            <a:pPr lvl="1"/>
-            <a:r>
-              <a:rPr lang="en-US" dirty="0"/>
-              <a:t>ASP .NET, XAML, Web API </a:t>
-            </a:r>
-            <a:r>
-              <a:rPr lang="en-US" dirty="0" err="1"/>
-              <a:t>etc</a:t>
-            </a:r>
-            <a:endParaRPr lang="en-US" dirty="0"/>
-          </a:p>
-          <a:p>
-            <a:r>
-              <a:rPr lang="en-US" dirty="0"/>
-              <a:t>Focused extensively on any one library or tool</a:t>
-            </a:r>
-          </a:p>
-          <a:p>
-            <a:r>
-              <a:rPr lang="en-US" dirty="0"/>
-              <a:t>Code-Intensive</a:t>
-            </a:r>
-          </a:p>
-          <a:p>
-            <a:r>
-              <a:rPr lang="en-US" dirty="0"/>
-              <a:t>Solely about unit testing</a:t>
-            </a:r>
-          </a:p>
-        </p:txBody>
-      </p:sp>
-      <p:pic>
-        <p:nvPicPr>
-          <p:cNvPr id="4098" name="Picture 2" descr="Related image">
-            <a:extLst>
-              <a:ext uri="{FF2B5EF4-FFF2-40B4-BE49-F238E27FC236}">
-                <a16:creationId xmlns:a16="http://schemas.microsoft.com/office/drawing/2014/main" id="{59AA86EE-28A2-45F6-9993-9039B36ADC7C}"/>
-              </a:ext>
-            </a:extLst>
-          </p:cNvPr>
-          <p:cNvPicPr>
-            <a:picLocks noChangeAspect="1" noChangeArrowheads="1"/>
-          </p:cNvPicPr>
-          <p:nvPr/>
-        </p:nvPicPr>
-        <p:blipFill rotWithShape="1">
-          <a:blip r:embed="rId2">
-            <a:extLst>
-              <a:ext uri="{BEBA8EAE-BF5A-486C-A8C5-ECC9F3942E4B}">
-                <a14:imgProps xmlns:a14="http://schemas.microsoft.com/office/drawing/2010/main">
-                  <a14:imgLayer r:embed="rId3">
-                    <a14:imgEffect>
-                      <a14:backgroundRemoval t="10000" b="90000" l="10000" r="49038">
-                        <a14:foregroundMark x1="61154" y1="53333" x2="60962" y2="41667"/>
-                        <a14:foregroundMark x1="66538" y1="53667" x2="65192" y2="48000"/>
-                        <a14:foregroundMark x1="80385" y1="52333" x2="80769" y2="45333"/>
-                        <a14:backgroundMark x1="56346" y1="63667" x2="57115" y2="63333"/>
-                        <a14:backgroundMark x1="59423" y1="66000" x2="59423" y2="64333"/>
-                        <a14:backgroundMark x1="60000" y1="65000" x2="59423" y2="63000"/>
-                      </a14:backgroundRemoval>
-                    </a14:imgEffect>
-                  </a14:imgLayer>
-                </a14:imgProps>
-              </a:ext>
-              <a:ext uri="{28A0092B-C50C-407E-A947-70E740481C1C}">
-                <a14:useLocalDpi xmlns:a14="http://schemas.microsoft.com/office/drawing/2010/main" val="0"/>
-              </a:ext>
-            </a:extLst>
-          </a:blip>
-          <a:srcRect l="7930" t="17847" r="50473" b="13202"/>
-          <a:stretch/>
-        </p:blipFill>
-        <p:spPr bwMode="auto">
-          <a:xfrm>
-            <a:off x="8473440" y="1659547"/>
-            <a:ext cx="2800767" cy="2678388"/>
-          </a:xfrm>
-          <a:prstGeom prst="rect">
-            <a:avLst/>
-          </a:prstGeom>
-          <a:noFill/>
-          <a:extLst>
-            <a:ext uri="{909E8E84-426E-40DD-AFC4-6F175D3DCCD1}">
-              <a14:hiddenFill xmlns:a14="http://schemas.microsoft.com/office/drawing/2010/main">
-                <a:solidFill>
-                  <a:srgbClr val="FFFFFF"/>
-                </a:solidFill>
-              </a14:hiddenFill>
-            </a:ext>
-          </a:extLst>
-        </p:spPr>
-      </p:pic>
-      <p:sp>
-        <p:nvSpPr>
-          <p:cNvPr id="3" name="TextBox 2">
-            <a:extLst>
-              <a:ext uri="{FF2B5EF4-FFF2-40B4-BE49-F238E27FC236}">
-                <a16:creationId xmlns:a16="http://schemas.microsoft.com/office/drawing/2014/main" id="{C7E75639-F814-4CBD-9772-0850B2B76245}"/>
-              </a:ext>
-            </a:extLst>
-          </p:cNvPr>
-          <p:cNvSpPr txBox="1"/>
-          <p:nvPr/>
-        </p:nvSpPr>
-        <p:spPr>
-          <a:xfrm>
-            <a:off x="8473440" y="4414134"/>
-            <a:ext cx="2800767" cy="584775"/>
-          </a:xfrm>
-          <a:prstGeom prst="rect">
-            <a:avLst/>
-          </a:prstGeom>
-          <a:noFill/>
-        </p:spPr>
-        <p:txBody>
-          <a:bodyPr wrap="none" rtlCol="0">
-            <a:spAutoFit/>
-          </a:bodyPr>
-          <a:lstStyle/>
-          <a:p>
-            <a:r>
-              <a:rPr lang="en-US" sz="3200" dirty="0">
-                <a:latin typeface="Roboto Condensed" panose="02000000000000000000" pitchFamily="2" charset="0"/>
-                <a:ea typeface="Roboto Condensed" panose="02000000000000000000" pitchFamily="2" charset="0"/>
-                <a:cs typeface="Roboto Condensed" panose="02000000000000000000" pitchFamily="2" charset="0"/>
-              </a:rPr>
-              <a:t>403 FORBIDDEN</a:t>
-            </a:r>
-          </a:p>
-        </p:txBody>
-      </p:sp>
-    </p:spTree>
-    <p:extLst>
-      <p:ext uri="{BB962C8B-B14F-4D97-AF65-F5344CB8AC3E}">
-        <p14:creationId xmlns:p14="http://schemas.microsoft.com/office/powerpoint/2010/main" val="4227452076"/>
-      </p:ext>
-    </p:extLst>
-  </p:cSld>
-  <p:clrMapOvr>
-    <a:masterClrMapping/>
-  </p:clrMapOvr>
-</p:sld>
-</file>
-
-<file path=ppt/slides/slide50.xml><?xml version="1.0" encoding="utf-8"?>
+<file path=ppt/slides/slide52.xml><?xml version="1.0" encoding="utf-8"?>
 <p:sld xmlns:a="http://schemas.openxmlformats.org/drawingml/2006/main" xmlns:r="http://schemas.openxmlformats.org/officeDocument/2006/relationships" xmlns:p="http://schemas.openxmlformats.org/presentationml/2006/main">
   <p:cSld>
     <p:spTree>
@@ -34421,7 +34980,7 @@
 </p:sld>
 </file>
 
-<file path=ppt/slides/slide51.xml><?xml version="1.0" encoding="utf-8"?>
+<file path=ppt/slides/slide53.xml><?xml version="1.0" encoding="utf-8"?>
 <p:sld xmlns:a="http://schemas.openxmlformats.org/drawingml/2006/main" xmlns:r="http://schemas.openxmlformats.org/officeDocument/2006/relationships" xmlns:p="http://schemas.openxmlformats.org/presentationml/2006/main">
   <p:cSld>
     <p:spTree>
@@ -34782,7 +35341,7 @@
 </p:sld>
 </file>
 
-<file path=ppt/slides/slide52.xml><?xml version="1.0" encoding="utf-8"?>
+<file path=ppt/slides/slide54.xml><?xml version="1.0" encoding="utf-8"?>
 <p:sld xmlns:a="http://schemas.openxmlformats.org/drawingml/2006/main" xmlns:r="http://schemas.openxmlformats.org/officeDocument/2006/relationships" xmlns:p="http://schemas.openxmlformats.org/presentationml/2006/main">
   <p:cSld>
     <p:spTree>
@@ -35226,233 +35785,6 @@
       </p:grpSpPr>
       <p:sp>
         <p:nvSpPr>
-          <p:cNvPr id="4" name="Title 3">
-            <a:extLst>
-              <a:ext uri="{FF2B5EF4-FFF2-40B4-BE49-F238E27FC236}">
-                <a16:creationId xmlns:a16="http://schemas.microsoft.com/office/drawing/2014/main" id="{EE13D860-9205-48B1-B675-4421397C217F}"/>
-              </a:ext>
-            </a:extLst>
-          </p:cNvPr>
-          <p:cNvSpPr>
-            <a:spLocks noGrp="1"/>
-          </p:cNvSpPr>
-          <p:nvPr>
-            <p:ph type="title"/>
-          </p:nvPr>
-        </p:nvSpPr>
-        <p:spPr/>
-        <p:txBody>
-          <a:bodyPr/>
-          <a:lstStyle/>
-          <a:p>
-            <a:r>
-              <a:rPr lang="en-US" cap="none" dirty="0"/>
-              <a:t>Example Codebase Overview</a:t>
-            </a:r>
-          </a:p>
-        </p:txBody>
-      </p:sp>
-      <p:sp>
-        <p:nvSpPr>
-          <p:cNvPr id="5" name="Content Placeholder 4">
-            <a:extLst>
-              <a:ext uri="{FF2B5EF4-FFF2-40B4-BE49-F238E27FC236}">
-                <a16:creationId xmlns:a16="http://schemas.microsoft.com/office/drawing/2014/main" id="{BF24FDFA-3F46-41F2-9499-79EDCEF806BD}"/>
-              </a:ext>
-            </a:extLst>
-          </p:cNvPr>
-          <p:cNvSpPr>
-            <a:spLocks noGrp="1"/>
-          </p:cNvSpPr>
-          <p:nvPr>
-            <p:ph idx="1"/>
-          </p:nvPr>
-        </p:nvSpPr>
-        <p:spPr/>
-        <p:txBody>
-          <a:bodyPr>
-            <a:normAutofit/>
-          </a:bodyPr>
-          <a:lstStyle/>
-          <a:p>
-            <a:r>
-              <a:rPr lang="en-US" dirty="0"/>
-              <a:t>Written by “Interns”</a:t>
-            </a:r>
-          </a:p>
-          <a:p>
-            <a:pPr lvl="1"/>
-            <a:r>
-              <a:rPr lang="en-US" dirty="0"/>
-              <a:t>(or me playing devil’s advocate)</a:t>
-            </a:r>
-          </a:p>
-          <a:p>
-            <a:r>
-              <a:rPr lang="en-US" dirty="0"/>
-              <a:t>Effectively a single long method</a:t>
-            </a:r>
-          </a:p>
-          <a:p>
-            <a:r>
-              <a:rPr lang="en-US" dirty="0"/>
-              <a:t>High degree of coupling</a:t>
-            </a:r>
-          </a:p>
-          <a:p>
-            <a:r>
-              <a:rPr lang="en-US" dirty="0"/>
-              <a:t>Uses </a:t>
-            </a:r>
-            <a:r>
-              <a:rPr lang="en-US" dirty="0" err="1"/>
-              <a:t>EntityFramework</a:t>
-            </a:r>
-            <a:r>
-              <a:rPr lang="en-US" dirty="0"/>
-              <a:t> to check keywords by value</a:t>
-            </a:r>
-          </a:p>
-          <a:p>
-            <a:r>
-              <a:rPr lang="en-US" dirty="0"/>
-              <a:t>Needs urgent refactoring</a:t>
-            </a:r>
-          </a:p>
-        </p:txBody>
-      </p:sp>
-    </p:spTree>
-    <p:extLst>
-      <p:ext uri="{BB962C8B-B14F-4D97-AF65-F5344CB8AC3E}">
-        <p14:creationId xmlns:p14="http://schemas.microsoft.com/office/powerpoint/2010/main" val="3265761372"/>
-      </p:ext>
-    </p:extLst>
-  </p:cSld>
-  <p:clrMapOvr>
-    <a:masterClrMapping/>
-  </p:clrMapOvr>
-</p:sld>
-</file>
-
-<file path=ppt/slides/slide8.xml><?xml version="1.0" encoding="utf-8"?>
-<p:sld xmlns:a="http://schemas.openxmlformats.org/drawingml/2006/main" xmlns:r="http://schemas.openxmlformats.org/officeDocument/2006/relationships" xmlns:p="http://schemas.openxmlformats.org/presentationml/2006/main">
-  <p:cSld>
-    <p:spTree>
-      <p:nvGrpSpPr>
-        <p:cNvPr id="1" name=""/>
-        <p:cNvGrpSpPr/>
-        <p:nvPr/>
-      </p:nvGrpSpPr>
-      <p:grpSpPr>
-        <a:xfrm>
-          <a:off x="0" y="0"/>
-          <a:ext cx="0" cy="0"/>
-          <a:chOff x="0" y="0"/>
-          <a:chExt cx="0" cy="0"/>
-        </a:xfrm>
-      </p:grpSpPr>
-      <p:sp>
-        <p:nvSpPr>
-          <p:cNvPr id="4" name="Title 3">
-            <a:extLst>
-              <a:ext uri="{FF2B5EF4-FFF2-40B4-BE49-F238E27FC236}">
-                <a16:creationId xmlns:a16="http://schemas.microsoft.com/office/drawing/2014/main" id="{EE13D860-9205-48B1-B675-4421397C217F}"/>
-              </a:ext>
-            </a:extLst>
-          </p:cNvPr>
-          <p:cNvSpPr>
-            <a:spLocks noGrp="1"/>
-          </p:cNvSpPr>
-          <p:nvPr>
-            <p:ph type="title"/>
-          </p:nvPr>
-        </p:nvSpPr>
-        <p:spPr/>
-        <p:txBody>
-          <a:bodyPr/>
-          <a:lstStyle/>
-          <a:p>
-            <a:r>
-              <a:rPr lang="en-US" cap="none" dirty="0"/>
-              <a:t>Current Testing Problems</a:t>
-            </a:r>
-          </a:p>
-        </p:txBody>
-      </p:sp>
-      <p:sp>
-        <p:nvSpPr>
-          <p:cNvPr id="5" name="Content Placeholder 4">
-            <a:extLst>
-              <a:ext uri="{FF2B5EF4-FFF2-40B4-BE49-F238E27FC236}">
-                <a16:creationId xmlns:a16="http://schemas.microsoft.com/office/drawing/2014/main" id="{BF24FDFA-3F46-41F2-9499-79EDCEF806BD}"/>
-              </a:ext>
-            </a:extLst>
-          </p:cNvPr>
-          <p:cNvSpPr>
-            <a:spLocks noGrp="1"/>
-          </p:cNvSpPr>
-          <p:nvPr>
-            <p:ph idx="1"/>
-          </p:nvPr>
-        </p:nvSpPr>
-        <p:spPr/>
-        <p:txBody>
-          <a:bodyPr>
-            <a:normAutofit/>
-          </a:bodyPr>
-          <a:lstStyle/>
-          <a:p>
-            <a:r>
-              <a:rPr lang="en-US" dirty="0"/>
-              <a:t>Depends on a Database Connection</a:t>
-            </a:r>
-          </a:p>
-          <a:p>
-            <a:r>
-              <a:rPr lang="en-US" dirty="0"/>
-              <a:t>Undocumented Business Requirements</a:t>
-            </a:r>
-          </a:p>
-          <a:p>
-            <a:r>
-              <a:rPr lang="en-US" dirty="0"/>
-              <a:t>Too many Unique Paths through the Code (Cyclomatic Complexity)</a:t>
-            </a:r>
-          </a:p>
-        </p:txBody>
-      </p:sp>
-    </p:spTree>
-    <p:extLst>
-      <p:ext uri="{BB962C8B-B14F-4D97-AF65-F5344CB8AC3E}">
-        <p14:creationId xmlns:p14="http://schemas.microsoft.com/office/powerpoint/2010/main" val="1883054154"/>
-      </p:ext>
-    </p:extLst>
-  </p:cSld>
-  <p:clrMapOvr>
-    <a:masterClrMapping/>
-  </p:clrMapOvr>
-</p:sld>
-</file>
-
-<file path=ppt/slides/slide9.xml><?xml version="1.0" encoding="utf-8"?>
-<p:sld xmlns:a="http://schemas.openxmlformats.org/drawingml/2006/main" xmlns:r="http://schemas.openxmlformats.org/officeDocument/2006/relationships" xmlns:p="http://schemas.openxmlformats.org/presentationml/2006/main">
-  <p:cSld>
-    <p:spTree>
-      <p:nvGrpSpPr>
-        <p:cNvPr id="1" name=""/>
-        <p:cNvGrpSpPr/>
-        <p:nvPr/>
-      </p:nvGrpSpPr>
-      <p:grpSpPr>
-        <a:xfrm>
-          <a:off x="0" y="0"/>
-          <a:ext cx="0" cy="0"/>
-          <a:chOff x="0" y="0"/>
-          <a:chExt cx="0" cy="0"/>
-        </a:xfrm>
-      </p:grpSpPr>
-      <p:sp>
-        <p:nvSpPr>
           <p:cNvPr id="9" name="Title 8">
             <a:extLst>
               <a:ext uri="{FF2B5EF4-FFF2-40B4-BE49-F238E27FC236}">
@@ -35508,6 +35840,359 @@
     <p:extLst>
       <p:ext uri="{BB962C8B-B14F-4D97-AF65-F5344CB8AC3E}">
         <p14:creationId xmlns:p14="http://schemas.microsoft.com/office/powerpoint/2010/main" val="3874460316"/>
+      </p:ext>
+    </p:extLst>
+  </p:cSld>
+  <p:clrMapOvr>
+    <a:masterClrMapping/>
+  </p:clrMapOvr>
+</p:sld>
+</file>
+
+<file path=ppt/slides/slide8.xml><?xml version="1.0" encoding="utf-8"?>
+<p:sld xmlns:a="http://schemas.openxmlformats.org/drawingml/2006/main" xmlns:r="http://schemas.openxmlformats.org/officeDocument/2006/relationships" xmlns:p="http://schemas.openxmlformats.org/presentationml/2006/main" show="0">
+  <p:cSld>
+    <p:spTree>
+      <p:nvGrpSpPr>
+        <p:cNvPr id="1" name=""/>
+        <p:cNvGrpSpPr/>
+        <p:nvPr/>
+      </p:nvGrpSpPr>
+      <p:grpSpPr>
+        <a:xfrm>
+          <a:off x="0" y="0"/>
+          <a:ext cx="0" cy="0"/>
+          <a:chOff x="0" y="0"/>
+          <a:chExt cx="0" cy="0"/>
+        </a:xfrm>
+      </p:grpSpPr>
+      <p:graphicFrame>
+        <p:nvGraphicFramePr>
+          <p:cNvPr id="18" name="Content Placeholder 12">
+            <a:extLst>
+              <a:ext uri="{FF2B5EF4-FFF2-40B4-BE49-F238E27FC236}">
+                <a16:creationId xmlns:a16="http://schemas.microsoft.com/office/drawing/2014/main" id="{3285EE39-92DD-4873-B3EA-C7BCB8A95AE8}"/>
+              </a:ext>
+            </a:extLst>
+          </p:cNvPr>
+          <p:cNvGraphicFramePr>
+            <a:graphicFrameLocks noGrp="1"/>
+          </p:cNvGraphicFramePr>
+          <p:nvPr>
+            <p:ph type="pic" idx="4294967295"/>
+            <p:extLst>
+              <p:ext uri="{D42A27DB-BD31-4B8C-83A1-F6EECF244321}">
+                <p14:modId xmlns:p14="http://schemas.microsoft.com/office/powerpoint/2010/main" val="1673782684"/>
+              </p:ext>
+            </p:extLst>
+          </p:nvPr>
+        </p:nvGraphicFramePr>
+        <p:xfrm>
+          <a:off x="1037239" y="930720"/>
+          <a:ext cx="10572052" cy="5266944"/>
+        </p:xfrm>
+        <a:graphic>
+          <a:graphicData uri="http://schemas.openxmlformats.org/drawingml/2006/diagram">
+            <dgm:relIds xmlns:dgm="http://schemas.openxmlformats.org/drawingml/2006/diagram" xmlns:r="http://schemas.openxmlformats.org/officeDocument/2006/relationships" r:dm="rId2" r:lo="rId3" r:qs="rId4" r:cs="rId5"/>
+          </a:graphicData>
+        </a:graphic>
+      </p:graphicFrame>
+      <p:sp>
+        <p:nvSpPr>
+          <p:cNvPr id="23" name="Title 3">
+            <a:extLst>
+              <a:ext uri="{FF2B5EF4-FFF2-40B4-BE49-F238E27FC236}">
+                <a16:creationId xmlns:a16="http://schemas.microsoft.com/office/drawing/2014/main" id="{F0A19E53-6231-491C-A887-D93B61383759}"/>
+              </a:ext>
+            </a:extLst>
+          </p:cNvPr>
+          <p:cNvSpPr txBox="1">
+            <a:spLocks/>
+          </p:cNvSpPr>
+          <p:nvPr/>
+        </p:nvSpPr>
+        <p:spPr>
+          <a:xfrm>
+            <a:off x="1141413" y="0"/>
+            <a:ext cx="9905998" cy="1478570"/>
+          </a:xfrm>
+          <a:prstGeom prst="rect">
+            <a:avLst/>
+          </a:prstGeom>
+        </p:spPr>
+        <p:txBody>
+          <a:bodyPr vert="horz" lIns="91440" tIns="45720" rIns="91440" bIns="45720" rtlCol="0" anchor="ctr">
+            <a:normAutofit/>
+          </a:bodyPr>
+          <a:lstStyle>
+            <a:lvl1pPr algn="l" defTabSz="914400" rtl="0" eaLnBrk="1" latinLnBrk="0" hangingPunct="1">
+              <a:lnSpc>
+                <a:spcPct val="90000"/>
+              </a:lnSpc>
+              <a:spcBef>
+                <a:spcPct val="0"/>
+              </a:spcBef>
+              <a:buNone/>
+              <a:defRPr sz="3600" kern="1200" cap="all" baseline="0">
+                <a:solidFill>
+                  <a:schemeClr val="tx1"/>
+                </a:solidFill>
+                <a:effectLst>
+                  <a:outerShdw blurRad="177800" dist="38100" dir="2700000" algn="tl">
+                    <a:srgbClr val="000000">
+                      <a:alpha val="24000"/>
+                    </a:srgbClr>
+                  </a:outerShdw>
+                </a:effectLst>
+                <a:latin typeface="+mj-lt"/>
+                <a:ea typeface="+mj-ea"/>
+                <a:cs typeface="+mj-cs"/>
+              </a:defRPr>
+            </a:lvl1pPr>
+          </a:lstStyle>
+          <a:p>
+            <a:r>
+              <a:rPr lang="en-US" cap="none" dirty="0"/>
+              <a:t>Types of Tests</a:t>
+            </a:r>
+          </a:p>
+        </p:txBody>
+      </p:sp>
+      <p:sp>
+        <p:nvSpPr>
+          <p:cNvPr id="26" name="Arrow: Down 25">
+            <a:extLst>
+              <a:ext uri="{FF2B5EF4-FFF2-40B4-BE49-F238E27FC236}">
+                <a16:creationId xmlns:a16="http://schemas.microsoft.com/office/drawing/2014/main" id="{8C436F3A-8B58-470E-8A7E-67AE3D36BFF2}"/>
+              </a:ext>
+            </a:extLst>
+          </p:cNvPr>
+          <p:cNvSpPr/>
+          <p:nvPr/>
+        </p:nvSpPr>
+        <p:spPr>
+          <a:xfrm rot="17673808">
+            <a:off x="1620239" y="4965379"/>
+            <a:ext cx="459148" cy="586953"/>
+          </a:xfrm>
+          <a:prstGeom prst="downArrow">
+            <a:avLst/>
+          </a:prstGeom>
+        </p:spPr>
+        <p:style>
+          <a:lnRef idx="2">
+            <a:schemeClr val="accent3">
+              <a:shade val="50000"/>
+            </a:schemeClr>
+          </a:lnRef>
+          <a:fillRef idx="1">
+            <a:schemeClr val="accent3"/>
+          </a:fillRef>
+          <a:effectRef idx="0">
+            <a:schemeClr val="accent3"/>
+          </a:effectRef>
+          <a:fontRef idx="minor">
+            <a:schemeClr val="lt1"/>
+          </a:fontRef>
+        </p:style>
+        <p:txBody>
+          <a:bodyPr rtlCol="0" anchor="ctr"/>
+          <a:lstStyle/>
+          <a:p>
+            <a:pPr algn="ctr"/>
+            <a:endParaRPr lang="en-US"/>
+          </a:p>
+        </p:txBody>
+      </p:sp>
+    </p:spTree>
+    <p:extLst>
+      <p:ext uri="{BB962C8B-B14F-4D97-AF65-F5344CB8AC3E}">
+        <p14:creationId xmlns:p14="http://schemas.microsoft.com/office/powerpoint/2010/main" val="3340561667"/>
+      </p:ext>
+    </p:extLst>
+  </p:cSld>
+  <p:clrMapOvr>
+    <a:masterClrMapping/>
+  </p:clrMapOvr>
+  <p:timing>
+    <p:tnLst>
+      <p:par>
+        <p:cTn id="1" dur="indefinite" restart="never" nodeType="tmRoot">
+          <p:childTnLst>
+            <p:seq concurrent="1" nextAc="seek">
+              <p:cTn id="2" dur="indefinite" nodeType="mainSeq">
+                <p:childTnLst>
+                  <p:par>
+                    <p:cTn id="3" fill="hold">
+                      <p:stCondLst>
+                        <p:cond delay="indefinite"/>
+                      </p:stCondLst>
+                      <p:childTnLst>
+                        <p:par>
+                          <p:cTn id="4" fill="hold">
+                            <p:stCondLst>
+                              <p:cond delay="0"/>
+                            </p:stCondLst>
+                            <p:childTnLst>
+                              <p:par>
+                                <p:cTn id="5" presetID="1" presetClass="entr" presetSubtype="0" fill="hold" grpId="0" nodeType="clickEffect">
+                                  <p:stCondLst>
+                                    <p:cond delay="0"/>
+                                  </p:stCondLst>
+                                  <p:childTnLst>
+                                    <p:set>
+                                      <p:cBhvr>
+                                        <p:cTn id="6" dur="1" fill="hold">
+                                          <p:stCondLst>
+                                            <p:cond delay="0"/>
+                                          </p:stCondLst>
+                                        </p:cTn>
+                                        <p:tgtEl>
+                                          <p:spTgt spid="26"/>
+                                        </p:tgtEl>
+                                        <p:attrNameLst>
+                                          <p:attrName>style.visibility</p:attrName>
+                                        </p:attrNameLst>
+                                      </p:cBhvr>
+                                      <p:to>
+                                        <p:strVal val="visible"/>
+                                      </p:to>
+                                    </p:set>
+                                  </p:childTnLst>
+                                </p:cTn>
+                              </p:par>
+                            </p:childTnLst>
+                          </p:cTn>
+                        </p:par>
+                      </p:childTnLst>
+                    </p:cTn>
+                  </p:par>
+                </p:childTnLst>
+              </p:cTn>
+              <p:prevCondLst>
+                <p:cond evt="onPrev" delay="0">
+                  <p:tgtEl>
+                    <p:sldTgt/>
+                  </p:tgtEl>
+                </p:cond>
+              </p:prevCondLst>
+              <p:nextCondLst>
+                <p:cond evt="onNext" delay="0">
+                  <p:tgtEl>
+                    <p:sldTgt/>
+                  </p:tgtEl>
+                </p:cond>
+              </p:nextCondLst>
+            </p:seq>
+          </p:childTnLst>
+        </p:cTn>
+      </p:par>
+    </p:tnLst>
+    <p:bldLst>
+      <p:bldP spid="26" grpId="0" animBg="1"/>
+    </p:bldLst>
+  </p:timing>
+</p:sld>
+</file>
+
+<file path=ppt/slides/slide9.xml><?xml version="1.0" encoding="utf-8"?>
+<p:sld xmlns:a="http://schemas.openxmlformats.org/drawingml/2006/main" xmlns:r="http://schemas.openxmlformats.org/officeDocument/2006/relationships" xmlns:p="http://schemas.openxmlformats.org/presentationml/2006/main">
+  <p:cSld>
+    <p:spTree>
+      <p:nvGrpSpPr>
+        <p:cNvPr id="1" name=""/>
+        <p:cNvGrpSpPr/>
+        <p:nvPr/>
+      </p:nvGrpSpPr>
+      <p:grpSpPr>
+        <a:xfrm>
+          <a:off x="0" y="0"/>
+          <a:ext cx="0" cy="0"/>
+          <a:chOff x="0" y="0"/>
+          <a:chExt cx="0" cy="0"/>
+        </a:xfrm>
+      </p:grpSpPr>
+      <p:sp>
+        <p:nvSpPr>
+          <p:cNvPr id="4" name="Title 3">
+            <a:extLst>
+              <a:ext uri="{FF2B5EF4-FFF2-40B4-BE49-F238E27FC236}">
+                <a16:creationId xmlns:a16="http://schemas.microsoft.com/office/drawing/2014/main" id="{EE13D860-9205-48B1-B675-4421397C217F}"/>
+              </a:ext>
+            </a:extLst>
+          </p:cNvPr>
+          <p:cNvSpPr>
+            <a:spLocks noGrp="1"/>
+          </p:cNvSpPr>
+          <p:nvPr>
+            <p:ph type="title"/>
+          </p:nvPr>
+        </p:nvSpPr>
+        <p:spPr>
+          <a:xfrm>
+            <a:off x="1141413" y="0"/>
+            <a:ext cx="9905998" cy="1478570"/>
+          </a:xfrm>
+        </p:spPr>
+        <p:txBody>
+          <a:bodyPr/>
+          <a:lstStyle/>
+          <a:p>
+            <a:r>
+              <a:rPr lang="en-US" cap="none" dirty="0"/>
+              <a:t>What is a Unit Test?</a:t>
+            </a:r>
+          </a:p>
+        </p:txBody>
+      </p:sp>
+      <p:pic>
+        <p:nvPicPr>
+          <p:cNvPr id="8" name="Picture 7">
+            <a:extLst>
+              <a:ext uri="{FF2B5EF4-FFF2-40B4-BE49-F238E27FC236}">
+                <a16:creationId xmlns:a16="http://schemas.microsoft.com/office/drawing/2014/main" id="{F77D794F-6085-4DD5-8161-95ABC4C7F82E}"/>
+              </a:ext>
+            </a:extLst>
+          </p:cNvPr>
+          <p:cNvPicPr>
+            <a:picLocks noChangeAspect="1"/>
+          </p:cNvPicPr>
+          <p:nvPr/>
+        </p:nvPicPr>
+        <p:blipFill>
+          <a:blip r:embed="rId2"/>
+          <a:stretch>
+            <a:fillRect/>
+          </a:stretch>
+        </p:blipFill>
+        <p:spPr>
+          <a:xfrm>
+            <a:off x="1300162" y="1830870"/>
+            <a:ext cx="10013781" cy="4106943"/>
+          </a:xfrm>
+          <a:prstGeom prst="rect">
+            <a:avLst/>
+          </a:prstGeom>
+          <a:ln w="38100" cap="sq">
+            <a:solidFill>
+              <a:srgbClr val="000000"/>
+            </a:solidFill>
+            <a:prstDash val="solid"/>
+            <a:miter lim="800000"/>
+          </a:ln>
+          <a:effectLst>
+            <a:outerShdw blurRad="50800" dist="38100" dir="2700000" algn="tl" rotWithShape="0">
+              <a:srgbClr val="000000">
+                <a:alpha val="43000"/>
+              </a:srgbClr>
+            </a:outerShdw>
+          </a:effectLst>
+        </p:spPr>
+      </p:pic>
+    </p:spTree>
+    <p:extLst>
+      <p:ext uri="{BB962C8B-B14F-4D97-AF65-F5344CB8AC3E}">
+        <p14:creationId xmlns:p14="http://schemas.microsoft.com/office/powerpoint/2010/main" val="3402936677"/>
       </p:ext>
     </p:extLst>
   </p:cSld>

</xml_diff>